<commit_message>
Update training documents with fixed Chinese display and simplified PPT
Changes:
- Fixed Chinese character display in screenshots by installing proper fonts
- Reduced PPT from 32 slides to 19 slides with only 7 key screenshots
- Updated all screenshots with correct Chinese rendering
- Simplified training manual with essential content
- Cleaned up temporary screenshot files

Document sizes:
- Training manual: 942KB (with 7 screenshots)
- Training PPT: 795KB (19 slides, 7 screenshots)

All screenshots now display Chinese text correctly.
</commit_message>
<xml_diff>
--- a/非雪季系统培训PPT.pptx
+++ b/非雪季系统培训PPT.pptx
@@ -24,19 +24,6 @@
     <p:sldId id="272" r:id="rId23"/>
     <p:sldId id="273" r:id="rId24"/>
     <p:sldId id="274" r:id="rId25"/>
-    <p:sldId id="275" r:id="rId26"/>
-    <p:sldId id="276" r:id="rId27"/>
-    <p:sldId id="277" r:id="rId28"/>
-    <p:sldId id="278" r:id="rId29"/>
-    <p:sldId id="279" r:id="rId30"/>
-    <p:sldId id="280" r:id="rId31"/>
-    <p:sldId id="281" r:id="rId32"/>
-    <p:sldId id="282" r:id="rId33"/>
-    <p:sldId id="283" r:id="rId34"/>
-    <p:sldId id="284" r:id="rId35"/>
-    <p:sldId id="285" r:id="rId36"/>
-    <p:sldId id="286" r:id="rId37"/>
-    <p:sldId id="287" r:id="rId38"/>
   </p:sldIdLst>
   <p:sldSz cx="9144000" cy="6858000" type="screen4x3"/>
   <p:notesSz cx="6858000" cy="9144000"/>
@@ -3210,131 +3197,6 @@
         <p:txBody>
           <a:bodyPr/>
           <a:lstStyle/>
-          <a:p>
-            <a:r>
-              <a:t>四、用户管理</a:t>
-            </a:r>
-          </a:p>
-        </p:txBody>
-      </p:sp>
-      <p:sp>
-        <p:nvSpPr>
-          <p:cNvPr id="3" name="Content Placeholder 2"/>
-          <p:cNvSpPr>
-            <a:spLocks noGrp="1"/>
-          </p:cNvSpPr>
-          <p:nvPr>
-            <p:ph idx="1"/>
-          </p:nvPr>
-        </p:nvSpPr>
-        <p:spPr/>
-        <p:txBody>
-          <a:bodyPr/>
-          <a:lstStyle/>
-          <a:p/>
-          <a:p>
-            <a:pPr>
-              <a:defRPr sz="2000"/>
-            </a:pPr>
-            <a:r>
-              <a:t>普通用户</a:t>
-            </a:r>
-          </a:p>
-          <a:p>
-            <a:pPr lvl="1">
-              <a:defRPr sz="1800"/>
-            </a:pPr>
-            <a:r>
-              <a:t>  - 查看和管理游客信息</a:t>
-            </a:r>
-          </a:p>
-          <a:p>
-            <a:pPr lvl="1">
-              <a:defRPr sz="1800"/>
-            </a:pPr>
-            <a:r>
-              <a:t>  - 查询用户订单</a:t>
-            </a:r>
-          </a:p>
-          <a:p>
-            <a:pPr lvl="1">
-              <a:defRPr sz="1800"/>
-            </a:pPr>
-            <a:r>
-              <a:t>  - 用户状态管理（启用/禁用）</a:t>
-            </a:r>
-          </a:p>
-          <a:p>
-            <a:pPr>
-              <a:defRPr sz="2000"/>
-            </a:pPr>
-          </a:p>
-          <a:p>
-            <a:pPr>
-              <a:defRPr sz="2000"/>
-            </a:pPr>
-            <a:r>
-              <a:t>员工管理</a:t>
-            </a:r>
-          </a:p>
-          <a:p>
-            <a:pPr lvl="1">
-              <a:defRPr sz="1800"/>
-            </a:pPr>
-            <a:r>
-              <a:t>  - 创建员工账号</a:t>
-            </a:r>
-          </a:p>
-          <a:p>
-            <a:pPr lvl="1">
-              <a:defRPr sz="1800"/>
-            </a:pPr>
-            <a:r>
-              <a:t>  - 分配角色和权限</a:t>
-            </a:r>
-          </a:p>
-          <a:p>
-            <a:pPr lvl="1">
-              <a:defRPr sz="1800"/>
-            </a:pPr>
-            <a:r>
-              <a:t>  - 重置密码</a:t>
-            </a:r>
-          </a:p>
-        </p:txBody>
-      </p:sp>
-    </p:spTree>
-  </p:cSld>
-  <p:clrMapOvr>
-    <a:masterClrMapping/>
-  </p:clrMapOvr>
-</p:sld>
-</file>
-
-<file path=ppt/slides/slide11.xml><?xml version="1.0" encoding="utf-8"?>
-<p:sld xmlns:a="http://schemas.openxmlformats.org/drawingml/2006/main" xmlns:p="http://schemas.openxmlformats.org/presentationml/2006/main" xmlns:r="http://schemas.openxmlformats.org/officeDocument/2006/relationships">
-  <p:cSld>
-    <p:spTree>
-      <p:nvGrpSpPr>
-        <p:cNvPr id="1" name=""/>
-        <p:cNvGrpSpPr/>
-        <p:nvPr/>
-      </p:nvGrpSpPr>
-      <p:grpSpPr/>
-      <p:sp>
-        <p:nvSpPr>
-          <p:cNvPr id="2" name="Title 1"/>
-          <p:cNvSpPr>
-            <a:spLocks noGrp="1"/>
-          </p:cNvSpPr>
-          <p:nvPr>
-            <p:ph type="title"/>
-          </p:nvPr>
-        </p:nvSpPr>
-        <p:spPr/>
-        <p:txBody>
-          <a:bodyPr/>
-          <a:lstStyle/>
           <a:p/>
         </p:txBody>
       </p:sp>
@@ -3364,14 +3226,14 @@
               <a:defRPr sz="3200" b="1"/>
             </a:pPr>
             <a:r>
-              <a:t>用户列表页面</a:t>
+              <a:t>营销管理 - Banner配置</a:t>
             </a:r>
           </a:p>
         </p:txBody>
       </p:sp>
       <p:pic>
         <p:nvPicPr>
-          <p:cNvPr id="4" name="Picture 3" descr="13_users.png"/>
+          <p:cNvPr id="4" name="Picture 3" descr="06_banner.png"/>
           <p:cNvPicPr>
             <a:picLocks noChangeAspect="1"/>
           </p:cNvPicPr>
@@ -3419,7 +3281,129 @@
               <a:defRPr sz="1600"/>
             </a:pPr>
             <a:r>
-              <a:t>查看用户信息，支持按条件筛选查询</a:t>
+              <a:t>配置小程序首页轮播图，设置跳转链接</a:t>
+            </a:r>
+          </a:p>
+        </p:txBody>
+      </p:sp>
+    </p:spTree>
+  </p:cSld>
+  <p:clrMapOvr>
+    <a:masterClrMapping/>
+  </p:clrMapOvr>
+</p:sld>
+</file>
+
+<file path=ppt/slides/slide11.xml><?xml version="1.0" encoding="utf-8"?>
+<p:sld xmlns:a="http://schemas.openxmlformats.org/drawingml/2006/main" xmlns:p="http://schemas.openxmlformats.org/presentationml/2006/main" xmlns:r="http://schemas.openxmlformats.org/officeDocument/2006/relationships">
+  <p:cSld>
+    <p:spTree>
+      <p:nvGrpSpPr>
+        <p:cNvPr id="1" name=""/>
+        <p:cNvGrpSpPr/>
+        <p:nvPr/>
+      </p:nvGrpSpPr>
+      <p:grpSpPr/>
+      <p:sp>
+        <p:nvSpPr>
+          <p:cNvPr id="2" name="Title 1"/>
+          <p:cNvSpPr>
+            <a:spLocks noGrp="1"/>
+          </p:cNvSpPr>
+          <p:nvPr>
+            <p:ph type="title"/>
+          </p:nvPr>
+        </p:nvSpPr>
+        <p:spPr/>
+        <p:txBody>
+          <a:bodyPr/>
+          <a:lstStyle/>
+          <a:p>
+            <a:r>
+              <a:t>数据分析</a:t>
+            </a:r>
+          </a:p>
+        </p:txBody>
+      </p:sp>
+      <p:sp>
+        <p:nvSpPr>
+          <p:cNvPr id="3" name="Content Placeholder 2"/>
+          <p:cNvSpPr>
+            <a:spLocks noGrp="1"/>
+          </p:cNvSpPr>
+          <p:nvPr>
+            <p:ph idx="1"/>
+          </p:nvPr>
+        </p:nvSpPr>
+        <p:spPr/>
+        <p:txBody>
+          <a:bodyPr/>
+          <a:lstStyle/>
+          <a:p/>
+          <a:p>
+            <a:pPr>
+              <a:defRPr sz="2000"/>
+            </a:pPr>
+            <a:r>
+              <a:t>7. 数据分析功能</a:t>
+            </a:r>
+          </a:p>
+          <a:p>
+            <a:pPr>
+              <a:defRPr sz="2000"/>
+            </a:pPr>
+          </a:p>
+          <a:p>
+            <a:pPr>
+              <a:defRPr sz="2000"/>
+            </a:pPr>
+            <a:r>
+              <a:t>销售统计</a:t>
+            </a:r>
+          </a:p>
+          <a:p>
+            <a:pPr lvl="1">
+              <a:defRPr sz="1800"/>
+            </a:pPr>
+            <a:r>
+              <a:t>  • 查看关键指标：销售额、订单数、客单价</a:t>
+            </a:r>
+          </a:p>
+          <a:p>
+            <a:pPr lvl="1">
+              <a:defRPr sz="1800"/>
+            </a:pPr>
+            <a:r>
+              <a:t>  • 分析销售趋势</a:t>
+            </a:r>
+          </a:p>
+          <a:p>
+            <a:pPr lvl="1">
+              <a:defRPr sz="1800"/>
+            </a:pPr>
+            <a:r>
+              <a:t>  • 品类占比分析</a:t>
+            </a:r>
+          </a:p>
+          <a:p>
+            <a:pPr lvl="1">
+              <a:defRPr sz="1800"/>
+            </a:pPr>
+            <a:r>
+              <a:t>  • 导出统计报表</a:t>
+            </a:r>
+          </a:p>
+          <a:p>
+            <a:pPr>
+              <a:defRPr sz="2000"/>
+            </a:pPr>
+          </a:p>
+          <a:p>
+            <a:pPr>
+              <a:defRPr sz="2000"/>
+            </a:pPr>
+            <a:r>
+              <a:t>用途：辅助经营决策</a:t>
             </a:r>
           </a:p>
         </p:txBody>
@@ -3485,14 +3469,14 @@
               <a:defRPr sz="3200" b="1"/>
             </a:pPr>
             <a:r>
-              <a:t>员工管理页面</a:t>
+              <a:t>销售统计页面</a:t>
             </a:r>
           </a:p>
         </p:txBody>
       </p:sp>
       <p:pic>
         <p:nvPicPr>
-          <p:cNvPr id="4" name="Picture 3" descr="15_staff.png"/>
+          <p:cNvPr id="4" name="Picture 3" descr="07_statistics.png"/>
           <p:cNvPicPr>
             <a:picLocks noChangeAspect="1"/>
           </p:cNvPicPr>
@@ -3540,7 +3524,7 @@
               <a:defRPr sz="1600"/>
             </a:pPr>
             <a:r>
-              <a:t>管理员工账号和权限</a:t>
+              <a:t>查看销售数据，分析经营状况</a:t>
             </a:r>
           </a:p>
         </p:txBody>
@@ -3579,7 +3563,7 @@
           <a:lstStyle/>
           <a:p>
             <a:r>
-              <a:t>五、场地管理</a:t>
+              <a:t>四、操作技巧</a:t>
             </a:r>
           </a:p>
         </p:txBody>
@@ -3604,7 +3588,7 @@
               <a:defRPr sz="2000"/>
             </a:pPr>
             <a:r>
-              <a:t>场地列表</a:t>
+              <a:t>快捷操作</a:t>
             </a:r>
           </a:p>
           <a:p>
@@ -3612,7 +3596,7 @@
               <a:defRPr sz="1800"/>
             </a:pPr>
             <a:r>
-              <a:t>  - 管理场地资源</a:t>
+              <a:t>  • Ctrl + S：快速保存</a:t>
             </a:r>
           </a:p>
           <a:p>
@@ -3620,7 +3604,7 @@
               <a:defRPr sz="1800"/>
             </a:pPr>
             <a:r>
-              <a:t>  - 设置开放时间和价格</a:t>
+              <a:t>  • Ctrl + F：打开搜索</a:t>
             </a:r>
           </a:p>
           <a:p>
@@ -3628,20 +3612,7 @@
               <a:defRPr sz="1800"/>
             </a:pPr>
             <a:r>
-              <a:t>  - 场地上下架</a:t>
-            </a:r>
-          </a:p>
-          <a:p>
-            <a:pPr>
-              <a:defRPr sz="2000"/>
-            </a:pPr>
-          </a:p>
-          <a:p>
-            <a:pPr>
-              <a:defRPr sz="2000"/>
-            </a:pPr>
-            <a:r>
-              <a:t>场地订单</a:t>
+              <a:t>  • F5：刷新页面</a:t>
             </a:r>
           </a:p>
           <a:p>
@@ -3649,7 +3620,20 @@
               <a:defRPr sz="1800"/>
             </a:pPr>
             <a:r>
-              <a:t>  - 查看预订订单</a:t>
+              <a:t>  • Esc：关闭弹窗</a:t>
+            </a:r>
+          </a:p>
+          <a:p>
+            <a:pPr>
+              <a:defRPr sz="2000"/>
+            </a:pPr>
+          </a:p>
+          <a:p>
+            <a:pPr>
+              <a:defRPr sz="2000"/>
+            </a:pPr>
+            <a:r>
+              <a:t>查询技巧</a:t>
             </a:r>
           </a:p>
           <a:p>
@@ -3657,7 +3641,7 @@
               <a:defRPr sz="1800"/>
             </a:pPr>
             <a:r>
-              <a:t>  - 订单确认和取消</a:t>
+              <a:t>  • 支持模糊查询（姓名、手机号）</a:t>
             </a:r>
           </a:p>
           <a:p>
@@ -3665,7 +3649,23 @@
               <a:defRPr sz="1800"/>
             </a:pPr>
             <a:r>
-              <a:t>  - 退款处理</a:t>
+              <a:t>  • 使用时间范围筛选</a:t>
+            </a:r>
+          </a:p>
+          <a:p>
+            <a:pPr lvl="1">
+              <a:defRPr sz="1800"/>
+            </a:pPr>
+            <a:r>
+              <a:t>  • 组合多个条件精确查询</a:t>
+            </a:r>
+          </a:p>
+          <a:p>
+            <a:pPr lvl="1">
+              <a:defRPr sz="1800"/>
+            </a:pPr>
+            <a:r>
+              <a:t>  • 导出筛选后的数据</a:t>
             </a:r>
           </a:p>
         </p:txBody>
@@ -3702,6 +3702,1018 @@
         <p:txBody>
           <a:bodyPr/>
           <a:lstStyle/>
+          <a:p>
+            <a:r>
+              <a:t>五、常见问题 - 登录</a:t>
+            </a:r>
+          </a:p>
+        </p:txBody>
+      </p:sp>
+      <p:sp>
+        <p:nvSpPr>
+          <p:cNvPr id="3" name="Content Placeholder 2"/>
+          <p:cNvSpPr>
+            <a:spLocks noGrp="1"/>
+          </p:cNvSpPr>
+          <p:nvPr>
+            <p:ph idx="1"/>
+          </p:nvPr>
+        </p:nvSpPr>
+        <p:spPr/>
+        <p:txBody>
+          <a:bodyPr/>
+          <a:lstStyle/>
+          <a:p/>
+          <a:p>
+            <a:pPr>
+              <a:defRPr sz="2000"/>
+            </a:pPr>
+            <a:r>
+              <a:t>Q：忘记密码怎么办？</a:t>
+            </a:r>
+          </a:p>
+          <a:p>
+            <a:pPr>
+              <a:defRPr sz="2000"/>
+            </a:pPr>
+            <a:r>
+              <a:t>A：联系系统管理员重置密码</a:t>
+            </a:r>
+          </a:p>
+          <a:p>
+            <a:pPr>
+              <a:defRPr sz="2000"/>
+            </a:pPr>
+          </a:p>
+          <a:p>
+            <a:pPr>
+              <a:defRPr sz="2000"/>
+            </a:pPr>
+            <a:r>
+              <a:t>Q：为什么自动退出？</a:t>
+            </a:r>
+          </a:p>
+          <a:p>
+            <a:pPr>
+              <a:defRPr sz="2000"/>
+            </a:pPr>
+            <a:r>
+              <a:t>A：30分钟无操作会自动退出，重新登录即可</a:t>
+            </a:r>
+          </a:p>
+          <a:p>
+            <a:pPr>
+              <a:defRPr sz="2000"/>
+            </a:pPr>
+          </a:p>
+          <a:p>
+            <a:pPr>
+              <a:defRPr sz="2000"/>
+            </a:pPr>
+            <a:r>
+              <a:t>Q：看不到某些菜单？</a:t>
+            </a:r>
+          </a:p>
+          <a:p>
+            <a:pPr>
+              <a:defRPr sz="2000"/>
+            </a:pPr>
+            <a:r>
+              <a:t>A：检查账号权限，联系管理员分配权限</a:t>
+            </a:r>
+          </a:p>
+          <a:p>
+            <a:pPr>
+              <a:defRPr sz="2000"/>
+            </a:pPr>
+          </a:p>
+          <a:p>
+            <a:pPr>
+              <a:defRPr sz="2000"/>
+            </a:pPr>
+            <a:r>
+              <a:t>Q：提示账号已在其他地方登录？</a:t>
+            </a:r>
+          </a:p>
+          <a:p>
+            <a:pPr>
+              <a:defRPr sz="2000"/>
+            </a:pPr>
+            <a:r>
+              <a:t>A：同一账号不能同时登录，立即修改密码</a:t>
+            </a:r>
+          </a:p>
+        </p:txBody>
+      </p:sp>
+    </p:spTree>
+  </p:cSld>
+  <p:clrMapOvr>
+    <a:masterClrMapping/>
+  </p:clrMapOvr>
+</p:sld>
+</file>
+
+<file path=ppt/slides/slide15.xml><?xml version="1.0" encoding="utf-8"?>
+<p:sld xmlns:a="http://schemas.openxmlformats.org/drawingml/2006/main" xmlns:p="http://schemas.openxmlformats.org/presentationml/2006/main" xmlns:r="http://schemas.openxmlformats.org/officeDocument/2006/relationships">
+  <p:cSld>
+    <p:spTree>
+      <p:nvGrpSpPr>
+        <p:cNvPr id="1" name=""/>
+        <p:cNvGrpSpPr/>
+        <p:nvPr/>
+      </p:nvGrpSpPr>
+      <p:grpSpPr/>
+      <p:sp>
+        <p:nvSpPr>
+          <p:cNvPr id="2" name="Title 1"/>
+          <p:cNvSpPr>
+            <a:spLocks noGrp="1"/>
+          </p:cNvSpPr>
+          <p:nvPr>
+            <p:ph type="title"/>
+          </p:nvPr>
+        </p:nvSpPr>
+        <p:spPr/>
+        <p:txBody>
+          <a:bodyPr/>
+          <a:lstStyle/>
+          <a:p>
+            <a:r>
+              <a:t>常见问题 - 操作</a:t>
+            </a:r>
+          </a:p>
+        </p:txBody>
+      </p:sp>
+      <p:sp>
+        <p:nvSpPr>
+          <p:cNvPr id="3" name="Content Placeholder 2"/>
+          <p:cNvSpPr>
+            <a:spLocks noGrp="1"/>
+          </p:cNvSpPr>
+          <p:nvPr>
+            <p:ph idx="1"/>
+          </p:nvPr>
+        </p:nvSpPr>
+        <p:spPr/>
+        <p:txBody>
+          <a:bodyPr/>
+          <a:lstStyle/>
+          <a:p/>
+          <a:p>
+            <a:pPr>
+              <a:defRPr sz="2000"/>
+            </a:pPr>
+            <a:r>
+              <a:t>Q：数据保存失败？</a:t>
+            </a:r>
+          </a:p>
+          <a:p>
+            <a:pPr>
+              <a:defRPr sz="2000"/>
+            </a:pPr>
+            <a:r>
+              <a:t>A：检查必填项、数据格式、网络连接</a:t>
+            </a:r>
+          </a:p>
+          <a:p>
+            <a:pPr>
+              <a:defRPr sz="2000"/>
+            </a:pPr>
+          </a:p>
+          <a:p>
+            <a:pPr>
+              <a:defRPr sz="2000"/>
+            </a:pPr>
+            <a:r>
+              <a:t>Q：图片上传失败？</a:t>
+            </a:r>
+          </a:p>
+          <a:p>
+            <a:pPr>
+              <a:defRPr sz="2000"/>
+            </a:pPr>
+            <a:r>
+              <a:t>A：确保图片&lt;2MB，格式为jpg/png/gif</a:t>
+            </a:r>
+          </a:p>
+          <a:p>
+            <a:pPr>
+              <a:defRPr sz="2000"/>
+            </a:pPr>
+          </a:p>
+          <a:p>
+            <a:pPr>
+              <a:defRPr sz="2000"/>
+            </a:pPr>
+            <a:r>
+              <a:t>Q：页面显示异常？</a:t>
+            </a:r>
+          </a:p>
+          <a:p>
+            <a:pPr>
+              <a:defRPr sz="2000"/>
+            </a:pPr>
+            <a:r>
+              <a:t>A：刷新页面(F5)、清除缓存、使用Chrome浏览器</a:t>
+            </a:r>
+          </a:p>
+          <a:p>
+            <a:pPr>
+              <a:defRPr sz="2000"/>
+            </a:pPr>
+          </a:p>
+          <a:p>
+            <a:pPr>
+              <a:defRPr sz="2000"/>
+            </a:pPr>
+            <a:r>
+              <a:t>Q：数据统计不准确？</a:t>
+            </a:r>
+          </a:p>
+          <a:p>
+            <a:pPr>
+              <a:defRPr sz="2000"/>
+            </a:pPr>
+            <a:r>
+              <a:t>A：检查时间范围、筛选条件，数据延迟5分钟内</a:t>
+            </a:r>
+          </a:p>
+        </p:txBody>
+      </p:sp>
+    </p:spTree>
+  </p:cSld>
+  <p:clrMapOvr>
+    <a:masterClrMapping/>
+  </p:clrMapOvr>
+</p:sld>
+</file>
+
+<file path=ppt/slides/slide16.xml><?xml version="1.0" encoding="utf-8"?>
+<p:sld xmlns:a="http://schemas.openxmlformats.org/drawingml/2006/main" xmlns:p="http://schemas.openxmlformats.org/presentationml/2006/main" xmlns:r="http://schemas.openxmlformats.org/officeDocument/2006/relationships">
+  <p:cSld>
+    <p:spTree>
+      <p:nvGrpSpPr>
+        <p:cNvPr id="1" name=""/>
+        <p:cNvGrpSpPr/>
+        <p:nvPr/>
+      </p:nvGrpSpPr>
+      <p:grpSpPr/>
+      <p:sp>
+        <p:nvSpPr>
+          <p:cNvPr id="2" name="Title 1"/>
+          <p:cNvSpPr>
+            <a:spLocks noGrp="1"/>
+          </p:cNvSpPr>
+          <p:nvPr>
+            <p:ph type="title"/>
+          </p:nvPr>
+        </p:nvSpPr>
+        <p:spPr/>
+        <p:txBody>
+          <a:bodyPr/>
+          <a:lstStyle/>
+          <a:p>
+            <a:r>
+              <a:t>六、注意事项</a:t>
+            </a:r>
+          </a:p>
+        </p:txBody>
+      </p:sp>
+      <p:sp>
+        <p:nvSpPr>
+          <p:cNvPr id="3" name="Content Placeholder 2"/>
+          <p:cNvSpPr>
+            <a:spLocks noGrp="1"/>
+          </p:cNvSpPr>
+          <p:nvPr>
+            <p:ph idx="1"/>
+          </p:nvPr>
+        </p:nvSpPr>
+        <p:spPr/>
+        <p:txBody>
+          <a:bodyPr/>
+          <a:lstStyle/>
+          <a:p/>
+          <a:p>
+            <a:pPr>
+              <a:defRPr sz="2000"/>
+            </a:pPr>
+            <a:r>
+              <a:t>安全规范</a:t>
+            </a:r>
+          </a:p>
+          <a:p>
+            <a:pPr lvl="1">
+              <a:defRPr sz="1800"/>
+            </a:pPr>
+            <a:r>
+              <a:t>  ✓ 定期修改密码（建议3个月一次）</a:t>
+            </a:r>
+          </a:p>
+          <a:p>
+            <a:pPr lvl="1">
+              <a:defRPr sz="1800"/>
+            </a:pPr>
+            <a:r>
+              <a:t>  ✓ 不要将账号密码告知他人</a:t>
+            </a:r>
+          </a:p>
+          <a:p>
+            <a:pPr lvl="1">
+              <a:defRPr sz="1800"/>
+            </a:pPr>
+            <a:r>
+              <a:t>  ✓ 使用后及时退出系统</a:t>
+            </a:r>
+          </a:p>
+          <a:p>
+            <a:pPr>
+              <a:defRPr sz="2000"/>
+            </a:pPr>
+          </a:p>
+          <a:p>
+            <a:pPr>
+              <a:defRPr sz="2000"/>
+            </a:pPr>
+            <a:r>
+              <a:t>操作规范</a:t>
+            </a:r>
+          </a:p>
+          <a:p>
+            <a:pPr lvl="1">
+              <a:defRPr sz="1800"/>
+            </a:pPr>
+            <a:r>
+              <a:t>  ✓ 重要操作前仔细核对信息</a:t>
+            </a:r>
+          </a:p>
+          <a:p>
+            <a:pPr lvl="1">
+              <a:defRPr sz="1800"/>
+            </a:pPr>
+            <a:r>
+              <a:t>  ✓ 定期备份重要数据</a:t>
+            </a:r>
+          </a:p>
+          <a:p>
+            <a:pPr lvl="1">
+              <a:defRPr sz="1800"/>
+            </a:pPr>
+            <a:r>
+              <a:t>  ✓ 发现异常及时报告</a:t>
+            </a:r>
+          </a:p>
+          <a:p>
+            <a:pPr>
+              <a:defRPr sz="2000"/>
+            </a:pPr>
+          </a:p>
+          <a:p>
+            <a:pPr>
+              <a:defRPr sz="2000"/>
+            </a:pPr>
+            <a:r>
+              <a:t>数据规范</a:t>
+            </a:r>
+          </a:p>
+          <a:p>
+            <a:pPr lvl="1">
+              <a:defRPr sz="1800"/>
+            </a:pPr>
+            <a:r>
+              <a:t>  ✓ 准确录入数据</a:t>
+            </a:r>
+          </a:p>
+          <a:p>
+            <a:pPr lvl="1">
+              <a:defRPr sz="1800"/>
+            </a:pPr>
+            <a:r>
+              <a:t>  ✓ 保护用户隐私</a:t>
+            </a:r>
+          </a:p>
+          <a:p>
+            <a:pPr lvl="1">
+              <a:defRPr sz="1800"/>
+            </a:pPr>
+            <a:r>
+              <a:t>  ✓ 不随意删除历史数据</a:t>
+            </a:r>
+          </a:p>
+        </p:txBody>
+      </p:sp>
+    </p:spTree>
+  </p:cSld>
+  <p:clrMapOvr>
+    <a:masterClrMapping/>
+  </p:clrMapOvr>
+</p:sld>
+</file>
+
+<file path=ppt/slides/slide17.xml><?xml version="1.0" encoding="utf-8"?>
+<p:sld xmlns:a="http://schemas.openxmlformats.org/drawingml/2006/main" xmlns:p="http://schemas.openxmlformats.org/presentationml/2006/main" xmlns:r="http://schemas.openxmlformats.org/officeDocument/2006/relationships">
+  <p:cSld>
+    <p:spTree>
+      <p:nvGrpSpPr>
+        <p:cNvPr id="1" name=""/>
+        <p:cNvGrpSpPr/>
+        <p:nvPr/>
+      </p:nvGrpSpPr>
+      <p:grpSpPr/>
+      <p:sp>
+        <p:nvSpPr>
+          <p:cNvPr id="2" name="Title 1"/>
+          <p:cNvSpPr>
+            <a:spLocks noGrp="1"/>
+          </p:cNvSpPr>
+          <p:nvPr>
+            <p:ph type="title"/>
+          </p:nvPr>
+        </p:nvSpPr>
+        <p:spPr/>
+        <p:txBody>
+          <a:bodyPr/>
+          <a:lstStyle/>
+          <a:p>
+            <a:r>
+              <a:t>联系方式</a:t>
+            </a:r>
+          </a:p>
+        </p:txBody>
+      </p:sp>
+      <p:sp>
+        <p:nvSpPr>
+          <p:cNvPr id="3" name="Content Placeholder 2"/>
+          <p:cNvSpPr>
+            <a:spLocks noGrp="1"/>
+          </p:cNvSpPr>
+          <p:nvPr>
+            <p:ph idx="1"/>
+          </p:nvPr>
+        </p:nvSpPr>
+        <p:spPr/>
+        <p:txBody>
+          <a:bodyPr/>
+          <a:lstStyle/>
+          <a:p/>
+          <a:p>
+            <a:pPr>
+              <a:defRPr sz="2000"/>
+            </a:pPr>
+            <a:r>
+              <a:t>技术支持</a:t>
+            </a:r>
+          </a:p>
+          <a:p>
+            <a:pPr lvl="1">
+              <a:defRPr sz="1800"/>
+            </a:pPr>
+            <a:r>
+              <a:t>  电话：400-xxx-xxxx</a:t>
+            </a:r>
+          </a:p>
+          <a:p>
+            <a:pPr lvl="1">
+              <a:defRPr sz="1800"/>
+            </a:pPr>
+            <a:r>
+              <a:t>  邮箱：support@bjstarfish.com</a:t>
+            </a:r>
+          </a:p>
+          <a:p>
+            <a:pPr lvl="1">
+              <a:defRPr sz="1800"/>
+            </a:pPr>
+            <a:r>
+              <a:t>  工作时间：周一至周日 9:00-18:00</a:t>
+            </a:r>
+          </a:p>
+          <a:p>
+            <a:pPr>
+              <a:defRPr sz="2000"/>
+            </a:pPr>
+          </a:p>
+          <a:p>
+            <a:pPr>
+              <a:defRPr sz="2000"/>
+            </a:pPr>
+            <a:r>
+              <a:t>运营团队</a:t>
+            </a:r>
+          </a:p>
+          <a:p>
+            <a:pPr lvl="1">
+              <a:defRPr sz="1800"/>
+            </a:pPr>
+            <a:r>
+              <a:t>  电话：010-xxxx-xxxx</a:t>
+            </a:r>
+          </a:p>
+          <a:p>
+            <a:pPr lvl="1">
+              <a:defRPr sz="1800"/>
+            </a:pPr>
+            <a:r>
+              <a:t>  邮箱：operation@bjstarfish.com</a:t>
+            </a:r>
+          </a:p>
+          <a:p>
+            <a:pPr>
+              <a:defRPr sz="2000"/>
+            </a:pPr>
+          </a:p>
+          <a:p>
+            <a:pPr>
+              <a:defRPr sz="2000"/>
+            </a:pPr>
+            <a:r>
+              <a:t>紧急情况请直接拨打客服电话</a:t>
+            </a:r>
+          </a:p>
+        </p:txBody>
+      </p:sp>
+    </p:spTree>
+  </p:cSld>
+  <p:clrMapOvr>
+    <a:masterClrMapping/>
+  </p:clrMapOvr>
+</p:sld>
+</file>
+
+<file path=ppt/slides/slide18.xml><?xml version="1.0" encoding="utf-8"?>
+<p:sld xmlns:a="http://schemas.openxmlformats.org/drawingml/2006/main" xmlns:p="http://schemas.openxmlformats.org/presentationml/2006/main" xmlns:r="http://schemas.openxmlformats.org/officeDocument/2006/relationships">
+  <p:cSld>
+    <p:spTree>
+      <p:nvGrpSpPr>
+        <p:cNvPr id="1" name=""/>
+        <p:cNvGrpSpPr/>
+        <p:nvPr/>
+      </p:nvGrpSpPr>
+      <p:grpSpPr/>
+      <p:sp>
+        <p:nvSpPr>
+          <p:cNvPr id="2" name="Title 1"/>
+          <p:cNvSpPr>
+            <a:spLocks noGrp="1"/>
+          </p:cNvSpPr>
+          <p:nvPr>
+            <p:ph type="title"/>
+          </p:nvPr>
+        </p:nvSpPr>
+        <p:spPr/>
+        <p:txBody>
+          <a:bodyPr/>
+          <a:lstStyle/>
+          <a:p>
+            <a:r>
+              <a:t>培训考核</a:t>
+            </a:r>
+          </a:p>
+        </p:txBody>
+      </p:sp>
+      <p:sp>
+        <p:nvSpPr>
+          <p:cNvPr id="3" name="Content Placeholder 2"/>
+          <p:cNvSpPr>
+            <a:spLocks noGrp="1"/>
+          </p:cNvSpPr>
+          <p:nvPr>
+            <p:ph idx="1"/>
+          </p:nvPr>
+        </p:nvSpPr>
+        <p:spPr/>
+        <p:txBody>
+          <a:bodyPr/>
+          <a:lstStyle/>
+          <a:p/>
+          <a:p>
+            <a:pPr>
+              <a:defRPr sz="2000"/>
+            </a:pPr>
+            <a:r>
+              <a:t>考核方式</a:t>
+            </a:r>
+          </a:p>
+          <a:p>
+            <a:pPr lvl="1">
+              <a:defRPr sz="1800"/>
+            </a:pPr>
+            <a:r>
+              <a:t>  • 理论考试（占40%）</a:t>
+            </a:r>
+          </a:p>
+          <a:p>
+            <a:pPr lvl="1">
+              <a:defRPr sz="1800"/>
+            </a:pPr>
+            <a:r>
+              <a:t>  • 实际操作（占60%）</a:t>
+            </a:r>
+          </a:p>
+          <a:p>
+            <a:pPr>
+              <a:defRPr sz="2000"/>
+            </a:pPr>
+          </a:p>
+          <a:p>
+            <a:pPr>
+              <a:defRPr sz="2000"/>
+            </a:pPr>
+            <a:r>
+              <a:t>考核内容</a:t>
+            </a:r>
+          </a:p>
+          <a:p>
+            <a:pPr lvl="1">
+              <a:defRPr sz="1800"/>
+            </a:pPr>
+            <a:r>
+              <a:t>  • 系统基本操作</a:t>
+            </a:r>
+          </a:p>
+          <a:p>
+            <a:pPr lvl="1">
+              <a:defRPr sz="1800"/>
+            </a:pPr>
+            <a:r>
+              <a:t>  • 业务流程处理</a:t>
+            </a:r>
+          </a:p>
+          <a:p>
+            <a:pPr lvl="1">
+              <a:defRPr sz="1800"/>
+            </a:pPr>
+            <a:r>
+              <a:t>  • 问题处理能力</a:t>
+            </a:r>
+          </a:p>
+          <a:p>
+            <a:pPr>
+              <a:defRPr sz="2000"/>
+            </a:pPr>
+          </a:p>
+          <a:p>
+            <a:pPr>
+              <a:defRPr sz="2000"/>
+            </a:pPr>
+            <a:r>
+              <a:t>合格标准</a:t>
+            </a:r>
+          </a:p>
+          <a:p>
+            <a:pPr lvl="1">
+              <a:defRPr sz="1800"/>
+            </a:pPr>
+            <a:r>
+              <a:t>  • 总分≥80分：合格</a:t>
+            </a:r>
+          </a:p>
+          <a:p>
+            <a:pPr lvl="1">
+              <a:defRPr sz="1800"/>
+            </a:pPr>
+            <a:r>
+              <a:t>  • 总分≥90分：优秀</a:t>
+            </a:r>
+          </a:p>
+        </p:txBody>
+      </p:sp>
+    </p:spTree>
+  </p:cSld>
+  <p:clrMapOvr>
+    <a:masterClrMapping/>
+  </p:clrMapOvr>
+</p:sld>
+</file>
+
+<file path=ppt/slides/slide19.xml><?xml version="1.0" encoding="utf-8"?>
+<p:sld xmlns:a="http://schemas.openxmlformats.org/drawingml/2006/main" xmlns:p="http://schemas.openxmlformats.org/presentationml/2006/main" xmlns:r="http://schemas.openxmlformats.org/officeDocument/2006/relationships">
+  <p:cSld>
+    <p:spTree>
+      <p:nvGrpSpPr>
+        <p:cNvPr id="1" name=""/>
+        <p:cNvGrpSpPr/>
+        <p:nvPr/>
+      </p:nvGrpSpPr>
+      <p:grpSpPr/>
+      <p:sp>
+        <p:nvSpPr>
+          <p:cNvPr id="2" name="Title 1"/>
+          <p:cNvSpPr>
+            <a:spLocks noGrp="1"/>
+          </p:cNvSpPr>
+          <p:nvPr>
+            <p:ph type="ctrTitle"/>
+          </p:nvPr>
+        </p:nvSpPr>
+        <p:spPr/>
+        <p:txBody>
+          <a:bodyPr/>
+          <a:lstStyle/>
+          <a:p>
+            <a:pPr>
+              <a:defRPr sz="4400" b="1"/>
+            </a:pPr>
+            <a:r>
+              <a:t>谢谢！</a:t>
+            </a:r>
+          </a:p>
+        </p:txBody>
+      </p:sp>
+      <p:sp>
+        <p:nvSpPr>
+          <p:cNvPr id="3" name="Subtitle 2"/>
+          <p:cNvSpPr>
+            <a:spLocks noGrp="1"/>
+          </p:cNvSpPr>
+          <p:nvPr>
+            <p:ph type="subTitle" idx="1"/>
+          </p:nvPr>
+        </p:nvSpPr>
+        <p:spPr/>
+        <p:txBody>
+          <a:bodyPr/>
+          <a:lstStyle/>
+          <a:p>
+            <a:pPr>
+              <a:defRPr sz="2400"/>
+            </a:pPr>
+            <a:r>
+              <a:t>祝您工作顺利！</a:t>
+            </a:r>
+          </a:p>
+          <a:p/>
+          <a:p>
+            <a:r>
+              <a:t>如有疑问，请随时联系我们</a:t>
+            </a:r>
+          </a:p>
+        </p:txBody>
+      </p:sp>
+    </p:spTree>
+  </p:cSld>
+  <p:clrMapOvr>
+    <a:masterClrMapping/>
+  </p:clrMapOvr>
+</p:sld>
+</file>
+
+<file path=ppt/slides/slide2.xml><?xml version="1.0" encoding="utf-8"?>
+<p:sld xmlns:a="http://schemas.openxmlformats.org/drawingml/2006/main" xmlns:p="http://schemas.openxmlformats.org/presentationml/2006/main" xmlns:r="http://schemas.openxmlformats.org/officeDocument/2006/relationships">
+  <p:cSld>
+    <p:spTree>
+      <p:nvGrpSpPr>
+        <p:cNvPr id="1" name=""/>
+        <p:cNvGrpSpPr/>
+        <p:nvPr/>
+      </p:nvGrpSpPr>
+      <p:grpSpPr/>
+      <p:sp>
+        <p:nvSpPr>
+          <p:cNvPr id="2" name="Title 1"/>
+          <p:cNvSpPr>
+            <a:spLocks noGrp="1"/>
+          </p:cNvSpPr>
+          <p:nvPr>
+            <p:ph type="title"/>
+          </p:nvPr>
+        </p:nvSpPr>
+        <p:spPr/>
+        <p:txBody>
+          <a:bodyPr/>
+          <a:lstStyle/>
+          <a:p>
+            <a:r>
+              <a:t>培训目标</a:t>
+            </a:r>
+          </a:p>
+        </p:txBody>
+      </p:sp>
+      <p:sp>
+        <p:nvSpPr>
+          <p:cNvPr id="3" name="Content Placeholder 2"/>
+          <p:cNvSpPr>
+            <a:spLocks noGrp="1"/>
+          </p:cNvSpPr>
+          <p:nvPr>
+            <p:ph idx="1"/>
+          </p:nvPr>
+        </p:nvSpPr>
+        <p:spPr/>
+        <p:txBody>
+          <a:bodyPr/>
+          <a:lstStyle/>
+          <a:p/>
+          <a:p>
+            <a:pPr>
+              <a:defRPr sz="2000"/>
+            </a:pPr>
+            <a:r>
+              <a:t>✓ 掌握系统基本操作</a:t>
+            </a:r>
+          </a:p>
+          <a:p>
+            <a:pPr>
+              <a:defRPr sz="2000"/>
+            </a:pPr>
+            <a:r>
+              <a:t>✓ 熟悉各功能模块</a:t>
+            </a:r>
+          </a:p>
+          <a:p>
+            <a:pPr>
+              <a:defRPr sz="2000"/>
+            </a:pPr>
+            <a:r>
+              <a:t>✓ 了解业务流程</a:t>
+            </a:r>
+          </a:p>
+          <a:p>
+            <a:pPr>
+              <a:defRPr sz="2000"/>
+            </a:pPr>
+            <a:r>
+              <a:t>✓ 能够独立完成日常工作</a:t>
+            </a:r>
+          </a:p>
+          <a:p>
+            <a:pPr>
+              <a:defRPr sz="2000"/>
+            </a:pPr>
+            <a:r>
+              <a:t>✓ 掌握常见问题处理方法</a:t>
+            </a:r>
+          </a:p>
+        </p:txBody>
+      </p:sp>
+    </p:spTree>
+  </p:cSld>
+  <p:clrMapOvr>
+    <a:masterClrMapping/>
+  </p:clrMapOvr>
+</p:sld>
+</file>
+
+<file path=ppt/slides/slide3.xml><?xml version="1.0" encoding="utf-8"?>
+<p:sld xmlns:a="http://schemas.openxmlformats.org/drawingml/2006/main" xmlns:p="http://schemas.openxmlformats.org/presentationml/2006/main" xmlns:r="http://schemas.openxmlformats.org/officeDocument/2006/relationships">
+  <p:cSld>
+    <p:spTree>
+      <p:nvGrpSpPr>
+        <p:cNvPr id="1" name=""/>
+        <p:cNvGrpSpPr/>
+        <p:nvPr/>
+      </p:nvGrpSpPr>
+      <p:grpSpPr/>
+      <p:sp>
+        <p:nvSpPr>
+          <p:cNvPr id="2" name="Title 1"/>
+          <p:cNvSpPr>
+            <a:spLocks noGrp="1"/>
+          </p:cNvSpPr>
+          <p:nvPr>
+            <p:ph type="title"/>
+          </p:nvPr>
+        </p:nvSpPr>
+        <p:spPr/>
+        <p:txBody>
+          <a:bodyPr/>
+          <a:lstStyle/>
+          <a:p>
+            <a:r>
+              <a:t>课程大纲</a:t>
+            </a:r>
+          </a:p>
+        </p:txBody>
+      </p:sp>
+      <p:sp>
+        <p:nvSpPr>
+          <p:cNvPr id="3" name="Content Placeholder 2"/>
+          <p:cNvSpPr>
+            <a:spLocks noGrp="1"/>
+          </p:cNvSpPr>
+          <p:nvPr>
+            <p:ph idx="1"/>
+          </p:nvPr>
+        </p:nvSpPr>
+        <p:spPr/>
+        <p:txBody>
+          <a:bodyPr/>
+          <a:lstStyle/>
+          <a:p/>
+          <a:p>
+            <a:pPr>
+              <a:defRPr sz="2000"/>
+            </a:pPr>
+            <a:r>
+              <a:t>第一部分：系统登录与主界面</a:t>
+            </a:r>
+          </a:p>
+          <a:p>
+            <a:pPr>
+              <a:defRPr sz="2000"/>
+            </a:pPr>
+            <a:r>
+              <a:t>第二部分：核心功能模块</a:t>
+            </a:r>
+          </a:p>
+          <a:p>
+            <a:pPr lvl="1">
+              <a:defRPr sz="1800"/>
+            </a:pPr>
+            <a:r>
+              <a:t>  • 活动管理</a:t>
+            </a:r>
+          </a:p>
+          <a:p>
+            <a:pPr lvl="1">
+              <a:defRPr sz="1800"/>
+            </a:pPr>
+            <a:r>
+              <a:t>  • 用户管理</a:t>
+            </a:r>
+          </a:p>
+          <a:p>
+            <a:pPr lvl="1">
+              <a:defRPr sz="1800"/>
+            </a:pPr>
+            <a:r>
+              <a:t>  • 场地管理</a:t>
+            </a:r>
+          </a:p>
+          <a:p>
+            <a:pPr lvl="1">
+              <a:defRPr sz="1800"/>
+            </a:pPr>
+            <a:r>
+              <a:t>  • 财务管理</a:t>
+            </a:r>
+          </a:p>
+          <a:p>
+            <a:pPr lvl="1">
+              <a:defRPr sz="1800"/>
+            </a:pPr>
+            <a:r>
+              <a:t>  • 营销管理</a:t>
+            </a:r>
+          </a:p>
+          <a:p>
+            <a:pPr lvl="1">
+              <a:defRPr sz="1800"/>
+            </a:pPr>
+            <a:r>
+              <a:t>  • 积分管理</a:t>
+            </a:r>
+          </a:p>
+          <a:p>
+            <a:pPr lvl="1">
+              <a:defRPr sz="1800"/>
+            </a:pPr>
+            <a:r>
+              <a:t>  • 数据分析</a:t>
+            </a:r>
+          </a:p>
+          <a:p>
+            <a:pPr>
+              <a:defRPr sz="2000"/>
+            </a:pPr>
+            <a:r>
+              <a:t>第三部分：常见问题与技巧</a:t>
+            </a:r>
+          </a:p>
+        </p:txBody>
+      </p:sp>
+    </p:spTree>
+  </p:cSld>
+  <p:clrMapOvr>
+    <a:masterClrMapping/>
+  </p:clrMapOvr>
+</p:sld>
+</file>
+
+<file path=ppt/slides/slide4.xml><?xml version="1.0" encoding="utf-8"?>
+<p:sld xmlns:a="http://schemas.openxmlformats.org/drawingml/2006/main" xmlns:p="http://schemas.openxmlformats.org/presentationml/2006/main" xmlns:r="http://schemas.openxmlformats.org/officeDocument/2006/relationships">
+  <p:cSld>
+    <p:spTree>
+      <p:nvGrpSpPr>
+        <p:cNvPr id="1" name=""/>
+        <p:cNvGrpSpPr/>
+        <p:nvPr/>
+      </p:nvGrpSpPr>
+      <p:grpSpPr/>
+      <p:sp>
+        <p:nvSpPr>
+          <p:cNvPr id="2" name="Title 1"/>
+          <p:cNvSpPr>
+            <a:spLocks noGrp="1"/>
+          </p:cNvSpPr>
+          <p:nvPr>
+            <p:ph type="title"/>
+          </p:nvPr>
+        </p:nvSpPr>
+        <p:spPr/>
+        <p:txBody>
+          <a:bodyPr/>
+          <a:lstStyle/>
           <a:p/>
         </p:txBody>
       </p:sp>
@@ -3731,14 +4743,14 @@
               <a:defRPr sz="3200" b="1"/>
             </a:pPr>
             <a:r>
-              <a:t>场地列表页面</a:t>
+              <a:t>一、系统登录</a:t>
             </a:r>
           </a:p>
         </p:txBody>
       </p:sp>
       <p:pic>
         <p:nvPicPr>
-          <p:cNvPr id="4" name="Picture 3" descr="16_venue_list.png"/>
+          <p:cNvPr id="4" name="Picture 3" descr="01_login.png"/>
           <p:cNvPicPr>
             <a:picLocks noChangeAspect="1"/>
           </p:cNvPicPr>
@@ -3786,7 +4798,7 @@
               <a:defRPr sz="1600"/>
             </a:pPr>
             <a:r>
-              <a:t>管理各类场地资源和配置</a:t>
+              <a:t>访问系统地址，输入用户名和密码登录</a:t>
             </a:r>
           </a:p>
         </p:txBody>
@@ -3799,7 +4811,7 @@
 </p:sld>
 </file>
 
-<file path=ppt/slides/slide15.xml><?xml version="1.0" encoding="utf-8"?>
+<file path=ppt/slides/slide5.xml><?xml version="1.0" encoding="utf-8"?>
 <p:sld xmlns:a="http://schemas.openxmlformats.org/drawingml/2006/main" xmlns:p="http://schemas.openxmlformats.org/presentationml/2006/main" xmlns:r="http://schemas.openxmlformats.org/officeDocument/2006/relationships">
   <p:cSld>
     <p:spTree>
@@ -3852,14 +4864,14 @@
               <a:defRPr sz="3200" b="1"/>
             </a:pPr>
             <a:r>
-              <a:t>场地订单页面</a:t>
+              <a:t>系统主界面</a:t>
             </a:r>
           </a:p>
         </p:txBody>
       </p:sp>
       <p:pic>
         <p:nvPicPr>
-          <p:cNvPr id="4" name="Picture 3" descr="18_venue_orders.png"/>
+          <p:cNvPr id="4" name="Picture 3" descr="02_dashboard.png"/>
           <p:cNvPicPr>
             <a:picLocks noChangeAspect="1"/>
           </p:cNvPicPr>
@@ -3907,7 +4919,7 @@
               <a:defRPr sz="1600"/>
             </a:pPr>
             <a:r>
-              <a:t>处理用户的场地预订订单</a:t>
+              <a:t>左侧菜单栏导航，右侧工作区显示内容</a:t>
             </a:r>
           </a:p>
         </p:txBody>
@@ -3920,7 +4932,7 @@
 </p:sld>
 </file>
 
-<file path=ppt/slides/slide16.xml><?xml version="1.0" encoding="utf-8"?>
+<file path=ppt/slides/slide6.xml><?xml version="1.0" encoding="utf-8"?>
 <p:sld xmlns:a="http://schemas.openxmlformats.org/drawingml/2006/main" xmlns:p="http://schemas.openxmlformats.org/presentationml/2006/main" xmlns:r="http://schemas.openxmlformats.org/officeDocument/2006/relationships">
   <p:cSld>
     <p:spTree>
@@ -3946,7 +4958,7 @@
           <a:lstStyle/>
           <a:p>
             <a:r>
-              <a:t>六、财务管理</a:t>
+              <a:t>二、核心功能模块</a:t>
             </a:r>
           </a:p>
         </p:txBody>
@@ -3971,7 +4983,7 @@
               <a:defRPr sz="2000"/>
             </a:pPr>
             <a:r>
-              <a:t>商户结算审核</a:t>
+              <a:t>1. 活动管理</a:t>
             </a:r>
           </a:p>
           <a:p>
@@ -3979,7 +4991,7 @@
               <a:defRPr sz="1800"/>
             </a:pPr>
             <a:r>
-              <a:t>  - 审核商户结算申请</a:t>
+              <a:t>   • 活动列表：发布、编辑、管理活动</a:t>
             </a:r>
           </a:p>
           <a:p>
@@ -3987,7 +4999,20 @@
               <a:defRPr sz="1800"/>
             </a:pPr>
             <a:r>
-              <a:t>  - 确认结算金额</a:t>
+              <a:t>   • 套票列表：管理组合套票</a:t>
+            </a:r>
+          </a:p>
+          <a:p>
+            <a:pPr>
+              <a:defRPr sz="2000"/>
+            </a:pPr>
+          </a:p>
+          <a:p>
+            <a:pPr>
+              <a:defRPr sz="2000"/>
+            </a:pPr>
+            <a:r>
+              <a:t>2. 用户管理</a:t>
             </a:r>
           </a:p>
           <a:p>
@@ -3995,20 +5020,7 @@
               <a:defRPr sz="1800"/>
             </a:pPr>
             <a:r>
-              <a:t>  - 发起转账</a:t>
-            </a:r>
-          </a:p>
-          <a:p>
-            <a:pPr>
-              <a:defRPr sz="2000"/>
-            </a:pPr>
-          </a:p>
-          <a:p>
-            <a:pPr>
-              <a:defRPr sz="2000"/>
-            </a:pPr>
-            <a:r>
-              <a:t>财务报表</a:t>
+              <a:t>   • 普通用户：用户信息、订单查询</a:t>
             </a:r>
           </a:p>
           <a:p>
@@ -4016,7 +5028,20 @@
               <a:defRPr sz="1800"/>
             </a:pPr>
             <a:r>
-              <a:t>  - 查看收入统计</a:t>
+              <a:t>   • 员工管理：账号管理、权限分配</a:t>
+            </a:r>
+          </a:p>
+          <a:p>
+            <a:pPr>
+              <a:defRPr sz="2000"/>
+            </a:pPr>
+          </a:p>
+          <a:p>
+            <a:pPr>
+              <a:defRPr sz="2000"/>
+            </a:pPr>
+            <a:r>
+              <a:t>3. 场地管理</a:t>
             </a:r>
           </a:p>
           <a:p>
@@ -4024,7 +5049,7 @@
               <a:defRPr sz="1800"/>
             </a:pPr>
             <a:r>
-              <a:t>  - 导出财务报表</a:t>
+              <a:t>   • 场地列表：场地信息配置</a:t>
             </a:r>
           </a:p>
           <a:p>
@@ -4032,7 +5057,7 @@
               <a:defRPr sz="1800"/>
             </a:pPr>
             <a:r>
-              <a:t>  - 利润分析</a:t>
+              <a:t>   • 场地订单：预订处理</a:t>
             </a:r>
           </a:p>
         </p:txBody>
@@ -4045,7 +5070,7 @@
 </p:sld>
 </file>
 
-<file path=ppt/slides/slide17.xml><?xml version="1.0" encoding="utf-8"?>
+<file path=ppt/slides/slide7.xml><?xml version="1.0" encoding="utf-8"?>
 <p:sld xmlns:a="http://schemas.openxmlformats.org/drawingml/2006/main" xmlns:p="http://schemas.openxmlformats.org/presentationml/2006/main" xmlns:r="http://schemas.openxmlformats.org/officeDocument/2006/relationships">
   <p:cSld>
     <p:spTree>
@@ -4098,14 +5123,14 @@
               <a:defRPr sz="3200" b="1"/>
             </a:pPr>
             <a:r>
-              <a:t>商户结算审核</a:t>
+              <a:t>活动管理</a:t>
             </a:r>
           </a:p>
         </p:txBody>
       </p:sp>
       <p:pic>
         <p:nvPicPr>
-          <p:cNvPr id="4" name="Picture 3" descr="19_settlement.png"/>
+          <p:cNvPr id="4" name="Picture 3" descr="03_activity.png"/>
           <p:cNvPicPr>
             <a:picLocks noChangeAspect="1"/>
           </p:cNvPicPr>
@@ -4153,7 +5178,7 @@
               <a:defRPr sz="1600"/>
             </a:pPr>
             <a:r>
-              <a:t>审核并处理商户的结算申请</a:t>
+              <a:t>管理活动和套票，查询、新增、编辑、删除操作</a:t>
             </a:r>
           </a:p>
         </p:txBody>
@@ -4166,132 +5191,7 @@
 </p:sld>
 </file>
 
-<file path=ppt/slides/slide18.xml><?xml version="1.0" encoding="utf-8"?>
-<p:sld xmlns:a="http://schemas.openxmlformats.org/drawingml/2006/main" xmlns:p="http://schemas.openxmlformats.org/presentationml/2006/main" xmlns:r="http://schemas.openxmlformats.org/officeDocument/2006/relationships">
-  <p:cSld>
-    <p:spTree>
-      <p:nvGrpSpPr>
-        <p:cNvPr id="1" name=""/>
-        <p:cNvGrpSpPr/>
-        <p:nvPr/>
-      </p:nvGrpSpPr>
-      <p:grpSpPr/>
-      <p:sp>
-        <p:nvSpPr>
-          <p:cNvPr id="2" name="Title 1"/>
-          <p:cNvSpPr>
-            <a:spLocks noGrp="1"/>
-          </p:cNvSpPr>
-          <p:nvPr>
-            <p:ph type="title"/>
-          </p:nvPr>
-        </p:nvSpPr>
-        <p:spPr/>
-        <p:txBody>
-          <a:bodyPr/>
-          <a:lstStyle/>
-          <a:p>
-            <a:r>
-              <a:t>七、营销管理</a:t>
-            </a:r>
-          </a:p>
-        </p:txBody>
-      </p:sp>
-      <p:sp>
-        <p:nvSpPr>
-          <p:cNvPr id="3" name="Content Placeholder 2"/>
-          <p:cNvSpPr>
-            <a:spLocks noGrp="1"/>
-          </p:cNvSpPr>
-          <p:nvPr>
-            <p:ph idx="1"/>
-          </p:nvPr>
-        </p:nvSpPr>
-        <p:spPr/>
-        <p:txBody>
-          <a:bodyPr/>
-          <a:lstStyle/>
-          <a:p/>
-          <a:p>
-            <a:pPr>
-              <a:defRPr sz="2000"/>
-            </a:pPr>
-            <a:r>
-              <a:t>Banner管理</a:t>
-            </a:r>
-          </a:p>
-          <a:p>
-            <a:pPr lvl="1">
-              <a:defRPr sz="1800"/>
-            </a:pPr>
-            <a:r>
-              <a:t>  - 配置首页轮播图</a:t>
-            </a:r>
-          </a:p>
-          <a:p>
-            <a:pPr lvl="1">
-              <a:defRPr sz="1800"/>
-            </a:pPr>
-            <a:r>
-              <a:t>  - 设置跳转链接</a:t>
-            </a:r>
-          </a:p>
-          <a:p>
-            <a:pPr lvl="1">
-              <a:defRPr sz="1800"/>
-            </a:pPr>
-            <a:r>
-              <a:t>  - 调整显示顺序</a:t>
-            </a:r>
-          </a:p>
-          <a:p>
-            <a:pPr>
-              <a:defRPr sz="2000"/>
-            </a:pPr>
-          </a:p>
-          <a:p>
-            <a:pPr>
-              <a:defRPr sz="2000"/>
-            </a:pPr>
-            <a:r>
-              <a:t>优惠券管理</a:t>
-            </a:r>
-          </a:p>
-          <a:p>
-            <a:pPr lvl="1">
-              <a:defRPr sz="1800"/>
-            </a:pPr>
-            <a:r>
-              <a:t>  - 创建各类优惠券</a:t>
-            </a:r>
-          </a:p>
-          <a:p>
-            <a:pPr lvl="1">
-              <a:defRPr sz="1800"/>
-            </a:pPr>
-            <a:r>
-              <a:t>  - 发放优惠券</a:t>
-            </a:r>
-          </a:p>
-          <a:p>
-            <a:pPr lvl="1">
-              <a:defRPr sz="1800"/>
-            </a:pPr>
-            <a:r>
-              <a:t>  - 查看使用情况</a:t>
-            </a:r>
-          </a:p>
-        </p:txBody>
-      </p:sp>
-    </p:spTree>
-  </p:cSld>
-  <p:clrMapOvr>
-    <a:masterClrMapping/>
-  </p:clrMapOvr>
-</p:sld>
-</file>
-
-<file path=ppt/slides/slide19.xml><?xml version="1.0" encoding="utf-8"?>
+<file path=ppt/slides/slide8.xml><?xml version="1.0" encoding="utf-8"?>
 <p:sld xmlns:a="http://schemas.openxmlformats.org/drawingml/2006/main" xmlns:p="http://schemas.openxmlformats.org/presentationml/2006/main" xmlns:r="http://schemas.openxmlformats.org/officeDocument/2006/relationships">
   <p:cSld>
     <p:spTree>
@@ -4344,14 +5244,14 @@
               <a:defRPr sz="3200" b="1"/>
             </a:pPr>
             <a:r>
-              <a:t>Banner管理页面</a:t>
+              <a:t>用户管理</a:t>
             </a:r>
           </a:p>
         </p:txBody>
       </p:sp>
       <p:pic>
         <p:nvPicPr>
-          <p:cNvPr id="4" name="Picture 3" descr="21_banner.png"/>
+          <p:cNvPr id="4" name="Picture 3" descr="04_users.png"/>
           <p:cNvPicPr>
             <a:picLocks noChangeAspect="1"/>
           </p:cNvPicPr>
@@ -4399,2394 +5299,7 @@
               <a:defRPr sz="1600"/>
             </a:pPr>
             <a:r>
-              <a:t>管理小程序首页轮播Banner</a:t>
-            </a:r>
-          </a:p>
-        </p:txBody>
-      </p:sp>
-    </p:spTree>
-  </p:cSld>
-  <p:clrMapOvr>
-    <a:masterClrMapping/>
-  </p:clrMapOvr>
-</p:sld>
-</file>
-
-<file path=ppt/slides/slide2.xml><?xml version="1.0" encoding="utf-8"?>
-<p:sld xmlns:a="http://schemas.openxmlformats.org/drawingml/2006/main" xmlns:p="http://schemas.openxmlformats.org/presentationml/2006/main" xmlns:r="http://schemas.openxmlformats.org/officeDocument/2006/relationships">
-  <p:cSld>
-    <p:spTree>
-      <p:nvGrpSpPr>
-        <p:cNvPr id="1" name=""/>
-        <p:cNvGrpSpPr/>
-        <p:nvPr/>
-      </p:nvGrpSpPr>
-      <p:grpSpPr/>
-      <p:sp>
-        <p:nvSpPr>
-          <p:cNvPr id="2" name="Title 1"/>
-          <p:cNvSpPr>
-            <a:spLocks noGrp="1"/>
-          </p:cNvSpPr>
-          <p:nvPr>
-            <p:ph type="title"/>
-          </p:nvPr>
-        </p:nvSpPr>
-        <p:spPr/>
-        <p:txBody>
-          <a:bodyPr/>
-          <a:lstStyle/>
-          <a:p>
-            <a:r>
-              <a:t>课程大纲</a:t>
-            </a:r>
-          </a:p>
-        </p:txBody>
-      </p:sp>
-      <p:sp>
-        <p:nvSpPr>
-          <p:cNvPr id="3" name="Content Placeholder 2"/>
-          <p:cNvSpPr>
-            <a:spLocks noGrp="1"/>
-          </p:cNvSpPr>
-          <p:nvPr>
-            <p:ph idx="1"/>
-          </p:nvPr>
-        </p:nvSpPr>
-        <p:spPr/>
-        <p:txBody>
-          <a:bodyPr/>
-          <a:lstStyle/>
-          <a:p/>
-          <a:p>
-            <a:pPr>
-              <a:defRPr sz="2000"/>
-            </a:pPr>
-            <a:r>
-              <a:t>1. 系统概述</a:t>
-            </a:r>
-          </a:p>
-          <a:p>
-            <a:pPr>
-              <a:defRPr sz="2000"/>
-            </a:pPr>
-            <a:r>
-              <a:t>2. 系统登录</a:t>
-            </a:r>
-          </a:p>
-          <a:p>
-            <a:pPr>
-              <a:defRPr sz="2000"/>
-            </a:pPr>
-            <a:r>
-              <a:t>3. 活动管理</a:t>
-            </a:r>
-          </a:p>
-          <a:p>
-            <a:pPr>
-              <a:defRPr sz="2000"/>
-            </a:pPr>
-            <a:r>
-              <a:t>4. 用户管理</a:t>
-            </a:r>
-          </a:p>
-          <a:p>
-            <a:pPr>
-              <a:defRPr sz="2000"/>
-            </a:pPr>
-            <a:r>
-              <a:t>5. 场地管理</a:t>
-            </a:r>
-          </a:p>
-          <a:p>
-            <a:pPr>
-              <a:defRPr sz="2000"/>
-            </a:pPr>
-            <a:r>
-              <a:t>6. 财务管理</a:t>
-            </a:r>
-          </a:p>
-          <a:p>
-            <a:pPr>
-              <a:defRPr sz="2000"/>
-            </a:pPr>
-            <a:r>
-              <a:t>7. 营销管理</a:t>
-            </a:r>
-          </a:p>
-          <a:p>
-            <a:pPr>
-              <a:defRPr sz="2000"/>
-            </a:pPr>
-            <a:r>
-              <a:t>8. 积分管理</a:t>
-            </a:r>
-          </a:p>
-          <a:p>
-            <a:pPr>
-              <a:defRPr sz="2000"/>
-            </a:pPr>
-            <a:r>
-              <a:t>9. 数据分析</a:t>
-            </a:r>
-          </a:p>
-          <a:p>
-            <a:pPr>
-              <a:defRPr sz="2000"/>
-            </a:pPr>
-            <a:r>
-              <a:t>10. 常见问题</a:t>
-            </a:r>
-          </a:p>
-        </p:txBody>
-      </p:sp>
-    </p:spTree>
-  </p:cSld>
-  <p:clrMapOvr>
-    <a:masterClrMapping/>
-  </p:clrMapOvr>
-</p:sld>
-</file>
-
-<file path=ppt/slides/slide20.xml><?xml version="1.0" encoding="utf-8"?>
-<p:sld xmlns:a="http://schemas.openxmlformats.org/drawingml/2006/main" xmlns:p="http://schemas.openxmlformats.org/presentationml/2006/main" xmlns:r="http://schemas.openxmlformats.org/officeDocument/2006/relationships">
-  <p:cSld>
-    <p:spTree>
-      <p:nvGrpSpPr>
-        <p:cNvPr id="1" name=""/>
-        <p:cNvGrpSpPr/>
-        <p:nvPr/>
-      </p:nvGrpSpPr>
-      <p:grpSpPr/>
-      <p:sp>
-        <p:nvSpPr>
-          <p:cNvPr id="2" name="Title 1"/>
-          <p:cNvSpPr>
-            <a:spLocks noGrp="1"/>
-          </p:cNvSpPr>
-          <p:nvPr>
-            <p:ph type="title"/>
-          </p:nvPr>
-        </p:nvSpPr>
-        <p:spPr/>
-        <p:txBody>
-          <a:bodyPr/>
-          <a:lstStyle/>
-          <a:p/>
-        </p:txBody>
-      </p:sp>
-      <p:sp>
-        <p:nvSpPr>
-          <p:cNvPr id="3" name="TextBox 2"/>
-          <p:cNvSpPr txBox="1"/>
-          <p:nvPr/>
-        </p:nvSpPr>
-        <p:spPr>
-          <a:xfrm>
-            <a:off x="457200" y="457200"/>
-            <a:ext cx="8229600" cy="731520"/>
-          </a:xfrm>
-          <a:prstGeom prst="rect">
-            <a:avLst/>
-          </a:prstGeom>
-          <a:noFill/>
-        </p:spPr>
-        <p:txBody>
-          <a:bodyPr wrap="none">
-            <a:spAutoFit/>
-          </a:bodyPr>
-          <a:lstStyle/>
-          <a:p>
-            <a:pPr>
-              <a:defRPr sz="3200" b="1"/>
-            </a:pPr>
-            <a:r>
-              <a:t>优惠券列表页面</a:t>
-            </a:r>
-          </a:p>
-        </p:txBody>
-      </p:sp>
-      <p:pic>
-        <p:nvPicPr>
-          <p:cNvPr id="4" name="Picture 3" descr="22_coupons.png"/>
-          <p:cNvPicPr>
-            <a:picLocks noChangeAspect="1"/>
-          </p:cNvPicPr>
-          <p:nvPr/>
-        </p:nvPicPr>
-        <p:blipFill>
-          <a:blip r:embed="rId2"/>
-          <a:stretch>
-            <a:fillRect/>
-          </a:stretch>
-        </p:blipFill>
-        <p:spPr>
-          <a:xfrm>
-            <a:off x="914400" y="1371600"/>
-            <a:ext cx="8128000" cy="4572000"/>
-          </a:xfrm>
-          <a:prstGeom prst="rect">
-            <a:avLst/>
-          </a:prstGeom>
-        </p:spPr>
-      </p:pic>
-      <p:sp>
-        <p:nvSpPr>
-          <p:cNvPr id="5" name="TextBox 4"/>
-          <p:cNvSpPr txBox="1"/>
-          <p:nvPr/>
-        </p:nvSpPr>
-        <p:spPr>
-          <a:xfrm>
-            <a:off x="457200" y="6217920"/>
-            <a:ext cx="8229600" cy="548640"/>
-          </a:xfrm>
-          <a:prstGeom prst="rect">
-            <a:avLst/>
-          </a:prstGeom>
-          <a:noFill/>
-        </p:spPr>
-        <p:txBody>
-          <a:bodyPr wrap="none">
-            <a:spAutoFit/>
-          </a:bodyPr>
-          <a:lstStyle/>
-          <a:p>
-            <a:pPr>
-              <a:defRPr sz="1600"/>
-            </a:pPr>
-            <a:r>
-              <a:t>创建和管理各类优惠券</a:t>
-            </a:r>
-          </a:p>
-        </p:txBody>
-      </p:sp>
-    </p:spTree>
-  </p:cSld>
-  <p:clrMapOvr>
-    <a:masterClrMapping/>
-  </p:clrMapOvr>
-</p:sld>
-</file>
-
-<file path=ppt/slides/slide21.xml><?xml version="1.0" encoding="utf-8"?>
-<p:sld xmlns:a="http://schemas.openxmlformats.org/drawingml/2006/main" xmlns:p="http://schemas.openxmlformats.org/presentationml/2006/main" xmlns:r="http://schemas.openxmlformats.org/officeDocument/2006/relationships">
-  <p:cSld>
-    <p:spTree>
-      <p:nvGrpSpPr>
-        <p:cNvPr id="1" name=""/>
-        <p:cNvGrpSpPr/>
-        <p:nvPr/>
-      </p:nvGrpSpPr>
-      <p:grpSpPr/>
-      <p:sp>
-        <p:nvSpPr>
-          <p:cNvPr id="2" name="Title 1"/>
-          <p:cNvSpPr>
-            <a:spLocks noGrp="1"/>
-          </p:cNvSpPr>
-          <p:nvPr>
-            <p:ph type="title"/>
-          </p:nvPr>
-        </p:nvSpPr>
-        <p:spPr/>
-        <p:txBody>
-          <a:bodyPr/>
-          <a:lstStyle/>
-          <a:p>
-            <a:r>
-              <a:t>八、积分管理</a:t>
-            </a:r>
-          </a:p>
-        </p:txBody>
-      </p:sp>
-      <p:sp>
-        <p:nvSpPr>
-          <p:cNvPr id="3" name="Content Placeholder 2"/>
-          <p:cNvSpPr>
-            <a:spLocks noGrp="1"/>
-          </p:cNvSpPr>
-          <p:nvPr>
-            <p:ph idx="1"/>
-          </p:nvPr>
-        </p:nvSpPr>
-        <p:spPr/>
-        <p:txBody>
-          <a:bodyPr/>
-          <a:lstStyle/>
-          <a:p/>
-          <a:p>
-            <a:pPr>
-              <a:defRPr sz="2000"/>
-            </a:pPr>
-            <a:r>
-              <a:t>规则设置</a:t>
-            </a:r>
-          </a:p>
-          <a:p>
-            <a:pPr lvl="1">
-              <a:defRPr sz="1800"/>
-            </a:pPr>
-            <a:r>
-              <a:t>  - 配置积分获取规则</a:t>
-            </a:r>
-          </a:p>
-          <a:p>
-            <a:pPr lvl="1">
-              <a:defRPr sz="1800"/>
-            </a:pPr>
-            <a:r>
-              <a:t>  - 设置积分消耗规则</a:t>
-            </a:r>
-          </a:p>
-          <a:p>
-            <a:pPr lvl="1">
-              <a:defRPr sz="1800"/>
-            </a:pPr>
-            <a:r>
-              <a:t>  - 积分有效期管理</a:t>
-            </a:r>
-          </a:p>
-          <a:p>
-            <a:pPr>
-              <a:defRPr sz="2000"/>
-            </a:pPr>
-          </a:p>
-          <a:p>
-            <a:pPr>
-              <a:defRPr sz="2000"/>
-            </a:pPr>
-            <a:r>
-              <a:t>积分商城</a:t>
-            </a:r>
-          </a:p>
-          <a:p>
-            <a:pPr lvl="1">
-              <a:defRPr sz="1800"/>
-            </a:pPr>
-            <a:r>
-              <a:t>  - 管理兑换商品</a:t>
-            </a:r>
-          </a:p>
-          <a:p>
-            <a:pPr lvl="1">
-              <a:defRPr sz="1800"/>
-            </a:pPr>
-            <a:r>
-              <a:t>  - 设置兑换价格</a:t>
-            </a:r>
-          </a:p>
-          <a:p>
-            <a:pPr>
-              <a:defRPr sz="2000"/>
-            </a:pPr>
-          </a:p>
-          <a:p>
-            <a:pPr>
-              <a:defRPr sz="2000"/>
-            </a:pPr>
-            <a:r>
-              <a:t>积分订单</a:t>
-            </a:r>
-          </a:p>
-          <a:p>
-            <a:pPr lvl="1">
-              <a:defRPr sz="1800"/>
-            </a:pPr>
-            <a:r>
-              <a:t>  - 处理兑换订单</a:t>
-            </a:r>
-          </a:p>
-          <a:p>
-            <a:pPr lvl="1">
-              <a:defRPr sz="1800"/>
-            </a:pPr>
-            <a:r>
-              <a:t>  - 订单发货</a:t>
-            </a:r>
-          </a:p>
-        </p:txBody>
-      </p:sp>
-    </p:spTree>
-  </p:cSld>
-  <p:clrMapOvr>
-    <a:masterClrMapping/>
-  </p:clrMapOvr>
-</p:sld>
-</file>
-
-<file path=ppt/slides/slide22.xml><?xml version="1.0" encoding="utf-8"?>
-<p:sld xmlns:a="http://schemas.openxmlformats.org/drawingml/2006/main" xmlns:p="http://schemas.openxmlformats.org/presentationml/2006/main" xmlns:r="http://schemas.openxmlformats.org/officeDocument/2006/relationships">
-  <p:cSld>
-    <p:spTree>
-      <p:nvGrpSpPr>
-        <p:cNvPr id="1" name=""/>
-        <p:cNvGrpSpPr/>
-        <p:nvPr/>
-      </p:nvGrpSpPr>
-      <p:grpSpPr/>
-      <p:sp>
-        <p:nvSpPr>
-          <p:cNvPr id="2" name="Title 1"/>
-          <p:cNvSpPr>
-            <a:spLocks noGrp="1"/>
-          </p:cNvSpPr>
-          <p:nvPr>
-            <p:ph type="title"/>
-          </p:nvPr>
-        </p:nvSpPr>
-        <p:spPr/>
-        <p:txBody>
-          <a:bodyPr/>
-          <a:lstStyle/>
-          <a:p/>
-        </p:txBody>
-      </p:sp>
-      <p:sp>
-        <p:nvSpPr>
-          <p:cNvPr id="3" name="TextBox 2"/>
-          <p:cNvSpPr txBox="1"/>
-          <p:nvPr/>
-        </p:nvSpPr>
-        <p:spPr>
-          <a:xfrm>
-            <a:off x="457200" y="457200"/>
-            <a:ext cx="8229600" cy="731520"/>
-          </a:xfrm>
-          <a:prstGeom prst="rect">
-            <a:avLst/>
-          </a:prstGeom>
-          <a:noFill/>
-        </p:spPr>
-        <p:txBody>
-          <a:bodyPr wrap="none">
-            <a:spAutoFit/>
-          </a:bodyPr>
-          <a:lstStyle/>
-          <a:p>
-            <a:pPr>
-              <a:defRPr sz="3200" b="1"/>
-            </a:pPr>
-            <a:r>
-              <a:t>积分规则设置</a:t>
-            </a:r>
-          </a:p>
-        </p:txBody>
-      </p:sp>
-      <p:pic>
-        <p:nvPicPr>
-          <p:cNvPr id="4" name="Picture 3" descr="23_points_rules.png"/>
-          <p:cNvPicPr>
-            <a:picLocks noChangeAspect="1"/>
-          </p:cNvPicPr>
-          <p:nvPr/>
-        </p:nvPicPr>
-        <p:blipFill>
-          <a:blip r:embed="rId2"/>
-          <a:stretch>
-            <a:fillRect/>
-          </a:stretch>
-        </p:blipFill>
-        <p:spPr>
-          <a:xfrm>
-            <a:off x="914400" y="1371600"/>
-            <a:ext cx="8128000" cy="4572000"/>
-          </a:xfrm>
-          <a:prstGeom prst="rect">
-            <a:avLst/>
-          </a:prstGeom>
-        </p:spPr>
-      </p:pic>
-      <p:sp>
-        <p:nvSpPr>
-          <p:cNvPr id="5" name="TextBox 4"/>
-          <p:cNvSpPr txBox="1"/>
-          <p:nvPr/>
-        </p:nvSpPr>
-        <p:spPr>
-          <a:xfrm>
-            <a:off x="457200" y="6217920"/>
-            <a:ext cx="8229600" cy="548640"/>
-          </a:xfrm>
-          <a:prstGeom prst="rect">
-            <a:avLst/>
-          </a:prstGeom>
-          <a:noFill/>
-        </p:spPr>
-        <p:txBody>
-          <a:bodyPr wrap="none">
-            <a:spAutoFit/>
-          </a:bodyPr>
-          <a:lstStyle/>
-          <a:p>
-            <a:pPr>
-              <a:defRPr sz="1600"/>
-            </a:pPr>
-            <a:r>
-              <a:t>配置积分获取和使用规则</a:t>
-            </a:r>
-          </a:p>
-        </p:txBody>
-      </p:sp>
-    </p:spTree>
-  </p:cSld>
-  <p:clrMapOvr>
-    <a:masterClrMapping/>
-  </p:clrMapOvr>
-</p:sld>
-</file>
-
-<file path=ppt/slides/slide23.xml><?xml version="1.0" encoding="utf-8"?>
-<p:sld xmlns:a="http://schemas.openxmlformats.org/drawingml/2006/main" xmlns:p="http://schemas.openxmlformats.org/presentationml/2006/main" xmlns:r="http://schemas.openxmlformats.org/officeDocument/2006/relationships">
-  <p:cSld>
-    <p:spTree>
-      <p:nvGrpSpPr>
-        <p:cNvPr id="1" name=""/>
-        <p:cNvGrpSpPr/>
-        <p:nvPr/>
-      </p:nvGrpSpPr>
-      <p:grpSpPr/>
-      <p:sp>
-        <p:nvSpPr>
-          <p:cNvPr id="2" name="Title 1"/>
-          <p:cNvSpPr>
-            <a:spLocks noGrp="1"/>
-          </p:cNvSpPr>
-          <p:nvPr>
-            <p:ph type="title"/>
-          </p:nvPr>
-        </p:nvSpPr>
-        <p:spPr/>
-        <p:txBody>
-          <a:bodyPr/>
-          <a:lstStyle/>
-          <a:p/>
-        </p:txBody>
-      </p:sp>
-      <p:sp>
-        <p:nvSpPr>
-          <p:cNvPr id="3" name="TextBox 2"/>
-          <p:cNvSpPr txBox="1"/>
-          <p:nvPr/>
-        </p:nvSpPr>
-        <p:spPr>
-          <a:xfrm>
-            <a:off x="457200" y="457200"/>
-            <a:ext cx="8229600" cy="731520"/>
-          </a:xfrm>
-          <a:prstGeom prst="rect">
-            <a:avLst/>
-          </a:prstGeom>
-          <a:noFill/>
-        </p:spPr>
-        <p:txBody>
-          <a:bodyPr wrap="none">
-            <a:spAutoFit/>
-          </a:bodyPr>
-          <a:lstStyle/>
-          <a:p>
-            <a:pPr>
-              <a:defRPr sz="3200" b="1"/>
-            </a:pPr>
-            <a:r>
-              <a:t>积分订单管理</a:t>
-            </a:r>
-          </a:p>
-        </p:txBody>
-      </p:sp>
-      <p:pic>
-        <p:nvPicPr>
-          <p:cNvPr id="4" name="Picture 3" descr="25_points_orders.png"/>
-          <p:cNvPicPr>
-            <a:picLocks noChangeAspect="1"/>
-          </p:cNvPicPr>
-          <p:nvPr/>
-        </p:nvPicPr>
-        <p:blipFill>
-          <a:blip r:embed="rId2"/>
-          <a:stretch>
-            <a:fillRect/>
-          </a:stretch>
-        </p:blipFill>
-        <p:spPr>
-          <a:xfrm>
-            <a:off x="914400" y="1371600"/>
-            <a:ext cx="8128000" cy="4572000"/>
-          </a:xfrm>
-          <a:prstGeom prst="rect">
-            <a:avLst/>
-          </a:prstGeom>
-        </p:spPr>
-      </p:pic>
-      <p:sp>
-        <p:nvSpPr>
-          <p:cNvPr id="5" name="TextBox 4"/>
-          <p:cNvSpPr txBox="1"/>
-          <p:nvPr/>
-        </p:nvSpPr>
-        <p:spPr>
-          <a:xfrm>
-            <a:off x="457200" y="6217920"/>
-            <a:ext cx="8229600" cy="548640"/>
-          </a:xfrm>
-          <a:prstGeom prst="rect">
-            <a:avLst/>
-          </a:prstGeom>
-          <a:noFill/>
-        </p:spPr>
-        <p:txBody>
-          <a:bodyPr wrap="none">
-            <a:spAutoFit/>
-          </a:bodyPr>
-          <a:lstStyle/>
-          <a:p>
-            <a:pPr>
-              <a:defRPr sz="1600"/>
-            </a:pPr>
-            <a:r>
-              <a:t>处理用户的积分兑换订单</a:t>
-            </a:r>
-          </a:p>
-        </p:txBody>
-      </p:sp>
-    </p:spTree>
-  </p:cSld>
-  <p:clrMapOvr>
-    <a:masterClrMapping/>
-  </p:clrMapOvr>
-</p:sld>
-</file>
-
-<file path=ppt/slides/slide24.xml><?xml version="1.0" encoding="utf-8"?>
-<p:sld xmlns:a="http://schemas.openxmlformats.org/drawingml/2006/main" xmlns:p="http://schemas.openxmlformats.org/presentationml/2006/main" xmlns:r="http://schemas.openxmlformats.org/officeDocument/2006/relationships">
-  <p:cSld>
-    <p:spTree>
-      <p:nvGrpSpPr>
-        <p:cNvPr id="1" name=""/>
-        <p:cNvGrpSpPr/>
-        <p:nvPr/>
-      </p:nvGrpSpPr>
-      <p:grpSpPr/>
-      <p:sp>
-        <p:nvSpPr>
-          <p:cNvPr id="2" name="Title 1"/>
-          <p:cNvSpPr>
-            <a:spLocks noGrp="1"/>
-          </p:cNvSpPr>
-          <p:nvPr>
-            <p:ph type="title"/>
-          </p:nvPr>
-        </p:nvSpPr>
-        <p:spPr/>
-        <p:txBody>
-          <a:bodyPr/>
-          <a:lstStyle/>
-          <a:p>
-            <a:r>
-              <a:t>九、数据分析</a:t>
-            </a:r>
-          </a:p>
-        </p:txBody>
-      </p:sp>
-      <p:sp>
-        <p:nvSpPr>
-          <p:cNvPr id="3" name="Content Placeholder 2"/>
-          <p:cNvSpPr>
-            <a:spLocks noGrp="1"/>
-          </p:cNvSpPr>
-          <p:nvPr>
-            <p:ph idx="1"/>
-          </p:nvPr>
-        </p:nvSpPr>
-        <p:spPr/>
-        <p:txBody>
-          <a:bodyPr/>
-          <a:lstStyle/>
-          <a:p/>
-          <a:p>
-            <a:pPr>
-              <a:defRPr sz="2000"/>
-            </a:pPr>
-            <a:r>
-              <a:t>销售统计</a:t>
-            </a:r>
-          </a:p>
-          <a:p>
-            <a:pPr lvl="1">
-              <a:defRPr sz="1800"/>
-            </a:pPr>
-            <a:r>
-              <a:t>  - 查看销售数据</a:t>
-            </a:r>
-          </a:p>
-          <a:p>
-            <a:pPr lvl="1">
-              <a:defRPr sz="1800"/>
-            </a:pPr>
-            <a:r>
-              <a:t>  - 销售趋势分析</a:t>
-            </a:r>
-          </a:p>
-          <a:p>
-            <a:pPr lvl="1">
-              <a:defRPr sz="1800"/>
-            </a:pPr>
-            <a:r>
-              <a:t>  - 品类占比分析</a:t>
-            </a:r>
-          </a:p>
-          <a:p>
-            <a:pPr lvl="1">
-              <a:defRPr sz="1800"/>
-            </a:pPr>
-            <a:r>
-              <a:t>  - 导出统计报表</a:t>
-            </a:r>
-          </a:p>
-          <a:p>
-            <a:pPr>
-              <a:defRPr sz="2000"/>
-            </a:pPr>
-          </a:p>
-          <a:p>
-            <a:pPr>
-              <a:defRPr sz="2000"/>
-            </a:pPr>
-            <a:r>
-              <a:t>关键指标</a:t>
-            </a:r>
-          </a:p>
-          <a:p>
-            <a:pPr lvl="1">
-              <a:defRPr sz="1800"/>
-            </a:pPr>
-            <a:r>
-              <a:t>  - 销售额、订单数</a:t>
-            </a:r>
-          </a:p>
-          <a:p>
-            <a:pPr lvl="1">
-              <a:defRPr sz="1800"/>
-            </a:pPr>
-            <a:r>
-              <a:t>  - 客单价、用户数</a:t>
-            </a:r>
-          </a:p>
-          <a:p>
-            <a:pPr lvl="1">
-              <a:defRPr sz="1800"/>
-            </a:pPr>
-            <a:r>
-              <a:t>  - 转化率、复购率</a:t>
-            </a:r>
-          </a:p>
-        </p:txBody>
-      </p:sp>
-    </p:spTree>
-  </p:cSld>
-  <p:clrMapOvr>
-    <a:masterClrMapping/>
-  </p:clrMapOvr>
-</p:sld>
-</file>
-
-<file path=ppt/slides/slide25.xml><?xml version="1.0" encoding="utf-8"?>
-<p:sld xmlns:a="http://schemas.openxmlformats.org/drawingml/2006/main" xmlns:p="http://schemas.openxmlformats.org/presentationml/2006/main" xmlns:r="http://schemas.openxmlformats.org/officeDocument/2006/relationships">
-  <p:cSld>
-    <p:spTree>
-      <p:nvGrpSpPr>
-        <p:cNvPr id="1" name=""/>
-        <p:cNvGrpSpPr/>
-        <p:nvPr/>
-      </p:nvGrpSpPr>
-      <p:grpSpPr/>
-      <p:sp>
-        <p:nvSpPr>
-          <p:cNvPr id="2" name="Title 1"/>
-          <p:cNvSpPr>
-            <a:spLocks noGrp="1"/>
-          </p:cNvSpPr>
-          <p:nvPr>
-            <p:ph type="title"/>
-          </p:nvPr>
-        </p:nvSpPr>
-        <p:spPr/>
-        <p:txBody>
-          <a:bodyPr/>
-          <a:lstStyle/>
-          <a:p/>
-        </p:txBody>
-      </p:sp>
-      <p:sp>
-        <p:nvSpPr>
-          <p:cNvPr id="3" name="TextBox 2"/>
-          <p:cNvSpPr txBox="1"/>
-          <p:nvPr/>
-        </p:nvSpPr>
-        <p:spPr>
-          <a:xfrm>
-            <a:off x="457200" y="457200"/>
-            <a:ext cx="8229600" cy="731520"/>
-          </a:xfrm>
-          <a:prstGeom prst="rect">
-            <a:avLst/>
-          </a:prstGeom>
-          <a:noFill/>
-        </p:spPr>
-        <p:txBody>
-          <a:bodyPr wrap="none">
-            <a:spAutoFit/>
-          </a:bodyPr>
-          <a:lstStyle/>
-          <a:p>
-            <a:pPr>
-              <a:defRPr sz="3200" b="1"/>
-            </a:pPr>
-            <a:r>
-              <a:t>销售统计页面</a:t>
-            </a:r>
-          </a:p>
-        </p:txBody>
-      </p:sp>
-      <p:pic>
-        <p:nvPicPr>
-          <p:cNvPr id="4" name="Picture 3" descr="20_sales_stats.png"/>
-          <p:cNvPicPr>
-            <a:picLocks noChangeAspect="1"/>
-          </p:cNvPicPr>
-          <p:nvPr/>
-        </p:nvPicPr>
-        <p:blipFill>
-          <a:blip r:embed="rId2"/>
-          <a:stretch>
-            <a:fillRect/>
-          </a:stretch>
-        </p:blipFill>
-        <p:spPr>
-          <a:xfrm>
-            <a:off x="914400" y="1371600"/>
-            <a:ext cx="8128000" cy="4572000"/>
-          </a:xfrm>
-          <a:prstGeom prst="rect">
-            <a:avLst/>
-          </a:prstGeom>
-        </p:spPr>
-      </p:pic>
-      <p:sp>
-        <p:nvSpPr>
-          <p:cNvPr id="5" name="TextBox 4"/>
-          <p:cNvSpPr txBox="1"/>
-          <p:nvPr/>
-        </p:nvSpPr>
-        <p:spPr>
-          <a:xfrm>
-            <a:off x="457200" y="6217920"/>
-            <a:ext cx="8229600" cy="548640"/>
-          </a:xfrm>
-          <a:prstGeom prst="rect">
-            <a:avLst/>
-          </a:prstGeom>
-          <a:noFill/>
-        </p:spPr>
-        <p:txBody>
-          <a:bodyPr wrap="none">
-            <a:spAutoFit/>
-          </a:bodyPr>
-          <a:lstStyle/>
-          <a:p>
-            <a:pPr>
-              <a:defRPr sz="1600"/>
-            </a:pPr>
-            <a:r>
-              <a:t>查看各类销售数据和趋势分析</a:t>
-            </a:r>
-          </a:p>
-        </p:txBody>
-      </p:sp>
-    </p:spTree>
-  </p:cSld>
-  <p:clrMapOvr>
-    <a:masterClrMapping/>
-  </p:clrMapOvr>
-</p:sld>
-</file>
-
-<file path=ppt/slides/slide26.xml><?xml version="1.0" encoding="utf-8"?>
-<p:sld xmlns:a="http://schemas.openxmlformats.org/drawingml/2006/main" xmlns:p="http://schemas.openxmlformats.org/presentationml/2006/main" xmlns:r="http://schemas.openxmlformats.org/officeDocument/2006/relationships">
-  <p:cSld>
-    <p:spTree>
-      <p:nvGrpSpPr>
-        <p:cNvPr id="1" name=""/>
-        <p:cNvGrpSpPr/>
-        <p:nvPr/>
-      </p:nvGrpSpPr>
-      <p:grpSpPr/>
-      <p:sp>
-        <p:nvSpPr>
-          <p:cNvPr id="2" name="Title 1"/>
-          <p:cNvSpPr>
-            <a:spLocks noGrp="1"/>
-          </p:cNvSpPr>
-          <p:nvPr>
-            <p:ph type="title"/>
-          </p:nvPr>
-        </p:nvSpPr>
-        <p:spPr/>
-        <p:txBody>
-          <a:bodyPr/>
-          <a:lstStyle/>
-          <a:p>
-            <a:r>
-              <a:t>十、系统设置</a:t>
-            </a:r>
-          </a:p>
-        </p:txBody>
-      </p:sp>
-      <p:sp>
-        <p:nvSpPr>
-          <p:cNvPr id="3" name="Content Placeholder 2"/>
-          <p:cNvSpPr>
-            <a:spLocks noGrp="1"/>
-          </p:cNvSpPr>
-          <p:nvPr>
-            <p:ph idx="1"/>
-          </p:nvPr>
-        </p:nvSpPr>
-        <p:spPr/>
-        <p:txBody>
-          <a:bodyPr/>
-          <a:lstStyle/>
-          <a:p/>
-          <a:p>
-            <a:pPr>
-              <a:defRPr sz="2000"/>
-            </a:pPr>
-            <a:r>
-              <a:t>小游戏列表</a:t>
-            </a:r>
-          </a:p>
-          <a:p>
-            <a:pPr lvl="1">
-              <a:defRPr sz="1800"/>
-            </a:pPr>
-            <a:r>
-              <a:t>  - 管理互动小游戏</a:t>
-            </a:r>
-          </a:p>
-          <a:p>
-            <a:pPr lvl="1">
-              <a:defRPr sz="1800"/>
-            </a:pPr>
-            <a:r>
-              <a:t>  - 配置游戏规则</a:t>
-            </a:r>
-          </a:p>
-          <a:p>
-            <a:pPr lvl="1">
-              <a:defRPr sz="1800"/>
-            </a:pPr>
-            <a:r>
-              <a:t>  - 设置奖励</a:t>
-            </a:r>
-          </a:p>
-          <a:p>
-            <a:pPr>
-              <a:defRPr sz="2000"/>
-            </a:pPr>
-          </a:p>
-          <a:p>
-            <a:pPr>
-              <a:defRPr sz="2000"/>
-            </a:pPr>
-            <a:r>
-              <a:t>系统日志</a:t>
-            </a:r>
-          </a:p>
-          <a:p>
-            <a:pPr lvl="1">
-              <a:defRPr sz="1800"/>
-            </a:pPr>
-            <a:r>
-              <a:t>  - 查看操作记录</a:t>
-            </a:r>
-          </a:p>
-          <a:p>
-            <a:pPr lvl="1">
-              <a:defRPr sz="1800"/>
-            </a:pPr>
-            <a:r>
-              <a:t>  - 审计追踪</a:t>
-            </a:r>
-          </a:p>
-          <a:p>
-            <a:pPr lvl="1">
-              <a:defRPr sz="1800"/>
-            </a:pPr>
-            <a:r>
-              <a:t>  - 问题排查</a:t>
-            </a:r>
-          </a:p>
-        </p:txBody>
-      </p:sp>
-    </p:spTree>
-  </p:cSld>
-  <p:clrMapOvr>
-    <a:masterClrMapping/>
-  </p:clrMapOvr>
-</p:sld>
-</file>
-
-<file path=ppt/slides/slide27.xml><?xml version="1.0" encoding="utf-8"?>
-<p:sld xmlns:a="http://schemas.openxmlformats.org/drawingml/2006/main" xmlns:p="http://schemas.openxmlformats.org/presentationml/2006/main" xmlns:r="http://schemas.openxmlformats.org/officeDocument/2006/relationships">
-  <p:cSld>
-    <p:spTree>
-      <p:nvGrpSpPr>
-        <p:cNvPr id="1" name=""/>
-        <p:cNvGrpSpPr/>
-        <p:nvPr/>
-      </p:nvGrpSpPr>
-      <p:grpSpPr/>
-      <p:sp>
-        <p:nvSpPr>
-          <p:cNvPr id="2" name="Title 1"/>
-          <p:cNvSpPr>
-            <a:spLocks noGrp="1"/>
-          </p:cNvSpPr>
-          <p:nvPr>
-            <p:ph type="title"/>
-          </p:nvPr>
-        </p:nvSpPr>
-        <p:spPr/>
-        <p:txBody>
-          <a:bodyPr/>
-          <a:lstStyle/>
-          <a:p/>
-        </p:txBody>
-      </p:sp>
-      <p:sp>
-        <p:nvSpPr>
-          <p:cNvPr id="3" name="TextBox 2"/>
-          <p:cNvSpPr txBox="1"/>
-          <p:nvPr/>
-        </p:nvSpPr>
-        <p:spPr>
-          <a:xfrm>
-            <a:off x="457200" y="457200"/>
-            <a:ext cx="8229600" cy="731520"/>
-          </a:xfrm>
-          <a:prstGeom prst="rect">
-            <a:avLst/>
-          </a:prstGeom>
-          <a:noFill/>
-        </p:spPr>
-        <p:txBody>
-          <a:bodyPr wrap="none">
-            <a:spAutoFit/>
-          </a:bodyPr>
-          <a:lstStyle/>
-          <a:p>
-            <a:pPr>
-              <a:defRPr sz="3200" b="1"/>
-            </a:pPr>
-            <a:r>
-              <a:t>小游戏列表</a:t>
-            </a:r>
-          </a:p>
-        </p:txBody>
-      </p:sp>
-      <p:pic>
-        <p:nvPicPr>
-          <p:cNvPr id="4" name="Picture 3" descr="26_games.png"/>
-          <p:cNvPicPr>
-            <a:picLocks noChangeAspect="1"/>
-          </p:cNvPicPr>
-          <p:nvPr/>
-        </p:nvPicPr>
-        <p:blipFill>
-          <a:blip r:embed="rId2"/>
-          <a:stretch>
-            <a:fillRect/>
-          </a:stretch>
-        </p:blipFill>
-        <p:spPr>
-          <a:xfrm>
-            <a:off x="914400" y="1371600"/>
-            <a:ext cx="8128000" cy="4572000"/>
-          </a:xfrm>
-          <a:prstGeom prst="rect">
-            <a:avLst/>
-          </a:prstGeom>
-        </p:spPr>
-      </p:pic>
-      <p:sp>
-        <p:nvSpPr>
-          <p:cNvPr id="5" name="TextBox 4"/>
-          <p:cNvSpPr txBox="1"/>
-          <p:nvPr/>
-        </p:nvSpPr>
-        <p:spPr>
-          <a:xfrm>
-            <a:off x="457200" y="6217920"/>
-            <a:ext cx="8229600" cy="548640"/>
-          </a:xfrm>
-          <a:prstGeom prst="rect">
-            <a:avLst/>
-          </a:prstGeom>
-          <a:noFill/>
-        </p:spPr>
-        <p:txBody>
-          <a:bodyPr wrap="none">
-            <a:spAutoFit/>
-          </a:bodyPr>
-          <a:lstStyle/>
-          <a:p>
-            <a:pPr>
-              <a:defRPr sz="1600"/>
-            </a:pPr>
-            <a:r>
-              <a:t>管理小程序中的互动小游戏</a:t>
-            </a:r>
-          </a:p>
-        </p:txBody>
-      </p:sp>
-    </p:spTree>
-  </p:cSld>
-  <p:clrMapOvr>
-    <a:masterClrMapping/>
-  </p:clrMapOvr>
-</p:sld>
-</file>
-
-<file path=ppt/slides/slide28.xml><?xml version="1.0" encoding="utf-8"?>
-<p:sld xmlns:a="http://schemas.openxmlformats.org/drawingml/2006/main" xmlns:p="http://schemas.openxmlformats.org/presentationml/2006/main" xmlns:r="http://schemas.openxmlformats.org/officeDocument/2006/relationships">
-  <p:cSld>
-    <p:spTree>
-      <p:nvGrpSpPr>
-        <p:cNvPr id="1" name=""/>
-        <p:cNvGrpSpPr/>
-        <p:nvPr/>
-      </p:nvGrpSpPr>
-      <p:grpSpPr/>
-      <p:sp>
-        <p:nvSpPr>
-          <p:cNvPr id="2" name="Title 1"/>
-          <p:cNvSpPr>
-            <a:spLocks noGrp="1"/>
-          </p:cNvSpPr>
-          <p:nvPr>
-            <p:ph type="title"/>
-          </p:nvPr>
-        </p:nvSpPr>
-        <p:spPr/>
-        <p:txBody>
-          <a:bodyPr/>
-          <a:lstStyle/>
-          <a:p/>
-        </p:txBody>
-      </p:sp>
-      <p:sp>
-        <p:nvSpPr>
-          <p:cNvPr id="3" name="TextBox 2"/>
-          <p:cNvSpPr txBox="1"/>
-          <p:nvPr/>
-        </p:nvSpPr>
-        <p:spPr>
-          <a:xfrm>
-            <a:off x="457200" y="457200"/>
-            <a:ext cx="8229600" cy="731520"/>
-          </a:xfrm>
-          <a:prstGeom prst="rect">
-            <a:avLst/>
-          </a:prstGeom>
-          <a:noFill/>
-        </p:spPr>
-        <p:txBody>
-          <a:bodyPr wrap="none">
-            <a:spAutoFit/>
-          </a:bodyPr>
-          <a:lstStyle/>
-          <a:p>
-            <a:pPr>
-              <a:defRPr sz="3200" b="1"/>
-            </a:pPr>
-            <a:r>
-              <a:t>系统日志</a:t>
-            </a:r>
-          </a:p>
-        </p:txBody>
-      </p:sp>
-      <p:pic>
-        <p:nvPicPr>
-          <p:cNvPr id="4" name="Picture 3" descr="27_system_logs.png"/>
-          <p:cNvPicPr>
-            <a:picLocks noChangeAspect="1"/>
-          </p:cNvPicPr>
-          <p:nvPr/>
-        </p:nvPicPr>
-        <p:blipFill>
-          <a:blip r:embed="rId2"/>
-          <a:stretch>
-            <a:fillRect/>
-          </a:stretch>
-        </p:blipFill>
-        <p:spPr>
-          <a:xfrm>
-            <a:off x="914400" y="1371600"/>
-            <a:ext cx="8128000" cy="4572000"/>
-          </a:xfrm>
-          <a:prstGeom prst="rect">
-            <a:avLst/>
-          </a:prstGeom>
-        </p:spPr>
-      </p:pic>
-      <p:sp>
-        <p:nvSpPr>
-          <p:cNvPr id="5" name="TextBox 4"/>
-          <p:cNvSpPr txBox="1"/>
-          <p:nvPr/>
-        </p:nvSpPr>
-        <p:spPr>
-          <a:xfrm>
-            <a:off x="457200" y="6217920"/>
-            <a:ext cx="8229600" cy="548640"/>
-          </a:xfrm>
-          <a:prstGeom prst="rect">
-            <a:avLst/>
-          </a:prstGeom>
-          <a:noFill/>
-        </p:spPr>
-        <p:txBody>
-          <a:bodyPr wrap="none">
-            <a:spAutoFit/>
-          </a:bodyPr>
-          <a:lstStyle/>
-          <a:p>
-            <a:pPr>
-              <a:defRPr sz="1600"/>
-            </a:pPr>
-            <a:r>
-              <a:t>查看系统操作日志，用于审计和排查</a:t>
-            </a:r>
-          </a:p>
-        </p:txBody>
-      </p:sp>
-    </p:spTree>
-  </p:cSld>
-  <p:clrMapOvr>
-    <a:masterClrMapping/>
-  </p:clrMapOvr>
-</p:sld>
-</file>
-
-<file path=ppt/slides/slide29.xml><?xml version="1.0" encoding="utf-8"?>
-<p:sld xmlns:a="http://schemas.openxmlformats.org/drawingml/2006/main" xmlns:p="http://schemas.openxmlformats.org/presentationml/2006/main" xmlns:r="http://schemas.openxmlformats.org/officeDocument/2006/relationships">
-  <p:cSld>
-    <p:spTree>
-      <p:nvGrpSpPr>
-        <p:cNvPr id="1" name=""/>
-        <p:cNvGrpSpPr/>
-        <p:nvPr/>
-      </p:nvGrpSpPr>
-      <p:grpSpPr/>
-      <p:sp>
-        <p:nvSpPr>
-          <p:cNvPr id="2" name="Title 1"/>
-          <p:cNvSpPr>
-            <a:spLocks noGrp="1"/>
-          </p:cNvSpPr>
-          <p:nvPr>
-            <p:ph type="title"/>
-          </p:nvPr>
-        </p:nvSpPr>
-        <p:spPr/>
-        <p:txBody>
-          <a:bodyPr/>
-          <a:lstStyle/>
-          <a:p>
-            <a:r>
-              <a:t>常见问题 - 登录</a:t>
-            </a:r>
-          </a:p>
-        </p:txBody>
-      </p:sp>
-      <p:sp>
-        <p:nvSpPr>
-          <p:cNvPr id="3" name="Content Placeholder 2"/>
-          <p:cNvSpPr>
-            <a:spLocks noGrp="1"/>
-          </p:cNvSpPr>
-          <p:nvPr>
-            <p:ph idx="1"/>
-          </p:nvPr>
-        </p:nvSpPr>
-        <p:spPr/>
-        <p:txBody>
-          <a:bodyPr/>
-          <a:lstStyle/>
-          <a:p/>
-          <a:p>
-            <a:pPr>
-              <a:defRPr sz="2000"/>
-            </a:pPr>
-            <a:r>
-              <a:t>Q：忘记密码怎么办？</a:t>
-            </a:r>
-          </a:p>
-          <a:p>
-            <a:pPr>
-              <a:defRPr sz="2000"/>
-            </a:pPr>
-            <a:r>
-              <a:t>A：联系系统管理员重置密码</a:t>
-            </a:r>
-          </a:p>
-          <a:p>
-            <a:pPr>
-              <a:defRPr sz="2000"/>
-            </a:pPr>
-          </a:p>
-          <a:p>
-            <a:pPr>
-              <a:defRPr sz="2000"/>
-            </a:pPr>
-            <a:r>
-              <a:t>Q：为什么自动退出？</a:t>
-            </a:r>
-          </a:p>
-          <a:p>
-            <a:pPr>
-              <a:defRPr sz="2000"/>
-            </a:pPr>
-            <a:r>
-              <a:t>A：30分钟无操作会自动退出，请重新登录</a:t>
-            </a:r>
-          </a:p>
-          <a:p>
-            <a:pPr>
-              <a:defRPr sz="2000"/>
-            </a:pPr>
-          </a:p>
-          <a:p>
-            <a:pPr>
-              <a:defRPr sz="2000"/>
-            </a:pPr>
-            <a:r>
-              <a:t>Q：提示账号已在其他地方登录？</a:t>
-            </a:r>
-          </a:p>
-          <a:p>
-            <a:pPr>
-              <a:defRPr sz="2000"/>
-            </a:pPr>
-            <a:r>
-              <a:t>A：同一账号不能同时多处登录，请修改密码</a:t>
-            </a:r>
-          </a:p>
-        </p:txBody>
-      </p:sp>
-    </p:spTree>
-  </p:cSld>
-  <p:clrMapOvr>
-    <a:masterClrMapping/>
-  </p:clrMapOvr>
-</p:sld>
-</file>
-
-<file path=ppt/slides/slide3.xml><?xml version="1.0" encoding="utf-8"?>
-<p:sld xmlns:a="http://schemas.openxmlformats.org/drawingml/2006/main" xmlns:p="http://schemas.openxmlformats.org/presentationml/2006/main" xmlns:r="http://schemas.openxmlformats.org/officeDocument/2006/relationships">
-  <p:cSld>
-    <p:spTree>
-      <p:nvGrpSpPr>
-        <p:cNvPr id="1" name=""/>
-        <p:cNvGrpSpPr/>
-        <p:nvPr/>
-      </p:nvGrpSpPr>
-      <p:grpSpPr/>
-      <p:sp>
-        <p:nvSpPr>
-          <p:cNvPr id="2" name="Title 1"/>
-          <p:cNvSpPr>
-            <a:spLocks noGrp="1"/>
-          </p:cNvSpPr>
-          <p:nvPr>
-            <p:ph type="title"/>
-          </p:nvPr>
-        </p:nvSpPr>
-        <p:spPr/>
-        <p:txBody>
-          <a:bodyPr/>
-          <a:lstStyle/>
-          <a:p>
-            <a:r>
-              <a:t>一、系统概述</a:t>
-            </a:r>
-          </a:p>
-        </p:txBody>
-      </p:sp>
-      <p:sp>
-        <p:nvSpPr>
-          <p:cNvPr id="3" name="Content Placeholder 2"/>
-          <p:cNvSpPr>
-            <a:spLocks noGrp="1"/>
-          </p:cNvSpPr>
-          <p:nvPr>
-            <p:ph idx="1"/>
-          </p:nvPr>
-        </p:nvSpPr>
-        <p:spPr/>
-        <p:txBody>
-          <a:bodyPr/>
-          <a:lstStyle/>
-          <a:p/>
-          <a:p>
-            <a:pPr>
-              <a:defRPr sz="2000"/>
-            </a:pPr>
-            <a:r>
-              <a:t>• 系统功能全面：涵盖活动、场地、财务、营销等全业务流程</a:t>
-            </a:r>
-          </a:p>
-          <a:p>
-            <a:pPr>
-              <a:defRPr sz="2000"/>
-            </a:pPr>
-            <a:r>
-              <a:t>• 操作简便直观：界面友好，流程清晰</a:t>
-            </a:r>
-          </a:p>
-          <a:p>
-            <a:pPr>
-              <a:defRPr sz="2000"/>
-            </a:pPr>
-            <a:r>
-              <a:t>• 数据实时同步：支持即时查询和统计</a:t>
-            </a:r>
-          </a:p>
-          <a:p>
-            <a:pPr>
-              <a:defRPr sz="2000"/>
-            </a:pPr>
-            <a:r>
-              <a:t>• 安全可靠：多重认证，数据加密</a:t>
-            </a:r>
-          </a:p>
-          <a:p>
-            <a:pPr>
-              <a:defRPr sz="2000"/>
-            </a:pPr>
-            <a:r>
-              <a:t>• 多端支持：PC端管理 + 移动端小程序</a:t>
-            </a:r>
-          </a:p>
-        </p:txBody>
-      </p:sp>
-    </p:spTree>
-  </p:cSld>
-  <p:clrMapOvr>
-    <a:masterClrMapping/>
-  </p:clrMapOvr>
-</p:sld>
-</file>
-
-<file path=ppt/slides/slide30.xml><?xml version="1.0" encoding="utf-8"?>
-<p:sld xmlns:a="http://schemas.openxmlformats.org/drawingml/2006/main" xmlns:p="http://schemas.openxmlformats.org/presentationml/2006/main" xmlns:r="http://schemas.openxmlformats.org/officeDocument/2006/relationships">
-  <p:cSld>
-    <p:spTree>
-      <p:nvGrpSpPr>
-        <p:cNvPr id="1" name=""/>
-        <p:cNvGrpSpPr/>
-        <p:nvPr/>
-      </p:nvGrpSpPr>
-      <p:grpSpPr/>
-      <p:sp>
-        <p:nvSpPr>
-          <p:cNvPr id="2" name="Title 1"/>
-          <p:cNvSpPr>
-            <a:spLocks noGrp="1"/>
-          </p:cNvSpPr>
-          <p:nvPr>
-            <p:ph type="title"/>
-          </p:nvPr>
-        </p:nvSpPr>
-        <p:spPr/>
-        <p:txBody>
-          <a:bodyPr/>
-          <a:lstStyle/>
-          <a:p>
-            <a:r>
-              <a:t>常见问题 - 操作</a:t>
-            </a:r>
-          </a:p>
-        </p:txBody>
-      </p:sp>
-      <p:sp>
-        <p:nvSpPr>
-          <p:cNvPr id="3" name="Content Placeholder 2"/>
-          <p:cNvSpPr>
-            <a:spLocks noGrp="1"/>
-          </p:cNvSpPr>
-          <p:nvPr>
-            <p:ph idx="1"/>
-          </p:nvPr>
-        </p:nvSpPr>
-        <p:spPr/>
-        <p:txBody>
-          <a:bodyPr/>
-          <a:lstStyle/>
-          <a:p/>
-          <a:p>
-            <a:pPr>
-              <a:defRPr sz="2000"/>
-            </a:pPr>
-            <a:r>
-              <a:t>Q：看不到某些菜单？</a:t>
-            </a:r>
-          </a:p>
-          <a:p>
-            <a:pPr>
-              <a:defRPr sz="2000"/>
-            </a:pPr>
-            <a:r>
-              <a:t>A：检查账号权限，联系管理员分配</a:t>
-            </a:r>
-          </a:p>
-          <a:p>
-            <a:pPr>
-              <a:defRPr sz="2000"/>
-            </a:pPr>
-          </a:p>
-          <a:p>
-            <a:pPr>
-              <a:defRPr sz="2000"/>
-            </a:pPr>
-            <a:r>
-              <a:t>Q：数据保存失败？</a:t>
-            </a:r>
-          </a:p>
-          <a:p>
-            <a:pPr>
-              <a:defRPr sz="2000"/>
-            </a:pPr>
-            <a:r>
-              <a:t>A：检查必填项、数据格式、网络连接</a:t>
-            </a:r>
-          </a:p>
-          <a:p>
-            <a:pPr>
-              <a:defRPr sz="2000"/>
-            </a:pPr>
-          </a:p>
-          <a:p>
-            <a:pPr>
-              <a:defRPr sz="2000"/>
-            </a:pPr>
-            <a:r>
-              <a:t>Q：图片上传失败？</a:t>
-            </a:r>
-          </a:p>
-          <a:p>
-            <a:pPr>
-              <a:defRPr sz="2000"/>
-            </a:pPr>
-            <a:r>
-              <a:t>A：检查图片大小（&lt;2MB）和格式（jpg/png/gif）</a:t>
-            </a:r>
-          </a:p>
-        </p:txBody>
-      </p:sp>
-    </p:spTree>
-  </p:cSld>
-  <p:clrMapOvr>
-    <a:masterClrMapping/>
-  </p:clrMapOvr>
-</p:sld>
-</file>
-
-<file path=ppt/slides/slide31.xml><?xml version="1.0" encoding="utf-8"?>
-<p:sld xmlns:a="http://schemas.openxmlformats.org/drawingml/2006/main" xmlns:p="http://schemas.openxmlformats.org/presentationml/2006/main" xmlns:r="http://schemas.openxmlformats.org/officeDocument/2006/relationships">
-  <p:cSld>
-    <p:spTree>
-      <p:nvGrpSpPr>
-        <p:cNvPr id="1" name=""/>
-        <p:cNvGrpSpPr/>
-        <p:nvPr/>
-      </p:nvGrpSpPr>
-      <p:grpSpPr/>
-      <p:sp>
-        <p:nvSpPr>
-          <p:cNvPr id="2" name="Title 1"/>
-          <p:cNvSpPr>
-            <a:spLocks noGrp="1"/>
-          </p:cNvSpPr>
-          <p:nvPr>
-            <p:ph type="title"/>
-          </p:nvPr>
-        </p:nvSpPr>
-        <p:spPr/>
-        <p:txBody>
-          <a:bodyPr/>
-          <a:lstStyle/>
-          <a:p>
-            <a:r>
-              <a:t>联系方式</a:t>
-            </a:r>
-          </a:p>
-        </p:txBody>
-      </p:sp>
-      <p:sp>
-        <p:nvSpPr>
-          <p:cNvPr id="3" name="Content Placeholder 2"/>
-          <p:cNvSpPr>
-            <a:spLocks noGrp="1"/>
-          </p:cNvSpPr>
-          <p:nvPr>
-            <p:ph idx="1"/>
-          </p:nvPr>
-        </p:nvSpPr>
-        <p:spPr/>
-        <p:txBody>
-          <a:bodyPr/>
-          <a:lstStyle/>
-          <a:p/>
-          <a:p>
-            <a:pPr>
-              <a:defRPr sz="2000"/>
-            </a:pPr>
-            <a:r>
-              <a:t>技术支持</a:t>
-            </a:r>
-          </a:p>
-          <a:p>
-            <a:pPr lvl="1">
-              <a:defRPr sz="1800"/>
-            </a:pPr>
-            <a:r>
-              <a:t>  电话：400-xxx-xxxx</a:t>
-            </a:r>
-          </a:p>
-          <a:p>
-            <a:pPr lvl="1">
-              <a:defRPr sz="1800"/>
-            </a:pPr>
-            <a:r>
-              <a:t>  邮箱：support@bjstarfish.com</a:t>
-            </a:r>
-          </a:p>
-          <a:p>
-            <a:pPr lvl="1">
-              <a:defRPr sz="1800"/>
-            </a:pPr>
-            <a:r>
-              <a:t>  工作时间：周一至周日 9:00-18:00</a:t>
-            </a:r>
-          </a:p>
-          <a:p>
-            <a:pPr>
-              <a:defRPr sz="2000"/>
-            </a:pPr>
-          </a:p>
-          <a:p>
-            <a:pPr>
-              <a:defRPr sz="2000"/>
-            </a:pPr>
-            <a:r>
-              <a:t>运营团队</a:t>
-            </a:r>
-          </a:p>
-          <a:p>
-            <a:pPr lvl="1">
-              <a:defRPr sz="1800"/>
-            </a:pPr>
-            <a:r>
-              <a:t>  电话：010-xxxx-xxxx</a:t>
-            </a:r>
-          </a:p>
-          <a:p>
-            <a:pPr lvl="1">
-              <a:defRPr sz="1800"/>
-            </a:pPr>
-            <a:r>
-              <a:t>  邮箱：operation@bjstarfish.com</a:t>
-            </a:r>
-          </a:p>
-        </p:txBody>
-      </p:sp>
-    </p:spTree>
-  </p:cSld>
-  <p:clrMapOvr>
-    <a:masterClrMapping/>
-  </p:clrMapOvr>
-</p:sld>
-</file>
-
-<file path=ppt/slides/slide32.xml><?xml version="1.0" encoding="utf-8"?>
-<p:sld xmlns:a="http://schemas.openxmlformats.org/drawingml/2006/main" xmlns:p="http://schemas.openxmlformats.org/presentationml/2006/main" xmlns:r="http://schemas.openxmlformats.org/officeDocument/2006/relationships">
-  <p:cSld>
-    <p:spTree>
-      <p:nvGrpSpPr>
-        <p:cNvPr id="1" name=""/>
-        <p:cNvGrpSpPr/>
-        <p:nvPr/>
-      </p:nvGrpSpPr>
-      <p:grpSpPr/>
-      <p:sp>
-        <p:nvSpPr>
-          <p:cNvPr id="2" name="Title 1"/>
-          <p:cNvSpPr>
-            <a:spLocks noGrp="1"/>
-          </p:cNvSpPr>
-          <p:nvPr>
-            <p:ph type="ctrTitle"/>
-          </p:nvPr>
-        </p:nvSpPr>
-        <p:spPr/>
-        <p:txBody>
-          <a:bodyPr/>
-          <a:lstStyle/>
-          <a:p>
-            <a:pPr>
-              <a:defRPr sz="4400" b="1"/>
-            </a:pPr>
-            <a:r>
-              <a:t>谢谢！</a:t>
-            </a:r>
-          </a:p>
-        </p:txBody>
-      </p:sp>
-      <p:sp>
-        <p:nvSpPr>
-          <p:cNvPr id="3" name="Subtitle 2"/>
-          <p:cNvSpPr>
-            <a:spLocks noGrp="1"/>
-          </p:cNvSpPr>
-          <p:nvPr>
-            <p:ph type="subTitle" idx="1"/>
-          </p:nvPr>
-        </p:nvSpPr>
-        <p:spPr/>
-        <p:txBody>
-          <a:bodyPr/>
-          <a:lstStyle/>
-          <a:p>
-            <a:pPr>
-              <a:defRPr sz="2400"/>
-            </a:pPr>
-            <a:r>
-              <a:t>祝您使用愉快！</a:t>
-            </a:r>
-          </a:p>
-          <a:p/>
-          <a:p>
-            <a:r>
-              <a:t>如有疑问，请随时联系我们</a:t>
-            </a:r>
-          </a:p>
-        </p:txBody>
-      </p:sp>
-    </p:spTree>
-  </p:cSld>
-  <p:clrMapOvr>
-    <a:masterClrMapping/>
-  </p:clrMapOvr>
-</p:sld>
-</file>
-
-<file path=ppt/slides/slide4.xml><?xml version="1.0" encoding="utf-8"?>
-<p:sld xmlns:a="http://schemas.openxmlformats.org/drawingml/2006/main" xmlns:p="http://schemas.openxmlformats.org/presentationml/2006/main" xmlns:r="http://schemas.openxmlformats.org/officeDocument/2006/relationships">
-  <p:cSld>
-    <p:spTree>
-      <p:nvGrpSpPr>
-        <p:cNvPr id="1" name=""/>
-        <p:cNvGrpSpPr/>
-        <p:nvPr/>
-      </p:nvGrpSpPr>
-      <p:grpSpPr/>
-      <p:sp>
-        <p:nvSpPr>
-          <p:cNvPr id="2" name="Title 1"/>
-          <p:cNvSpPr>
-            <a:spLocks noGrp="1"/>
-          </p:cNvSpPr>
-          <p:nvPr>
-            <p:ph type="title"/>
-          </p:nvPr>
-        </p:nvSpPr>
-        <p:spPr/>
-        <p:txBody>
-          <a:bodyPr/>
-          <a:lstStyle/>
-          <a:p>
-            <a:r>
-              <a:t>系统功能模块</a:t>
-            </a:r>
-          </a:p>
-        </p:txBody>
-      </p:sp>
-      <p:sp>
-        <p:nvSpPr>
-          <p:cNvPr id="3" name="Content Placeholder 2"/>
-          <p:cNvSpPr>
-            <a:spLocks noGrp="1"/>
-          </p:cNvSpPr>
-          <p:nvPr>
-            <p:ph idx="1"/>
-          </p:nvPr>
-        </p:nvSpPr>
-        <p:spPr/>
-        <p:txBody>
-          <a:bodyPr/>
-          <a:lstStyle/>
-          <a:p/>
-          <a:p>
-            <a:pPr>
-              <a:defRPr sz="2000"/>
-            </a:pPr>
-            <a:r>
-              <a:t>活动管理 - 活动发布、报名管理、套票管理</a:t>
-            </a:r>
-          </a:p>
-          <a:p>
-            <a:pPr>
-              <a:defRPr sz="2000"/>
-            </a:pPr>
-            <a:r>
-              <a:t>用户管理 - 用户信息、订单查询、员工管理</a:t>
-            </a:r>
-          </a:p>
-          <a:p>
-            <a:pPr>
-              <a:defRPr sz="2000"/>
-            </a:pPr>
-            <a:r>
-              <a:t>场地管理 - 场地预订、订单管理、预定看板</a:t>
-            </a:r>
-          </a:p>
-          <a:p>
-            <a:pPr>
-              <a:defRPr sz="2000"/>
-            </a:pPr>
-            <a:r>
-              <a:t>财务管理 - 商户结算、财务报表、审核管理</a:t>
-            </a:r>
-          </a:p>
-          <a:p>
-            <a:pPr>
-              <a:defRPr sz="2000"/>
-            </a:pPr>
-            <a:r>
-              <a:t>营销管理 - Banner配置、优惠券发放</a:t>
-            </a:r>
-          </a:p>
-          <a:p>
-            <a:pPr>
-              <a:defRPr sz="2000"/>
-            </a:pPr>
-            <a:r>
-              <a:t>积分管理 - 积分规则、积分商城、订单管理</a:t>
-            </a:r>
-          </a:p>
-          <a:p>
-            <a:pPr>
-              <a:defRPr sz="2000"/>
-            </a:pPr>
-            <a:r>
-              <a:t>数据分析 - 销售统计、数据报表</a:t>
-            </a:r>
-          </a:p>
-          <a:p>
-            <a:pPr>
-              <a:defRPr sz="2000"/>
-            </a:pPr>
-            <a:r>
-              <a:t>系统设置 - 系统日志、小游戏配置</a:t>
-            </a:r>
-          </a:p>
-        </p:txBody>
-      </p:sp>
-    </p:spTree>
-  </p:cSld>
-  <p:clrMapOvr>
-    <a:masterClrMapping/>
-  </p:clrMapOvr>
-</p:sld>
-</file>
-
-<file path=ppt/slides/slide5.xml><?xml version="1.0" encoding="utf-8"?>
-<p:sld xmlns:a="http://schemas.openxmlformats.org/drawingml/2006/main" xmlns:p="http://schemas.openxmlformats.org/presentationml/2006/main" xmlns:r="http://schemas.openxmlformats.org/officeDocument/2006/relationships">
-  <p:cSld>
-    <p:spTree>
-      <p:nvGrpSpPr>
-        <p:cNvPr id="1" name=""/>
-        <p:cNvGrpSpPr/>
-        <p:nvPr/>
-      </p:nvGrpSpPr>
-      <p:grpSpPr/>
-      <p:sp>
-        <p:nvSpPr>
-          <p:cNvPr id="2" name="Title 1"/>
-          <p:cNvSpPr>
-            <a:spLocks noGrp="1"/>
-          </p:cNvSpPr>
-          <p:nvPr>
-            <p:ph type="title"/>
-          </p:nvPr>
-        </p:nvSpPr>
-        <p:spPr/>
-        <p:txBody>
-          <a:bodyPr/>
-          <a:lstStyle/>
-          <a:p/>
-        </p:txBody>
-      </p:sp>
-      <p:sp>
-        <p:nvSpPr>
-          <p:cNvPr id="3" name="TextBox 2"/>
-          <p:cNvSpPr txBox="1"/>
-          <p:nvPr/>
-        </p:nvSpPr>
-        <p:spPr>
-          <a:xfrm>
-            <a:off x="457200" y="457200"/>
-            <a:ext cx="8229600" cy="731520"/>
-          </a:xfrm>
-          <a:prstGeom prst="rect">
-            <a:avLst/>
-          </a:prstGeom>
-          <a:noFill/>
-        </p:spPr>
-        <p:txBody>
-          <a:bodyPr wrap="none">
-            <a:spAutoFit/>
-          </a:bodyPr>
-          <a:lstStyle/>
-          <a:p>
-            <a:pPr>
-              <a:defRPr sz="3200" b="1"/>
-            </a:pPr>
-            <a:r>
-              <a:t>二、系统登录</a:t>
-            </a:r>
-          </a:p>
-        </p:txBody>
-      </p:sp>
-      <p:pic>
-        <p:nvPicPr>
-          <p:cNvPr id="4" name="Picture 3" descr="01_login_page.png"/>
-          <p:cNvPicPr>
-            <a:picLocks noChangeAspect="1"/>
-          </p:cNvPicPr>
-          <p:nvPr/>
-        </p:nvPicPr>
-        <p:blipFill>
-          <a:blip r:embed="rId2"/>
-          <a:stretch>
-            <a:fillRect/>
-          </a:stretch>
-        </p:blipFill>
-        <p:spPr>
-          <a:xfrm>
-            <a:off x="914400" y="1371600"/>
-            <a:ext cx="8128000" cy="4572000"/>
-          </a:xfrm>
-          <a:prstGeom prst="rect">
-            <a:avLst/>
-          </a:prstGeom>
-        </p:spPr>
-      </p:pic>
-      <p:sp>
-        <p:nvSpPr>
-          <p:cNvPr id="5" name="TextBox 4"/>
-          <p:cNvSpPr txBox="1"/>
-          <p:nvPr/>
-        </p:nvSpPr>
-        <p:spPr>
-          <a:xfrm>
-            <a:off x="457200" y="6217920"/>
-            <a:ext cx="8229600" cy="548640"/>
-          </a:xfrm>
-          <a:prstGeom prst="rect">
-            <a:avLst/>
-          </a:prstGeom>
-          <a:noFill/>
-        </p:spPr>
-        <p:txBody>
-          <a:bodyPr wrap="none">
-            <a:spAutoFit/>
-          </a:bodyPr>
-          <a:lstStyle/>
-          <a:p>
-            <a:pPr>
-              <a:defRPr sz="1600"/>
-            </a:pPr>
-            <a:r>
-              <a:t>输入用户名和密码，点击登录按钮进入系统</a:t>
-            </a:r>
-          </a:p>
-        </p:txBody>
-      </p:sp>
-    </p:spTree>
-  </p:cSld>
-  <p:clrMapOvr>
-    <a:masterClrMapping/>
-  </p:clrMapOvr>
-</p:sld>
-</file>
-
-<file path=ppt/slides/slide6.xml><?xml version="1.0" encoding="utf-8"?>
-<p:sld xmlns:a="http://schemas.openxmlformats.org/drawingml/2006/main" xmlns:p="http://schemas.openxmlformats.org/presentationml/2006/main" xmlns:r="http://schemas.openxmlformats.org/officeDocument/2006/relationships">
-  <p:cSld>
-    <p:spTree>
-      <p:nvGrpSpPr>
-        <p:cNvPr id="1" name=""/>
-        <p:cNvGrpSpPr/>
-        <p:nvPr/>
-      </p:nvGrpSpPr>
-      <p:grpSpPr/>
-      <p:sp>
-        <p:nvSpPr>
-          <p:cNvPr id="2" name="Title 1"/>
-          <p:cNvSpPr>
-            <a:spLocks noGrp="1"/>
-          </p:cNvSpPr>
-          <p:nvPr>
-            <p:ph type="title"/>
-          </p:nvPr>
-        </p:nvSpPr>
-        <p:spPr/>
-        <p:txBody>
-          <a:bodyPr/>
-          <a:lstStyle/>
-          <a:p/>
-        </p:txBody>
-      </p:sp>
-      <p:sp>
-        <p:nvSpPr>
-          <p:cNvPr id="3" name="TextBox 2"/>
-          <p:cNvSpPr txBox="1"/>
-          <p:nvPr/>
-        </p:nvSpPr>
-        <p:spPr>
-          <a:xfrm>
-            <a:off x="457200" y="457200"/>
-            <a:ext cx="8229600" cy="731520"/>
-          </a:xfrm>
-          <a:prstGeom prst="rect">
-            <a:avLst/>
-          </a:prstGeom>
-          <a:noFill/>
-        </p:spPr>
-        <p:txBody>
-          <a:bodyPr wrap="none">
-            <a:spAutoFit/>
-          </a:bodyPr>
-          <a:lstStyle/>
-          <a:p>
-            <a:pPr>
-              <a:defRPr sz="3200" b="1"/>
-            </a:pPr>
-            <a:r>
-              <a:t>系统主界面</a:t>
-            </a:r>
-          </a:p>
-        </p:txBody>
-      </p:sp>
-      <p:pic>
-        <p:nvPicPr>
-          <p:cNvPr id="4" name="Picture 3" descr="09_dashboard.png"/>
-          <p:cNvPicPr>
-            <a:picLocks noChangeAspect="1"/>
-          </p:cNvPicPr>
-          <p:nvPr/>
-        </p:nvPicPr>
-        <p:blipFill>
-          <a:blip r:embed="rId2"/>
-          <a:stretch>
-            <a:fillRect/>
-          </a:stretch>
-        </p:blipFill>
-        <p:spPr>
-          <a:xfrm>
-            <a:off x="914400" y="1371600"/>
-            <a:ext cx="8128000" cy="4572000"/>
-          </a:xfrm>
-          <a:prstGeom prst="rect">
-            <a:avLst/>
-          </a:prstGeom>
-        </p:spPr>
-      </p:pic>
-      <p:sp>
-        <p:nvSpPr>
-          <p:cNvPr id="5" name="TextBox 4"/>
-          <p:cNvSpPr txBox="1"/>
-          <p:nvPr/>
-        </p:nvSpPr>
-        <p:spPr>
-          <a:xfrm>
-            <a:off x="457200" y="6217920"/>
-            <a:ext cx="8229600" cy="548640"/>
-          </a:xfrm>
-          <a:prstGeom prst="rect">
-            <a:avLst/>
-          </a:prstGeom>
-          <a:noFill/>
-        </p:spPr>
-        <p:txBody>
-          <a:bodyPr wrap="none">
-            <a:spAutoFit/>
-          </a:bodyPr>
-          <a:lstStyle/>
-          <a:p>
-            <a:pPr>
-              <a:defRPr sz="1600"/>
-            </a:pPr>
-            <a:r>
-              <a:t>左侧为功能菜单，右侧为工作区</a:t>
-            </a:r>
-          </a:p>
-        </p:txBody>
-      </p:sp>
-    </p:spTree>
-  </p:cSld>
-  <p:clrMapOvr>
-    <a:masterClrMapping/>
-  </p:clrMapOvr>
-</p:sld>
-</file>
-
-<file path=ppt/slides/slide7.xml><?xml version="1.0" encoding="utf-8"?>
-<p:sld xmlns:a="http://schemas.openxmlformats.org/drawingml/2006/main" xmlns:p="http://schemas.openxmlformats.org/presentationml/2006/main" xmlns:r="http://schemas.openxmlformats.org/officeDocument/2006/relationships">
-  <p:cSld>
-    <p:spTree>
-      <p:nvGrpSpPr>
-        <p:cNvPr id="1" name=""/>
-        <p:cNvGrpSpPr/>
-        <p:nvPr/>
-      </p:nvGrpSpPr>
-      <p:grpSpPr/>
-      <p:sp>
-        <p:nvSpPr>
-          <p:cNvPr id="2" name="Title 1"/>
-          <p:cNvSpPr>
-            <a:spLocks noGrp="1"/>
-          </p:cNvSpPr>
-          <p:nvPr>
-            <p:ph type="title"/>
-          </p:nvPr>
-        </p:nvSpPr>
-        <p:spPr/>
-        <p:txBody>
-          <a:bodyPr/>
-          <a:lstStyle/>
-          <a:p>
-            <a:r>
-              <a:t>三、活动管理</a:t>
-            </a:r>
-          </a:p>
-        </p:txBody>
-      </p:sp>
-      <p:sp>
-        <p:nvSpPr>
-          <p:cNvPr id="3" name="Content Placeholder 2"/>
-          <p:cNvSpPr>
-            <a:spLocks noGrp="1"/>
-          </p:cNvSpPr>
-          <p:nvPr>
-            <p:ph idx="1"/>
-          </p:nvPr>
-        </p:nvSpPr>
-        <p:spPr/>
-        <p:txBody>
-          <a:bodyPr/>
-          <a:lstStyle/>
-          <a:p/>
-          <a:p>
-            <a:pPr>
-              <a:defRPr sz="2000"/>
-            </a:pPr>
-            <a:r>
-              <a:t>活动列表</a:t>
-            </a:r>
-          </a:p>
-          <a:p>
-            <a:pPr lvl="1">
-              <a:defRPr sz="1800"/>
-            </a:pPr>
-            <a:r>
-              <a:t>  - 查看所有发布的活动</a:t>
-            </a:r>
-          </a:p>
-          <a:p>
-            <a:pPr lvl="1">
-              <a:defRPr sz="1800"/>
-            </a:pPr>
-            <a:r>
-              <a:t>  - 新增、编辑、删除活动</a:t>
-            </a:r>
-          </a:p>
-          <a:p>
-            <a:pPr lvl="1">
-              <a:defRPr sz="1800"/>
-            </a:pPr>
-            <a:r>
-              <a:t>  - 活动上下架管理</a:t>
-            </a:r>
-          </a:p>
-          <a:p>
-            <a:pPr>
-              <a:defRPr sz="2000"/>
-            </a:pPr>
-          </a:p>
-          <a:p>
-            <a:pPr>
-              <a:defRPr sz="2000"/>
-            </a:pPr>
-            <a:r>
-              <a:t>套票列表</a:t>
-            </a:r>
-          </a:p>
-          <a:p>
-            <a:pPr lvl="1">
-              <a:defRPr sz="1800"/>
-            </a:pPr>
-            <a:r>
-              <a:t>  - 管理"雪票+服务"组合套票</a:t>
-            </a:r>
-          </a:p>
-          <a:p>
-            <a:pPr lvl="1">
-              <a:defRPr sz="1800"/>
-            </a:pPr>
-            <a:r>
-              <a:t>  - 配置套票价格和内容</a:t>
-            </a:r>
-          </a:p>
-          <a:p>
-            <a:pPr lvl="1">
-              <a:defRPr sz="1800"/>
-            </a:pPr>
-            <a:r>
-              <a:t>  - 查看套票销售情况</a:t>
-            </a:r>
-          </a:p>
-        </p:txBody>
-      </p:sp>
-    </p:spTree>
-  </p:cSld>
-  <p:clrMapOvr>
-    <a:masterClrMapping/>
-  </p:clrMapOvr>
-</p:sld>
-</file>
-
-<file path=ppt/slides/slide8.xml><?xml version="1.0" encoding="utf-8"?>
-<p:sld xmlns:a="http://schemas.openxmlformats.org/drawingml/2006/main" xmlns:p="http://schemas.openxmlformats.org/presentationml/2006/main" xmlns:r="http://schemas.openxmlformats.org/officeDocument/2006/relationships">
-  <p:cSld>
-    <p:spTree>
-      <p:nvGrpSpPr>
-        <p:cNvPr id="1" name=""/>
-        <p:cNvGrpSpPr/>
-        <p:nvPr/>
-      </p:nvGrpSpPr>
-      <p:grpSpPr/>
-      <p:sp>
-        <p:nvSpPr>
-          <p:cNvPr id="2" name="Title 1"/>
-          <p:cNvSpPr>
-            <a:spLocks noGrp="1"/>
-          </p:cNvSpPr>
-          <p:nvPr>
-            <p:ph type="title"/>
-          </p:nvPr>
-        </p:nvSpPr>
-        <p:spPr/>
-        <p:txBody>
-          <a:bodyPr/>
-          <a:lstStyle/>
-          <a:p/>
-        </p:txBody>
-      </p:sp>
-      <p:sp>
-        <p:nvSpPr>
-          <p:cNvPr id="3" name="TextBox 2"/>
-          <p:cNvSpPr txBox="1"/>
-          <p:nvPr/>
-        </p:nvSpPr>
-        <p:spPr>
-          <a:xfrm>
-            <a:off x="457200" y="457200"/>
-            <a:ext cx="8229600" cy="731520"/>
-          </a:xfrm>
-          <a:prstGeom prst="rect">
-            <a:avLst/>
-          </a:prstGeom>
-          <a:noFill/>
-        </p:spPr>
-        <p:txBody>
-          <a:bodyPr wrap="none">
-            <a:spAutoFit/>
-          </a:bodyPr>
-          <a:lstStyle/>
-          <a:p>
-            <a:pPr>
-              <a:defRPr sz="3200" b="1"/>
-            </a:pPr>
-            <a:r>
-              <a:t>活动列表页面</a:t>
-            </a:r>
-          </a:p>
-        </p:txBody>
-      </p:sp>
-      <p:pic>
-        <p:nvPicPr>
-          <p:cNvPr id="4" name="Picture 3" descr="10_activity_list.png"/>
-          <p:cNvPicPr>
-            <a:picLocks noChangeAspect="1"/>
-          </p:cNvPicPr>
-          <p:nvPr/>
-        </p:nvPicPr>
-        <p:blipFill>
-          <a:blip r:embed="rId2"/>
-          <a:stretch>
-            <a:fillRect/>
-          </a:stretch>
-        </p:blipFill>
-        <p:spPr>
-          <a:xfrm>
-            <a:off x="914400" y="1371600"/>
-            <a:ext cx="8128000" cy="4572000"/>
-          </a:xfrm>
-          <a:prstGeom prst="rect">
-            <a:avLst/>
-          </a:prstGeom>
-        </p:spPr>
-      </p:pic>
-      <p:sp>
-        <p:nvSpPr>
-          <p:cNvPr id="5" name="TextBox 4"/>
-          <p:cNvSpPr txBox="1"/>
-          <p:nvPr/>
-        </p:nvSpPr>
-        <p:spPr>
-          <a:xfrm>
-            <a:off x="457200" y="6217920"/>
-            <a:ext cx="8229600" cy="548640"/>
-          </a:xfrm>
-          <a:prstGeom prst="rect">
-            <a:avLst/>
-          </a:prstGeom>
-          <a:noFill/>
-        </p:spPr>
-        <p:txBody>
-          <a:bodyPr wrap="none">
-            <a:spAutoFit/>
-          </a:bodyPr>
-          <a:lstStyle/>
-          <a:p>
-            <a:pPr>
-              <a:defRPr sz="1600"/>
-            </a:pPr>
-            <a:r>
-              <a:t>可以查询、新增、编辑活动，管理活动状态</a:t>
+              <a:t>查看用户信息，管理用户状态和订单</a:t>
             </a:r>
           </a:p>
         </p:txBody>
@@ -6823,91 +5336,116 @@
         <p:txBody>
           <a:bodyPr/>
           <a:lstStyle/>
+          <a:p>
+            <a:r>
+              <a:t>三、其他功能模块</a:t>
+            </a:r>
+          </a:p>
+        </p:txBody>
+      </p:sp>
+      <p:sp>
+        <p:nvSpPr>
+          <p:cNvPr id="3" name="Content Placeholder 2"/>
+          <p:cNvSpPr>
+            <a:spLocks noGrp="1"/>
+          </p:cNvSpPr>
+          <p:nvPr>
+            <p:ph idx="1"/>
+          </p:nvPr>
+        </p:nvSpPr>
+        <p:spPr/>
+        <p:txBody>
+          <a:bodyPr/>
+          <a:lstStyle/>
           <a:p/>
-        </p:txBody>
-      </p:sp>
-      <p:sp>
-        <p:nvSpPr>
-          <p:cNvPr id="3" name="TextBox 2"/>
-          <p:cNvSpPr txBox="1"/>
-          <p:nvPr/>
-        </p:nvSpPr>
-        <p:spPr>
-          <a:xfrm>
-            <a:off x="457200" y="457200"/>
-            <a:ext cx="8229600" cy="731520"/>
-          </a:xfrm>
-          <a:prstGeom prst="rect">
-            <a:avLst/>
-          </a:prstGeom>
-          <a:noFill/>
-        </p:spPr>
-        <p:txBody>
-          <a:bodyPr wrap="none">
-            <a:spAutoFit/>
-          </a:bodyPr>
-          <a:lstStyle/>
-          <a:p>
-            <a:pPr>
-              <a:defRPr sz="3200" b="1"/>
-            </a:pPr>
-            <a:r>
-              <a:t>套票列表页面</a:t>
-            </a:r>
-          </a:p>
-        </p:txBody>
-      </p:sp>
-      <p:pic>
-        <p:nvPicPr>
-          <p:cNvPr id="4" name="Picture 3" descr="12_package_list.png"/>
-          <p:cNvPicPr>
-            <a:picLocks noChangeAspect="1"/>
-          </p:cNvPicPr>
-          <p:nvPr/>
-        </p:nvPicPr>
-        <p:blipFill>
-          <a:blip r:embed="rId2"/>
-          <a:stretch>
-            <a:fillRect/>
-          </a:stretch>
-        </p:blipFill>
-        <p:spPr>
-          <a:xfrm>
-            <a:off x="914400" y="1371600"/>
-            <a:ext cx="8128000" cy="4572000"/>
-          </a:xfrm>
-          <a:prstGeom prst="rect">
-            <a:avLst/>
-          </a:prstGeom>
-        </p:spPr>
-      </p:pic>
-      <p:sp>
-        <p:nvSpPr>
-          <p:cNvPr id="5" name="TextBox 4"/>
-          <p:cNvSpPr txBox="1"/>
-          <p:nvPr/>
-        </p:nvSpPr>
-        <p:spPr>
-          <a:xfrm>
-            <a:off x="457200" y="6217920"/>
-            <a:ext cx="8229600" cy="548640"/>
-          </a:xfrm>
-          <a:prstGeom prst="rect">
-            <a:avLst/>
-          </a:prstGeom>
-          <a:noFill/>
-        </p:spPr>
-        <p:txBody>
-          <a:bodyPr wrap="none">
-            <a:spAutoFit/>
-          </a:bodyPr>
-          <a:lstStyle/>
-          <a:p>
-            <a:pPr>
-              <a:defRPr sz="1600"/>
-            </a:pPr>
-            <a:r>
-              <a:t>管理套票信息、价格和销售状态</a:t>
+          <a:p>
+            <a:pPr>
+              <a:defRPr sz="2000"/>
+            </a:pPr>
+            <a:r>
+              <a:t>4. 财务管理</a:t>
+            </a:r>
+          </a:p>
+          <a:p>
+            <a:pPr lvl="1">
+              <a:defRPr sz="1800"/>
+            </a:pPr>
+            <a:r>
+              <a:t>   • 商户结算审核</a:t>
+            </a:r>
+          </a:p>
+          <a:p>
+            <a:pPr lvl="1">
+              <a:defRPr sz="1800"/>
+            </a:pPr>
+            <a:r>
+              <a:t>   • 财务报表查看</a:t>
+            </a:r>
+          </a:p>
+          <a:p>
+            <a:pPr>
+              <a:defRPr sz="2000"/>
+            </a:pPr>
+          </a:p>
+          <a:p>
+            <a:pPr>
+              <a:defRPr sz="2000"/>
+            </a:pPr>
+            <a:r>
+              <a:t>5. 营销管理</a:t>
+            </a:r>
+          </a:p>
+          <a:p>
+            <a:pPr lvl="1">
+              <a:defRPr sz="1800"/>
+            </a:pPr>
+            <a:r>
+              <a:t>   • Banner配置：首页轮播图</a:t>
+            </a:r>
+          </a:p>
+          <a:p>
+            <a:pPr lvl="1">
+              <a:defRPr sz="1800"/>
+            </a:pPr>
+            <a:r>
+              <a:t>   • 优惠券发放：优惠活动</a:t>
+            </a:r>
+          </a:p>
+          <a:p>
+            <a:pPr>
+              <a:defRPr sz="2000"/>
+            </a:pPr>
+          </a:p>
+          <a:p>
+            <a:pPr>
+              <a:defRPr sz="2000"/>
+            </a:pPr>
+            <a:r>
+              <a:t>6. 积分管理</a:t>
+            </a:r>
+          </a:p>
+          <a:p>
+            <a:pPr lvl="1">
+              <a:defRPr sz="1800"/>
+            </a:pPr>
+            <a:r>
+              <a:t>   • 积分规则设置</a:t>
+            </a:r>
+          </a:p>
+          <a:p>
+            <a:pPr lvl="1">
+              <a:defRPr sz="1800"/>
+            </a:pPr>
+            <a:r>
+              <a:t>   • 积分商城管理</a:t>
+            </a:r>
+          </a:p>
+          <a:p>
+            <a:pPr lvl="1">
+              <a:defRPr sz="1800"/>
+            </a:pPr>
+            <a:r>
+              <a:t>   • 积分订单处理</a:t>
             </a:r>
           </a:p>
         </p:txBody>

</xml_diff>

<commit_message>
Optimize training documents: simplified PPT and enriched manual
Major improvements:
1. Training PPT - Reduced to only 3 key screenshots (10 slides total)
   - Login page, Dashboard, User management
   - Focused on core concepts and procedures
   - File size: 544KB

2. Training Manual - Enriched with comprehensive content (16 screenshots)
   - Added 16 detailed screenshots covering all modules
   - Included step-by-step operation guides
   - Added creation/editing procedures (e.g., activity creation, staff adding)
   - Detailed configuration instructions for each feature
   - Enhanced FAQ section with practical solutions
   - File size: 2.1MB

Features covered with screenshots:
- System login and navigation
- Activity and package management
- User and staff management (with add staff dialog)
- Venue and order management
- Financial settlement
- Banner and coupon management
- Points rules and orders
- Sales statistics
- System logs

All screenshots display Chinese correctly.
</commit_message>
<xml_diff>
--- a/非雪季系统培训PPT.pptx
+++ b/非雪季系统培训PPT.pptx
@@ -15,15 +15,6 @@
     <p:sldId id="263" r:id="rId14"/>
     <p:sldId id="264" r:id="rId15"/>
     <p:sldId id="265" r:id="rId16"/>
-    <p:sldId id="266" r:id="rId17"/>
-    <p:sldId id="267" r:id="rId18"/>
-    <p:sldId id="268" r:id="rId19"/>
-    <p:sldId id="269" r:id="rId20"/>
-    <p:sldId id="270" r:id="rId21"/>
-    <p:sldId id="271" r:id="rId22"/>
-    <p:sldId id="272" r:id="rId23"/>
-    <p:sldId id="273" r:id="rId24"/>
-    <p:sldId id="274" r:id="rId25"/>
   </p:sldIdLst>
   <p:sldSz cx="9144000" cy="6858000" type="screen4x3"/>
   <p:notesSz cx="6858000" cy="9144000"/>
@@ -3122,7 +3113,7 @@
           <a:lstStyle/>
           <a:p>
             <a:pPr>
-              <a:defRPr sz="4400" b="1"/>
+              <a:defRPr sz="4400"/>
             </a:pPr>
             <a:r>
               <a:t>非雪季系统培训</a:t>
@@ -3156,11 +3147,6 @@
           <a:p>
             <a:r>
               <a:t>系统版本：V1.0</a:t>
-            </a:r>
-          </a:p>
-          <a:p>
-            <a:r>
-              <a:t>培训日期：2025年11月</a:t>
             </a:r>
           </a:p>
         </p:txBody>
@@ -3190,1229 +3176,16 @@
             <a:spLocks noGrp="1"/>
           </p:cNvSpPr>
           <p:nvPr>
-            <p:ph type="title"/>
-          </p:nvPr>
-        </p:nvSpPr>
-        <p:spPr/>
-        <p:txBody>
-          <a:bodyPr/>
-          <a:lstStyle/>
-          <a:p/>
-        </p:txBody>
-      </p:sp>
-      <p:sp>
-        <p:nvSpPr>
-          <p:cNvPr id="3" name="TextBox 2"/>
-          <p:cNvSpPr txBox="1"/>
-          <p:nvPr/>
-        </p:nvSpPr>
-        <p:spPr>
-          <a:xfrm>
-            <a:off x="457200" y="457200"/>
-            <a:ext cx="8229600" cy="731520"/>
-          </a:xfrm>
-          <a:prstGeom prst="rect">
-            <a:avLst/>
-          </a:prstGeom>
-          <a:noFill/>
-        </p:spPr>
-        <p:txBody>
-          <a:bodyPr wrap="none">
-            <a:spAutoFit/>
-          </a:bodyPr>
+            <p:ph type="ctrTitle"/>
+          </p:nvPr>
+        </p:nvSpPr>
+        <p:spPr/>
+        <p:txBody>
+          <a:bodyPr/>
           <a:lstStyle/>
           <a:p>
             <a:pPr>
-              <a:defRPr sz="3200" b="1"/>
-            </a:pPr>
-            <a:r>
-              <a:t>营销管理 - Banner配置</a:t>
-            </a:r>
-          </a:p>
-        </p:txBody>
-      </p:sp>
-      <p:pic>
-        <p:nvPicPr>
-          <p:cNvPr id="4" name="Picture 3" descr="06_banner.png"/>
-          <p:cNvPicPr>
-            <a:picLocks noChangeAspect="1"/>
-          </p:cNvPicPr>
-          <p:nvPr/>
-        </p:nvPicPr>
-        <p:blipFill>
-          <a:blip r:embed="rId2"/>
-          <a:stretch>
-            <a:fillRect/>
-          </a:stretch>
-        </p:blipFill>
-        <p:spPr>
-          <a:xfrm>
-            <a:off x="914400" y="1371600"/>
-            <a:ext cx="8128000" cy="4572000"/>
-          </a:xfrm>
-          <a:prstGeom prst="rect">
-            <a:avLst/>
-          </a:prstGeom>
-        </p:spPr>
-      </p:pic>
-      <p:sp>
-        <p:nvSpPr>
-          <p:cNvPr id="5" name="TextBox 4"/>
-          <p:cNvSpPr txBox="1"/>
-          <p:nvPr/>
-        </p:nvSpPr>
-        <p:spPr>
-          <a:xfrm>
-            <a:off x="457200" y="6217920"/>
-            <a:ext cx="8229600" cy="548640"/>
-          </a:xfrm>
-          <a:prstGeom prst="rect">
-            <a:avLst/>
-          </a:prstGeom>
-          <a:noFill/>
-        </p:spPr>
-        <p:txBody>
-          <a:bodyPr wrap="none">
-            <a:spAutoFit/>
-          </a:bodyPr>
-          <a:lstStyle/>
-          <a:p>
-            <a:pPr>
-              <a:defRPr sz="1600"/>
-            </a:pPr>
-            <a:r>
-              <a:t>配置小程序首页轮播图，设置跳转链接</a:t>
-            </a:r>
-          </a:p>
-        </p:txBody>
-      </p:sp>
-    </p:spTree>
-  </p:cSld>
-  <p:clrMapOvr>
-    <a:masterClrMapping/>
-  </p:clrMapOvr>
-</p:sld>
-</file>
-
-<file path=ppt/slides/slide11.xml><?xml version="1.0" encoding="utf-8"?>
-<p:sld xmlns:a="http://schemas.openxmlformats.org/drawingml/2006/main" xmlns:p="http://schemas.openxmlformats.org/presentationml/2006/main" xmlns:r="http://schemas.openxmlformats.org/officeDocument/2006/relationships">
-  <p:cSld>
-    <p:spTree>
-      <p:nvGrpSpPr>
-        <p:cNvPr id="1" name=""/>
-        <p:cNvGrpSpPr/>
-        <p:nvPr/>
-      </p:nvGrpSpPr>
-      <p:grpSpPr/>
-      <p:sp>
-        <p:nvSpPr>
-          <p:cNvPr id="2" name="Title 1"/>
-          <p:cNvSpPr>
-            <a:spLocks noGrp="1"/>
-          </p:cNvSpPr>
-          <p:nvPr>
-            <p:ph type="title"/>
-          </p:nvPr>
-        </p:nvSpPr>
-        <p:spPr/>
-        <p:txBody>
-          <a:bodyPr/>
-          <a:lstStyle/>
-          <a:p>
-            <a:r>
-              <a:t>数据分析</a:t>
-            </a:r>
-          </a:p>
-        </p:txBody>
-      </p:sp>
-      <p:sp>
-        <p:nvSpPr>
-          <p:cNvPr id="3" name="Content Placeholder 2"/>
-          <p:cNvSpPr>
-            <a:spLocks noGrp="1"/>
-          </p:cNvSpPr>
-          <p:nvPr>
-            <p:ph idx="1"/>
-          </p:nvPr>
-        </p:nvSpPr>
-        <p:spPr/>
-        <p:txBody>
-          <a:bodyPr/>
-          <a:lstStyle/>
-          <a:p/>
-          <a:p>
-            <a:pPr>
-              <a:defRPr sz="2000"/>
-            </a:pPr>
-            <a:r>
-              <a:t>7. 数据分析功能</a:t>
-            </a:r>
-          </a:p>
-          <a:p>
-            <a:pPr>
-              <a:defRPr sz="2000"/>
-            </a:pPr>
-          </a:p>
-          <a:p>
-            <a:pPr>
-              <a:defRPr sz="2000"/>
-            </a:pPr>
-            <a:r>
-              <a:t>销售统计</a:t>
-            </a:r>
-          </a:p>
-          <a:p>
-            <a:pPr lvl="1">
-              <a:defRPr sz="1800"/>
-            </a:pPr>
-            <a:r>
-              <a:t>  • 查看关键指标：销售额、订单数、客单价</a:t>
-            </a:r>
-          </a:p>
-          <a:p>
-            <a:pPr lvl="1">
-              <a:defRPr sz="1800"/>
-            </a:pPr>
-            <a:r>
-              <a:t>  • 分析销售趋势</a:t>
-            </a:r>
-          </a:p>
-          <a:p>
-            <a:pPr lvl="1">
-              <a:defRPr sz="1800"/>
-            </a:pPr>
-            <a:r>
-              <a:t>  • 品类占比分析</a:t>
-            </a:r>
-          </a:p>
-          <a:p>
-            <a:pPr lvl="1">
-              <a:defRPr sz="1800"/>
-            </a:pPr>
-            <a:r>
-              <a:t>  • 导出统计报表</a:t>
-            </a:r>
-          </a:p>
-          <a:p>
-            <a:pPr>
-              <a:defRPr sz="2000"/>
-            </a:pPr>
-          </a:p>
-          <a:p>
-            <a:pPr>
-              <a:defRPr sz="2000"/>
-            </a:pPr>
-            <a:r>
-              <a:t>用途：辅助经营决策</a:t>
-            </a:r>
-          </a:p>
-        </p:txBody>
-      </p:sp>
-    </p:spTree>
-  </p:cSld>
-  <p:clrMapOvr>
-    <a:masterClrMapping/>
-  </p:clrMapOvr>
-</p:sld>
-</file>
-
-<file path=ppt/slides/slide12.xml><?xml version="1.0" encoding="utf-8"?>
-<p:sld xmlns:a="http://schemas.openxmlformats.org/drawingml/2006/main" xmlns:p="http://schemas.openxmlformats.org/presentationml/2006/main" xmlns:r="http://schemas.openxmlformats.org/officeDocument/2006/relationships">
-  <p:cSld>
-    <p:spTree>
-      <p:nvGrpSpPr>
-        <p:cNvPr id="1" name=""/>
-        <p:cNvGrpSpPr/>
-        <p:nvPr/>
-      </p:nvGrpSpPr>
-      <p:grpSpPr/>
-      <p:sp>
-        <p:nvSpPr>
-          <p:cNvPr id="2" name="Title 1"/>
-          <p:cNvSpPr>
-            <a:spLocks noGrp="1"/>
-          </p:cNvSpPr>
-          <p:nvPr>
-            <p:ph type="title"/>
-          </p:nvPr>
-        </p:nvSpPr>
-        <p:spPr/>
-        <p:txBody>
-          <a:bodyPr/>
-          <a:lstStyle/>
-          <a:p/>
-        </p:txBody>
-      </p:sp>
-      <p:sp>
-        <p:nvSpPr>
-          <p:cNvPr id="3" name="TextBox 2"/>
-          <p:cNvSpPr txBox="1"/>
-          <p:nvPr/>
-        </p:nvSpPr>
-        <p:spPr>
-          <a:xfrm>
-            <a:off x="457200" y="457200"/>
-            <a:ext cx="8229600" cy="731520"/>
-          </a:xfrm>
-          <a:prstGeom prst="rect">
-            <a:avLst/>
-          </a:prstGeom>
-          <a:noFill/>
-        </p:spPr>
-        <p:txBody>
-          <a:bodyPr wrap="none">
-            <a:spAutoFit/>
-          </a:bodyPr>
-          <a:lstStyle/>
-          <a:p>
-            <a:pPr>
-              <a:defRPr sz="3200" b="1"/>
-            </a:pPr>
-            <a:r>
-              <a:t>销售统计页面</a:t>
-            </a:r>
-          </a:p>
-        </p:txBody>
-      </p:sp>
-      <p:pic>
-        <p:nvPicPr>
-          <p:cNvPr id="4" name="Picture 3" descr="07_statistics.png"/>
-          <p:cNvPicPr>
-            <a:picLocks noChangeAspect="1"/>
-          </p:cNvPicPr>
-          <p:nvPr/>
-        </p:nvPicPr>
-        <p:blipFill>
-          <a:blip r:embed="rId2"/>
-          <a:stretch>
-            <a:fillRect/>
-          </a:stretch>
-        </p:blipFill>
-        <p:spPr>
-          <a:xfrm>
-            <a:off x="914400" y="1371600"/>
-            <a:ext cx="8128000" cy="4572000"/>
-          </a:xfrm>
-          <a:prstGeom prst="rect">
-            <a:avLst/>
-          </a:prstGeom>
-        </p:spPr>
-      </p:pic>
-      <p:sp>
-        <p:nvSpPr>
-          <p:cNvPr id="5" name="TextBox 4"/>
-          <p:cNvSpPr txBox="1"/>
-          <p:nvPr/>
-        </p:nvSpPr>
-        <p:spPr>
-          <a:xfrm>
-            <a:off x="457200" y="6217920"/>
-            <a:ext cx="8229600" cy="548640"/>
-          </a:xfrm>
-          <a:prstGeom prst="rect">
-            <a:avLst/>
-          </a:prstGeom>
-          <a:noFill/>
-        </p:spPr>
-        <p:txBody>
-          <a:bodyPr wrap="none">
-            <a:spAutoFit/>
-          </a:bodyPr>
-          <a:lstStyle/>
-          <a:p>
-            <a:pPr>
-              <a:defRPr sz="1600"/>
-            </a:pPr>
-            <a:r>
-              <a:t>查看销售数据，分析经营状况</a:t>
-            </a:r>
-          </a:p>
-        </p:txBody>
-      </p:sp>
-    </p:spTree>
-  </p:cSld>
-  <p:clrMapOvr>
-    <a:masterClrMapping/>
-  </p:clrMapOvr>
-</p:sld>
-</file>
-
-<file path=ppt/slides/slide13.xml><?xml version="1.0" encoding="utf-8"?>
-<p:sld xmlns:a="http://schemas.openxmlformats.org/drawingml/2006/main" xmlns:p="http://schemas.openxmlformats.org/presentationml/2006/main" xmlns:r="http://schemas.openxmlformats.org/officeDocument/2006/relationships">
-  <p:cSld>
-    <p:spTree>
-      <p:nvGrpSpPr>
-        <p:cNvPr id="1" name=""/>
-        <p:cNvGrpSpPr/>
-        <p:nvPr/>
-      </p:nvGrpSpPr>
-      <p:grpSpPr/>
-      <p:sp>
-        <p:nvSpPr>
-          <p:cNvPr id="2" name="Title 1"/>
-          <p:cNvSpPr>
-            <a:spLocks noGrp="1"/>
-          </p:cNvSpPr>
-          <p:nvPr>
-            <p:ph type="title"/>
-          </p:nvPr>
-        </p:nvSpPr>
-        <p:spPr/>
-        <p:txBody>
-          <a:bodyPr/>
-          <a:lstStyle/>
-          <a:p>
-            <a:r>
-              <a:t>四、操作技巧</a:t>
-            </a:r>
-          </a:p>
-        </p:txBody>
-      </p:sp>
-      <p:sp>
-        <p:nvSpPr>
-          <p:cNvPr id="3" name="Content Placeholder 2"/>
-          <p:cNvSpPr>
-            <a:spLocks noGrp="1"/>
-          </p:cNvSpPr>
-          <p:nvPr>
-            <p:ph idx="1"/>
-          </p:nvPr>
-        </p:nvSpPr>
-        <p:spPr/>
-        <p:txBody>
-          <a:bodyPr/>
-          <a:lstStyle/>
-          <a:p/>
-          <a:p>
-            <a:pPr>
-              <a:defRPr sz="2000"/>
-            </a:pPr>
-            <a:r>
-              <a:t>快捷操作</a:t>
-            </a:r>
-          </a:p>
-          <a:p>
-            <a:pPr lvl="1">
-              <a:defRPr sz="1800"/>
-            </a:pPr>
-            <a:r>
-              <a:t>  • Ctrl + S：快速保存</a:t>
-            </a:r>
-          </a:p>
-          <a:p>
-            <a:pPr lvl="1">
-              <a:defRPr sz="1800"/>
-            </a:pPr>
-            <a:r>
-              <a:t>  • Ctrl + F：打开搜索</a:t>
-            </a:r>
-          </a:p>
-          <a:p>
-            <a:pPr lvl="1">
-              <a:defRPr sz="1800"/>
-            </a:pPr>
-            <a:r>
-              <a:t>  • F5：刷新页面</a:t>
-            </a:r>
-          </a:p>
-          <a:p>
-            <a:pPr lvl="1">
-              <a:defRPr sz="1800"/>
-            </a:pPr>
-            <a:r>
-              <a:t>  • Esc：关闭弹窗</a:t>
-            </a:r>
-          </a:p>
-          <a:p>
-            <a:pPr>
-              <a:defRPr sz="2000"/>
-            </a:pPr>
-          </a:p>
-          <a:p>
-            <a:pPr>
-              <a:defRPr sz="2000"/>
-            </a:pPr>
-            <a:r>
-              <a:t>查询技巧</a:t>
-            </a:r>
-          </a:p>
-          <a:p>
-            <a:pPr lvl="1">
-              <a:defRPr sz="1800"/>
-            </a:pPr>
-            <a:r>
-              <a:t>  • 支持模糊查询（姓名、手机号）</a:t>
-            </a:r>
-          </a:p>
-          <a:p>
-            <a:pPr lvl="1">
-              <a:defRPr sz="1800"/>
-            </a:pPr>
-            <a:r>
-              <a:t>  • 使用时间范围筛选</a:t>
-            </a:r>
-          </a:p>
-          <a:p>
-            <a:pPr lvl="1">
-              <a:defRPr sz="1800"/>
-            </a:pPr>
-            <a:r>
-              <a:t>  • 组合多个条件精确查询</a:t>
-            </a:r>
-          </a:p>
-          <a:p>
-            <a:pPr lvl="1">
-              <a:defRPr sz="1800"/>
-            </a:pPr>
-            <a:r>
-              <a:t>  • 导出筛选后的数据</a:t>
-            </a:r>
-          </a:p>
-        </p:txBody>
-      </p:sp>
-    </p:spTree>
-  </p:cSld>
-  <p:clrMapOvr>
-    <a:masterClrMapping/>
-  </p:clrMapOvr>
-</p:sld>
-</file>
-
-<file path=ppt/slides/slide14.xml><?xml version="1.0" encoding="utf-8"?>
-<p:sld xmlns:a="http://schemas.openxmlformats.org/drawingml/2006/main" xmlns:p="http://schemas.openxmlformats.org/presentationml/2006/main" xmlns:r="http://schemas.openxmlformats.org/officeDocument/2006/relationships">
-  <p:cSld>
-    <p:spTree>
-      <p:nvGrpSpPr>
-        <p:cNvPr id="1" name=""/>
-        <p:cNvGrpSpPr/>
-        <p:nvPr/>
-      </p:nvGrpSpPr>
-      <p:grpSpPr/>
-      <p:sp>
-        <p:nvSpPr>
-          <p:cNvPr id="2" name="Title 1"/>
-          <p:cNvSpPr>
-            <a:spLocks noGrp="1"/>
-          </p:cNvSpPr>
-          <p:nvPr>
-            <p:ph type="title"/>
-          </p:nvPr>
-        </p:nvSpPr>
-        <p:spPr/>
-        <p:txBody>
-          <a:bodyPr/>
-          <a:lstStyle/>
-          <a:p>
-            <a:r>
-              <a:t>五、常见问题 - 登录</a:t>
-            </a:r>
-          </a:p>
-        </p:txBody>
-      </p:sp>
-      <p:sp>
-        <p:nvSpPr>
-          <p:cNvPr id="3" name="Content Placeholder 2"/>
-          <p:cNvSpPr>
-            <a:spLocks noGrp="1"/>
-          </p:cNvSpPr>
-          <p:nvPr>
-            <p:ph idx="1"/>
-          </p:nvPr>
-        </p:nvSpPr>
-        <p:spPr/>
-        <p:txBody>
-          <a:bodyPr/>
-          <a:lstStyle/>
-          <a:p/>
-          <a:p>
-            <a:pPr>
-              <a:defRPr sz="2000"/>
-            </a:pPr>
-            <a:r>
-              <a:t>Q：忘记密码怎么办？</a:t>
-            </a:r>
-          </a:p>
-          <a:p>
-            <a:pPr>
-              <a:defRPr sz="2000"/>
-            </a:pPr>
-            <a:r>
-              <a:t>A：联系系统管理员重置密码</a:t>
-            </a:r>
-          </a:p>
-          <a:p>
-            <a:pPr>
-              <a:defRPr sz="2000"/>
-            </a:pPr>
-          </a:p>
-          <a:p>
-            <a:pPr>
-              <a:defRPr sz="2000"/>
-            </a:pPr>
-            <a:r>
-              <a:t>Q：为什么自动退出？</a:t>
-            </a:r>
-          </a:p>
-          <a:p>
-            <a:pPr>
-              <a:defRPr sz="2000"/>
-            </a:pPr>
-            <a:r>
-              <a:t>A：30分钟无操作会自动退出，重新登录即可</a:t>
-            </a:r>
-          </a:p>
-          <a:p>
-            <a:pPr>
-              <a:defRPr sz="2000"/>
-            </a:pPr>
-          </a:p>
-          <a:p>
-            <a:pPr>
-              <a:defRPr sz="2000"/>
-            </a:pPr>
-            <a:r>
-              <a:t>Q：看不到某些菜单？</a:t>
-            </a:r>
-          </a:p>
-          <a:p>
-            <a:pPr>
-              <a:defRPr sz="2000"/>
-            </a:pPr>
-            <a:r>
-              <a:t>A：检查账号权限，联系管理员分配权限</a:t>
-            </a:r>
-          </a:p>
-          <a:p>
-            <a:pPr>
-              <a:defRPr sz="2000"/>
-            </a:pPr>
-          </a:p>
-          <a:p>
-            <a:pPr>
-              <a:defRPr sz="2000"/>
-            </a:pPr>
-            <a:r>
-              <a:t>Q：提示账号已在其他地方登录？</a:t>
-            </a:r>
-          </a:p>
-          <a:p>
-            <a:pPr>
-              <a:defRPr sz="2000"/>
-            </a:pPr>
-            <a:r>
-              <a:t>A：同一账号不能同时登录，立即修改密码</a:t>
-            </a:r>
-          </a:p>
-        </p:txBody>
-      </p:sp>
-    </p:spTree>
-  </p:cSld>
-  <p:clrMapOvr>
-    <a:masterClrMapping/>
-  </p:clrMapOvr>
-</p:sld>
-</file>
-
-<file path=ppt/slides/slide15.xml><?xml version="1.0" encoding="utf-8"?>
-<p:sld xmlns:a="http://schemas.openxmlformats.org/drawingml/2006/main" xmlns:p="http://schemas.openxmlformats.org/presentationml/2006/main" xmlns:r="http://schemas.openxmlformats.org/officeDocument/2006/relationships">
-  <p:cSld>
-    <p:spTree>
-      <p:nvGrpSpPr>
-        <p:cNvPr id="1" name=""/>
-        <p:cNvGrpSpPr/>
-        <p:nvPr/>
-      </p:nvGrpSpPr>
-      <p:grpSpPr/>
-      <p:sp>
-        <p:nvSpPr>
-          <p:cNvPr id="2" name="Title 1"/>
-          <p:cNvSpPr>
-            <a:spLocks noGrp="1"/>
-          </p:cNvSpPr>
-          <p:nvPr>
-            <p:ph type="title"/>
-          </p:nvPr>
-        </p:nvSpPr>
-        <p:spPr/>
-        <p:txBody>
-          <a:bodyPr/>
-          <a:lstStyle/>
-          <a:p>
-            <a:r>
-              <a:t>常见问题 - 操作</a:t>
-            </a:r>
-          </a:p>
-        </p:txBody>
-      </p:sp>
-      <p:sp>
-        <p:nvSpPr>
-          <p:cNvPr id="3" name="Content Placeholder 2"/>
-          <p:cNvSpPr>
-            <a:spLocks noGrp="1"/>
-          </p:cNvSpPr>
-          <p:nvPr>
-            <p:ph idx="1"/>
-          </p:nvPr>
-        </p:nvSpPr>
-        <p:spPr/>
-        <p:txBody>
-          <a:bodyPr/>
-          <a:lstStyle/>
-          <a:p/>
-          <a:p>
-            <a:pPr>
-              <a:defRPr sz="2000"/>
-            </a:pPr>
-            <a:r>
-              <a:t>Q：数据保存失败？</a:t>
-            </a:r>
-          </a:p>
-          <a:p>
-            <a:pPr>
-              <a:defRPr sz="2000"/>
-            </a:pPr>
-            <a:r>
-              <a:t>A：检查必填项、数据格式、网络连接</a:t>
-            </a:r>
-          </a:p>
-          <a:p>
-            <a:pPr>
-              <a:defRPr sz="2000"/>
-            </a:pPr>
-          </a:p>
-          <a:p>
-            <a:pPr>
-              <a:defRPr sz="2000"/>
-            </a:pPr>
-            <a:r>
-              <a:t>Q：图片上传失败？</a:t>
-            </a:r>
-          </a:p>
-          <a:p>
-            <a:pPr>
-              <a:defRPr sz="2000"/>
-            </a:pPr>
-            <a:r>
-              <a:t>A：确保图片&lt;2MB，格式为jpg/png/gif</a:t>
-            </a:r>
-          </a:p>
-          <a:p>
-            <a:pPr>
-              <a:defRPr sz="2000"/>
-            </a:pPr>
-          </a:p>
-          <a:p>
-            <a:pPr>
-              <a:defRPr sz="2000"/>
-            </a:pPr>
-            <a:r>
-              <a:t>Q：页面显示异常？</a:t>
-            </a:r>
-          </a:p>
-          <a:p>
-            <a:pPr>
-              <a:defRPr sz="2000"/>
-            </a:pPr>
-            <a:r>
-              <a:t>A：刷新页面(F5)、清除缓存、使用Chrome浏览器</a:t>
-            </a:r>
-          </a:p>
-          <a:p>
-            <a:pPr>
-              <a:defRPr sz="2000"/>
-            </a:pPr>
-          </a:p>
-          <a:p>
-            <a:pPr>
-              <a:defRPr sz="2000"/>
-            </a:pPr>
-            <a:r>
-              <a:t>Q：数据统计不准确？</a:t>
-            </a:r>
-          </a:p>
-          <a:p>
-            <a:pPr>
-              <a:defRPr sz="2000"/>
-            </a:pPr>
-            <a:r>
-              <a:t>A：检查时间范围、筛选条件，数据延迟5分钟内</a:t>
-            </a:r>
-          </a:p>
-        </p:txBody>
-      </p:sp>
-    </p:spTree>
-  </p:cSld>
-  <p:clrMapOvr>
-    <a:masterClrMapping/>
-  </p:clrMapOvr>
-</p:sld>
-</file>
-
-<file path=ppt/slides/slide16.xml><?xml version="1.0" encoding="utf-8"?>
-<p:sld xmlns:a="http://schemas.openxmlformats.org/drawingml/2006/main" xmlns:p="http://schemas.openxmlformats.org/presentationml/2006/main" xmlns:r="http://schemas.openxmlformats.org/officeDocument/2006/relationships">
-  <p:cSld>
-    <p:spTree>
-      <p:nvGrpSpPr>
-        <p:cNvPr id="1" name=""/>
-        <p:cNvGrpSpPr/>
-        <p:nvPr/>
-      </p:nvGrpSpPr>
-      <p:grpSpPr/>
-      <p:sp>
-        <p:nvSpPr>
-          <p:cNvPr id="2" name="Title 1"/>
-          <p:cNvSpPr>
-            <a:spLocks noGrp="1"/>
-          </p:cNvSpPr>
-          <p:nvPr>
-            <p:ph type="title"/>
-          </p:nvPr>
-        </p:nvSpPr>
-        <p:spPr/>
-        <p:txBody>
-          <a:bodyPr/>
-          <a:lstStyle/>
-          <a:p>
-            <a:r>
-              <a:t>六、注意事项</a:t>
-            </a:r>
-          </a:p>
-        </p:txBody>
-      </p:sp>
-      <p:sp>
-        <p:nvSpPr>
-          <p:cNvPr id="3" name="Content Placeholder 2"/>
-          <p:cNvSpPr>
-            <a:spLocks noGrp="1"/>
-          </p:cNvSpPr>
-          <p:nvPr>
-            <p:ph idx="1"/>
-          </p:nvPr>
-        </p:nvSpPr>
-        <p:spPr/>
-        <p:txBody>
-          <a:bodyPr/>
-          <a:lstStyle/>
-          <a:p/>
-          <a:p>
-            <a:pPr>
-              <a:defRPr sz="2000"/>
-            </a:pPr>
-            <a:r>
-              <a:t>安全规范</a:t>
-            </a:r>
-          </a:p>
-          <a:p>
-            <a:pPr lvl="1">
-              <a:defRPr sz="1800"/>
-            </a:pPr>
-            <a:r>
-              <a:t>  ✓ 定期修改密码（建议3个月一次）</a:t>
-            </a:r>
-          </a:p>
-          <a:p>
-            <a:pPr lvl="1">
-              <a:defRPr sz="1800"/>
-            </a:pPr>
-            <a:r>
-              <a:t>  ✓ 不要将账号密码告知他人</a:t>
-            </a:r>
-          </a:p>
-          <a:p>
-            <a:pPr lvl="1">
-              <a:defRPr sz="1800"/>
-            </a:pPr>
-            <a:r>
-              <a:t>  ✓ 使用后及时退出系统</a:t>
-            </a:r>
-          </a:p>
-          <a:p>
-            <a:pPr>
-              <a:defRPr sz="2000"/>
-            </a:pPr>
-          </a:p>
-          <a:p>
-            <a:pPr>
-              <a:defRPr sz="2000"/>
-            </a:pPr>
-            <a:r>
-              <a:t>操作规范</a:t>
-            </a:r>
-          </a:p>
-          <a:p>
-            <a:pPr lvl="1">
-              <a:defRPr sz="1800"/>
-            </a:pPr>
-            <a:r>
-              <a:t>  ✓ 重要操作前仔细核对信息</a:t>
-            </a:r>
-          </a:p>
-          <a:p>
-            <a:pPr lvl="1">
-              <a:defRPr sz="1800"/>
-            </a:pPr>
-            <a:r>
-              <a:t>  ✓ 定期备份重要数据</a:t>
-            </a:r>
-          </a:p>
-          <a:p>
-            <a:pPr lvl="1">
-              <a:defRPr sz="1800"/>
-            </a:pPr>
-            <a:r>
-              <a:t>  ✓ 发现异常及时报告</a:t>
-            </a:r>
-          </a:p>
-          <a:p>
-            <a:pPr>
-              <a:defRPr sz="2000"/>
-            </a:pPr>
-          </a:p>
-          <a:p>
-            <a:pPr>
-              <a:defRPr sz="2000"/>
-            </a:pPr>
-            <a:r>
-              <a:t>数据规范</a:t>
-            </a:r>
-          </a:p>
-          <a:p>
-            <a:pPr lvl="1">
-              <a:defRPr sz="1800"/>
-            </a:pPr>
-            <a:r>
-              <a:t>  ✓ 准确录入数据</a:t>
-            </a:r>
-          </a:p>
-          <a:p>
-            <a:pPr lvl="1">
-              <a:defRPr sz="1800"/>
-            </a:pPr>
-            <a:r>
-              <a:t>  ✓ 保护用户隐私</a:t>
-            </a:r>
-          </a:p>
-          <a:p>
-            <a:pPr lvl="1">
-              <a:defRPr sz="1800"/>
-            </a:pPr>
-            <a:r>
-              <a:t>  ✓ 不随意删除历史数据</a:t>
-            </a:r>
-          </a:p>
-        </p:txBody>
-      </p:sp>
-    </p:spTree>
-  </p:cSld>
-  <p:clrMapOvr>
-    <a:masterClrMapping/>
-  </p:clrMapOvr>
-</p:sld>
-</file>
-
-<file path=ppt/slides/slide17.xml><?xml version="1.0" encoding="utf-8"?>
-<p:sld xmlns:a="http://schemas.openxmlformats.org/drawingml/2006/main" xmlns:p="http://schemas.openxmlformats.org/presentationml/2006/main" xmlns:r="http://schemas.openxmlformats.org/officeDocument/2006/relationships">
-  <p:cSld>
-    <p:spTree>
-      <p:nvGrpSpPr>
-        <p:cNvPr id="1" name=""/>
-        <p:cNvGrpSpPr/>
-        <p:nvPr/>
-      </p:nvGrpSpPr>
-      <p:grpSpPr/>
-      <p:sp>
-        <p:nvSpPr>
-          <p:cNvPr id="2" name="Title 1"/>
-          <p:cNvSpPr>
-            <a:spLocks noGrp="1"/>
-          </p:cNvSpPr>
-          <p:nvPr>
-            <p:ph type="title"/>
-          </p:nvPr>
-        </p:nvSpPr>
-        <p:spPr/>
-        <p:txBody>
-          <a:bodyPr/>
-          <a:lstStyle/>
-          <a:p>
-            <a:r>
-              <a:t>联系方式</a:t>
-            </a:r>
-          </a:p>
-        </p:txBody>
-      </p:sp>
-      <p:sp>
-        <p:nvSpPr>
-          <p:cNvPr id="3" name="Content Placeholder 2"/>
-          <p:cNvSpPr>
-            <a:spLocks noGrp="1"/>
-          </p:cNvSpPr>
-          <p:nvPr>
-            <p:ph idx="1"/>
-          </p:nvPr>
-        </p:nvSpPr>
-        <p:spPr/>
-        <p:txBody>
-          <a:bodyPr/>
-          <a:lstStyle/>
-          <a:p/>
-          <a:p>
-            <a:pPr>
-              <a:defRPr sz="2000"/>
-            </a:pPr>
-            <a:r>
-              <a:t>技术支持</a:t>
-            </a:r>
-          </a:p>
-          <a:p>
-            <a:pPr lvl="1">
-              <a:defRPr sz="1800"/>
-            </a:pPr>
-            <a:r>
-              <a:t>  电话：400-xxx-xxxx</a:t>
-            </a:r>
-          </a:p>
-          <a:p>
-            <a:pPr lvl="1">
-              <a:defRPr sz="1800"/>
-            </a:pPr>
-            <a:r>
-              <a:t>  邮箱：support@bjstarfish.com</a:t>
-            </a:r>
-          </a:p>
-          <a:p>
-            <a:pPr lvl="1">
-              <a:defRPr sz="1800"/>
-            </a:pPr>
-            <a:r>
-              <a:t>  工作时间：周一至周日 9:00-18:00</a:t>
-            </a:r>
-          </a:p>
-          <a:p>
-            <a:pPr>
-              <a:defRPr sz="2000"/>
-            </a:pPr>
-          </a:p>
-          <a:p>
-            <a:pPr>
-              <a:defRPr sz="2000"/>
-            </a:pPr>
-            <a:r>
-              <a:t>运营团队</a:t>
-            </a:r>
-          </a:p>
-          <a:p>
-            <a:pPr lvl="1">
-              <a:defRPr sz="1800"/>
-            </a:pPr>
-            <a:r>
-              <a:t>  电话：010-xxxx-xxxx</a:t>
-            </a:r>
-          </a:p>
-          <a:p>
-            <a:pPr lvl="1">
-              <a:defRPr sz="1800"/>
-            </a:pPr>
-            <a:r>
-              <a:t>  邮箱：operation@bjstarfish.com</a:t>
-            </a:r>
-          </a:p>
-          <a:p>
-            <a:pPr>
-              <a:defRPr sz="2000"/>
-            </a:pPr>
-          </a:p>
-          <a:p>
-            <a:pPr>
-              <a:defRPr sz="2000"/>
-            </a:pPr>
-            <a:r>
-              <a:t>紧急情况请直接拨打客服电话</a:t>
-            </a:r>
-          </a:p>
-        </p:txBody>
-      </p:sp>
-    </p:spTree>
-  </p:cSld>
-  <p:clrMapOvr>
-    <a:masterClrMapping/>
-  </p:clrMapOvr>
-</p:sld>
-</file>
-
-<file path=ppt/slides/slide18.xml><?xml version="1.0" encoding="utf-8"?>
-<p:sld xmlns:a="http://schemas.openxmlformats.org/drawingml/2006/main" xmlns:p="http://schemas.openxmlformats.org/presentationml/2006/main" xmlns:r="http://schemas.openxmlformats.org/officeDocument/2006/relationships">
-  <p:cSld>
-    <p:spTree>
-      <p:nvGrpSpPr>
-        <p:cNvPr id="1" name=""/>
-        <p:cNvGrpSpPr/>
-        <p:nvPr/>
-      </p:nvGrpSpPr>
-      <p:grpSpPr/>
-      <p:sp>
-        <p:nvSpPr>
-          <p:cNvPr id="2" name="Title 1"/>
-          <p:cNvSpPr>
-            <a:spLocks noGrp="1"/>
-          </p:cNvSpPr>
-          <p:nvPr>
-            <p:ph type="title"/>
-          </p:nvPr>
-        </p:nvSpPr>
-        <p:spPr/>
-        <p:txBody>
-          <a:bodyPr/>
-          <a:lstStyle/>
-          <a:p>
-            <a:r>
-              <a:t>培训考核</a:t>
-            </a:r>
-          </a:p>
-        </p:txBody>
-      </p:sp>
-      <p:sp>
-        <p:nvSpPr>
-          <p:cNvPr id="3" name="Content Placeholder 2"/>
-          <p:cNvSpPr>
-            <a:spLocks noGrp="1"/>
-          </p:cNvSpPr>
-          <p:nvPr>
-            <p:ph idx="1"/>
-          </p:nvPr>
-        </p:nvSpPr>
-        <p:spPr/>
-        <p:txBody>
-          <a:bodyPr/>
-          <a:lstStyle/>
-          <a:p/>
-          <a:p>
-            <a:pPr>
-              <a:defRPr sz="2000"/>
-            </a:pPr>
-            <a:r>
-              <a:t>考核方式</a:t>
-            </a:r>
-          </a:p>
-          <a:p>
-            <a:pPr lvl="1">
-              <a:defRPr sz="1800"/>
-            </a:pPr>
-            <a:r>
-              <a:t>  • 理论考试（占40%）</a:t>
-            </a:r>
-          </a:p>
-          <a:p>
-            <a:pPr lvl="1">
-              <a:defRPr sz="1800"/>
-            </a:pPr>
-            <a:r>
-              <a:t>  • 实际操作（占60%）</a:t>
-            </a:r>
-          </a:p>
-          <a:p>
-            <a:pPr>
-              <a:defRPr sz="2000"/>
-            </a:pPr>
-          </a:p>
-          <a:p>
-            <a:pPr>
-              <a:defRPr sz="2000"/>
-            </a:pPr>
-            <a:r>
-              <a:t>考核内容</a:t>
-            </a:r>
-          </a:p>
-          <a:p>
-            <a:pPr lvl="1">
-              <a:defRPr sz="1800"/>
-            </a:pPr>
-            <a:r>
-              <a:t>  • 系统基本操作</a:t>
-            </a:r>
-          </a:p>
-          <a:p>
-            <a:pPr lvl="1">
-              <a:defRPr sz="1800"/>
-            </a:pPr>
-            <a:r>
-              <a:t>  • 业务流程处理</a:t>
-            </a:r>
-          </a:p>
-          <a:p>
-            <a:pPr lvl="1">
-              <a:defRPr sz="1800"/>
-            </a:pPr>
-            <a:r>
-              <a:t>  • 问题处理能力</a:t>
-            </a:r>
-          </a:p>
-          <a:p>
-            <a:pPr>
-              <a:defRPr sz="2000"/>
-            </a:pPr>
-          </a:p>
-          <a:p>
-            <a:pPr>
-              <a:defRPr sz="2000"/>
-            </a:pPr>
-            <a:r>
-              <a:t>合格标准</a:t>
-            </a:r>
-          </a:p>
-          <a:p>
-            <a:pPr lvl="1">
-              <a:defRPr sz="1800"/>
-            </a:pPr>
-            <a:r>
-              <a:t>  • 总分≥80分：合格</a:t>
-            </a:r>
-          </a:p>
-          <a:p>
-            <a:pPr lvl="1">
-              <a:defRPr sz="1800"/>
-            </a:pPr>
-            <a:r>
-              <a:t>  • 总分≥90分：优秀</a:t>
-            </a:r>
-          </a:p>
-        </p:txBody>
-      </p:sp>
-    </p:spTree>
-  </p:cSld>
-  <p:clrMapOvr>
-    <a:masterClrMapping/>
-  </p:clrMapOvr>
-</p:sld>
-</file>
-
-<file path=ppt/slides/slide19.xml><?xml version="1.0" encoding="utf-8"?>
-<p:sld xmlns:a="http://schemas.openxmlformats.org/drawingml/2006/main" xmlns:p="http://schemas.openxmlformats.org/presentationml/2006/main" xmlns:r="http://schemas.openxmlformats.org/officeDocument/2006/relationships">
-  <p:cSld>
-    <p:spTree>
-      <p:nvGrpSpPr>
-        <p:cNvPr id="1" name=""/>
-        <p:cNvGrpSpPr/>
-        <p:nvPr/>
-      </p:nvGrpSpPr>
-      <p:grpSpPr/>
-      <p:sp>
-        <p:nvSpPr>
-          <p:cNvPr id="2" name="Title 1"/>
-          <p:cNvSpPr>
-            <a:spLocks noGrp="1"/>
-          </p:cNvSpPr>
-          <p:nvPr>
-            <p:ph type="ctrTitle"/>
-          </p:nvPr>
-        </p:nvSpPr>
-        <p:spPr/>
-        <p:txBody>
-          <a:bodyPr/>
-          <a:lstStyle/>
-          <a:p>
-            <a:pPr>
-              <a:defRPr sz="4400" b="1"/>
+              <a:defRPr sz="4400"/>
             </a:pPr>
             <a:r>
               <a:t>谢谢！</a:t>
@@ -4440,12 +3213,6 @@
             </a:pPr>
             <a:r>
               <a:t>祝您工作顺利！</a:t>
-            </a:r>
-          </a:p>
-          <a:p/>
-          <a:p>
-            <a:r>
-              <a:t>如有疑问，请随时联系我们</a:t>
             </a:r>
           </a:p>
         </p:txBody>
@@ -4484,7 +3251,7 @@
           <a:lstStyle/>
           <a:p>
             <a:r>
-              <a:t>培训目标</a:t>
+              <a:t>培训内容</a:t>
             </a:r>
           </a:p>
         </p:txBody>
@@ -4509,7 +3276,7 @@
               <a:defRPr sz="2000"/>
             </a:pPr>
             <a:r>
-              <a:t>✓ 掌握系统基本操作</a:t>
+              <a:t>一、系统登录与主界面</a:t>
             </a:r>
           </a:p>
           <a:p>
@@ -4517,7 +3284,63 @@
               <a:defRPr sz="2000"/>
             </a:pPr>
             <a:r>
-              <a:t>✓ 熟悉各功能模块</a:t>
+              <a:t>二、核心功能模块</a:t>
+            </a:r>
+          </a:p>
+          <a:p>
+            <a:pPr lvl="1">
+              <a:defRPr sz="1800"/>
+            </a:pPr>
+            <a:r>
+              <a:t>  • 活动管理 - 活动发布、套票管理</a:t>
+            </a:r>
+          </a:p>
+          <a:p>
+            <a:pPr lvl="1">
+              <a:defRPr sz="1800"/>
+            </a:pPr>
+            <a:r>
+              <a:t>  • 用户管理 - 用户信息、员工管理</a:t>
+            </a:r>
+          </a:p>
+          <a:p>
+            <a:pPr lvl="1">
+              <a:defRPr sz="1800"/>
+            </a:pPr>
+            <a:r>
+              <a:t>  • 场地管理 - 场地预订、订单处理</a:t>
+            </a:r>
+          </a:p>
+          <a:p>
+            <a:pPr lvl="1">
+              <a:defRPr sz="1800"/>
+            </a:pPr>
+            <a:r>
+              <a:t>  • 财务管理 - 商户结算、财务报表</a:t>
+            </a:r>
+          </a:p>
+          <a:p>
+            <a:pPr lvl="1">
+              <a:defRPr sz="1800"/>
+            </a:pPr>
+            <a:r>
+              <a:t>  • 营销管理 - Banner、优惠券</a:t>
+            </a:r>
+          </a:p>
+          <a:p>
+            <a:pPr lvl="1">
+              <a:defRPr sz="1800"/>
+            </a:pPr>
+            <a:r>
+              <a:t>  • 积分管理 - 规则设置、积分商城</a:t>
+            </a:r>
+          </a:p>
+          <a:p>
+            <a:pPr lvl="1">
+              <a:defRPr sz="1800"/>
+            </a:pPr>
+            <a:r>
+              <a:t>  • 数据分析 - 销售统计</a:t>
             </a:r>
           </a:p>
           <a:p>
@@ -4525,23 +3348,7 @@
               <a:defRPr sz="2000"/>
             </a:pPr>
             <a:r>
-              <a:t>✓ 了解业务流程</a:t>
-            </a:r>
-          </a:p>
-          <a:p>
-            <a:pPr>
-              <a:defRPr sz="2000"/>
-            </a:pPr>
-            <a:r>
-              <a:t>✓ 能够独立完成日常工作</a:t>
-            </a:r>
-          </a:p>
-          <a:p>
-            <a:pPr>
-              <a:defRPr sz="2000"/>
-            </a:pPr>
-            <a:r>
-              <a:t>✓ 掌握常见问题处理方法</a:t>
+              <a:t>三、操作技巧与常见问题</a:t>
             </a:r>
           </a:p>
         </p:txBody>
@@ -4578,142 +3385,6 @@
         <p:txBody>
           <a:bodyPr/>
           <a:lstStyle/>
-          <a:p>
-            <a:r>
-              <a:t>课程大纲</a:t>
-            </a:r>
-          </a:p>
-        </p:txBody>
-      </p:sp>
-      <p:sp>
-        <p:nvSpPr>
-          <p:cNvPr id="3" name="Content Placeholder 2"/>
-          <p:cNvSpPr>
-            <a:spLocks noGrp="1"/>
-          </p:cNvSpPr>
-          <p:nvPr>
-            <p:ph idx="1"/>
-          </p:nvPr>
-        </p:nvSpPr>
-        <p:spPr/>
-        <p:txBody>
-          <a:bodyPr/>
-          <a:lstStyle/>
-          <a:p/>
-          <a:p>
-            <a:pPr>
-              <a:defRPr sz="2000"/>
-            </a:pPr>
-            <a:r>
-              <a:t>第一部分：系统登录与主界面</a:t>
-            </a:r>
-          </a:p>
-          <a:p>
-            <a:pPr>
-              <a:defRPr sz="2000"/>
-            </a:pPr>
-            <a:r>
-              <a:t>第二部分：核心功能模块</a:t>
-            </a:r>
-          </a:p>
-          <a:p>
-            <a:pPr lvl="1">
-              <a:defRPr sz="1800"/>
-            </a:pPr>
-            <a:r>
-              <a:t>  • 活动管理</a:t>
-            </a:r>
-          </a:p>
-          <a:p>
-            <a:pPr lvl="1">
-              <a:defRPr sz="1800"/>
-            </a:pPr>
-            <a:r>
-              <a:t>  • 用户管理</a:t>
-            </a:r>
-          </a:p>
-          <a:p>
-            <a:pPr lvl="1">
-              <a:defRPr sz="1800"/>
-            </a:pPr>
-            <a:r>
-              <a:t>  • 场地管理</a:t>
-            </a:r>
-          </a:p>
-          <a:p>
-            <a:pPr lvl="1">
-              <a:defRPr sz="1800"/>
-            </a:pPr>
-            <a:r>
-              <a:t>  • 财务管理</a:t>
-            </a:r>
-          </a:p>
-          <a:p>
-            <a:pPr lvl="1">
-              <a:defRPr sz="1800"/>
-            </a:pPr>
-            <a:r>
-              <a:t>  • 营销管理</a:t>
-            </a:r>
-          </a:p>
-          <a:p>
-            <a:pPr lvl="1">
-              <a:defRPr sz="1800"/>
-            </a:pPr>
-            <a:r>
-              <a:t>  • 积分管理</a:t>
-            </a:r>
-          </a:p>
-          <a:p>
-            <a:pPr lvl="1">
-              <a:defRPr sz="1800"/>
-            </a:pPr>
-            <a:r>
-              <a:t>  • 数据分析</a:t>
-            </a:r>
-          </a:p>
-          <a:p>
-            <a:pPr>
-              <a:defRPr sz="2000"/>
-            </a:pPr>
-            <a:r>
-              <a:t>第三部分：常见问题与技巧</a:t>
-            </a:r>
-          </a:p>
-        </p:txBody>
-      </p:sp>
-    </p:spTree>
-  </p:cSld>
-  <p:clrMapOvr>
-    <a:masterClrMapping/>
-  </p:clrMapOvr>
-</p:sld>
-</file>
-
-<file path=ppt/slides/slide4.xml><?xml version="1.0" encoding="utf-8"?>
-<p:sld xmlns:a="http://schemas.openxmlformats.org/drawingml/2006/main" xmlns:p="http://schemas.openxmlformats.org/presentationml/2006/main" xmlns:r="http://schemas.openxmlformats.org/officeDocument/2006/relationships">
-  <p:cSld>
-    <p:spTree>
-      <p:nvGrpSpPr>
-        <p:cNvPr id="1" name=""/>
-        <p:cNvGrpSpPr/>
-        <p:nvPr/>
-      </p:nvGrpSpPr>
-      <p:grpSpPr/>
-      <p:sp>
-        <p:nvSpPr>
-          <p:cNvPr id="2" name="Title 1"/>
-          <p:cNvSpPr>
-            <a:spLocks noGrp="1"/>
-          </p:cNvSpPr>
-          <p:nvPr>
-            <p:ph type="title"/>
-          </p:nvPr>
-        </p:nvSpPr>
-        <p:spPr/>
-        <p:txBody>
-          <a:bodyPr/>
-          <a:lstStyle/>
           <a:p/>
         </p:txBody>
       </p:sp>
@@ -4743,7 +3414,7 @@
               <a:defRPr sz="3200" b="1"/>
             </a:pPr>
             <a:r>
-              <a:t>一、系统登录</a:t>
+              <a:t>系统登录</a:t>
             </a:r>
           </a:p>
         </p:txBody>
@@ -4798,7 +3469,7 @@
               <a:defRPr sz="1600"/>
             </a:pPr>
             <a:r>
-              <a:t>访问系统地址，输入用户名和密码登录</a:t>
+              <a:t>输入用户名和密码登录系统</a:t>
             </a:r>
           </a:p>
         </p:txBody>
@@ -4811,7 +3482,7 @@
 </p:sld>
 </file>
 
-<file path=ppt/slides/slide5.xml><?xml version="1.0" encoding="utf-8"?>
+<file path=ppt/slides/slide4.xml><?xml version="1.0" encoding="utf-8"?>
 <p:sld xmlns:a="http://schemas.openxmlformats.org/drawingml/2006/main" xmlns:p="http://schemas.openxmlformats.org/presentationml/2006/main" xmlns:r="http://schemas.openxmlformats.org/officeDocument/2006/relationships">
   <p:cSld>
     <p:spTree>
@@ -4871,7 +3542,7 @@
       </p:sp>
       <p:pic>
         <p:nvPicPr>
-          <p:cNvPr id="4" name="Picture 3" descr="02_dashboard.png"/>
+          <p:cNvPr id="4" name="Picture 3" descr="02_home.png"/>
           <p:cNvPicPr>
             <a:picLocks noChangeAspect="1"/>
           </p:cNvPicPr>
@@ -4919,7 +3590,7 @@
               <a:defRPr sz="1600"/>
             </a:pPr>
             <a:r>
-              <a:t>左侧菜单栏导航，右侧工作区显示内容</a:t>
+              <a:t>左侧菜单导航，右侧工作区</a:t>
             </a:r>
           </a:p>
         </p:txBody>
@@ -4932,145 +3603,7 @@
 </p:sld>
 </file>
 
-<file path=ppt/slides/slide6.xml><?xml version="1.0" encoding="utf-8"?>
-<p:sld xmlns:a="http://schemas.openxmlformats.org/drawingml/2006/main" xmlns:p="http://schemas.openxmlformats.org/presentationml/2006/main" xmlns:r="http://schemas.openxmlformats.org/officeDocument/2006/relationships">
-  <p:cSld>
-    <p:spTree>
-      <p:nvGrpSpPr>
-        <p:cNvPr id="1" name=""/>
-        <p:cNvGrpSpPr/>
-        <p:nvPr/>
-      </p:nvGrpSpPr>
-      <p:grpSpPr/>
-      <p:sp>
-        <p:nvSpPr>
-          <p:cNvPr id="2" name="Title 1"/>
-          <p:cNvSpPr>
-            <a:spLocks noGrp="1"/>
-          </p:cNvSpPr>
-          <p:nvPr>
-            <p:ph type="title"/>
-          </p:nvPr>
-        </p:nvSpPr>
-        <p:spPr/>
-        <p:txBody>
-          <a:bodyPr/>
-          <a:lstStyle/>
-          <a:p>
-            <a:r>
-              <a:t>二、核心功能模块</a:t>
-            </a:r>
-          </a:p>
-        </p:txBody>
-      </p:sp>
-      <p:sp>
-        <p:nvSpPr>
-          <p:cNvPr id="3" name="Content Placeholder 2"/>
-          <p:cNvSpPr>
-            <a:spLocks noGrp="1"/>
-          </p:cNvSpPr>
-          <p:nvPr>
-            <p:ph idx="1"/>
-          </p:nvPr>
-        </p:nvSpPr>
-        <p:spPr/>
-        <p:txBody>
-          <a:bodyPr/>
-          <a:lstStyle/>
-          <a:p/>
-          <a:p>
-            <a:pPr>
-              <a:defRPr sz="2000"/>
-            </a:pPr>
-            <a:r>
-              <a:t>1. 活动管理</a:t>
-            </a:r>
-          </a:p>
-          <a:p>
-            <a:pPr lvl="1">
-              <a:defRPr sz="1800"/>
-            </a:pPr>
-            <a:r>
-              <a:t>   • 活动列表：发布、编辑、管理活动</a:t>
-            </a:r>
-          </a:p>
-          <a:p>
-            <a:pPr lvl="1">
-              <a:defRPr sz="1800"/>
-            </a:pPr>
-            <a:r>
-              <a:t>   • 套票列表：管理组合套票</a:t>
-            </a:r>
-          </a:p>
-          <a:p>
-            <a:pPr>
-              <a:defRPr sz="2000"/>
-            </a:pPr>
-          </a:p>
-          <a:p>
-            <a:pPr>
-              <a:defRPr sz="2000"/>
-            </a:pPr>
-            <a:r>
-              <a:t>2. 用户管理</a:t>
-            </a:r>
-          </a:p>
-          <a:p>
-            <a:pPr lvl="1">
-              <a:defRPr sz="1800"/>
-            </a:pPr>
-            <a:r>
-              <a:t>   • 普通用户：用户信息、订单查询</a:t>
-            </a:r>
-          </a:p>
-          <a:p>
-            <a:pPr lvl="1">
-              <a:defRPr sz="1800"/>
-            </a:pPr>
-            <a:r>
-              <a:t>   • 员工管理：账号管理、权限分配</a:t>
-            </a:r>
-          </a:p>
-          <a:p>
-            <a:pPr>
-              <a:defRPr sz="2000"/>
-            </a:pPr>
-          </a:p>
-          <a:p>
-            <a:pPr>
-              <a:defRPr sz="2000"/>
-            </a:pPr>
-            <a:r>
-              <a:t>3. 场地管理</a:t>
-            </a:r>
-          </a:p>
-          <a:p>
-            <a:pPr lvl="1">
-              <a:defRPr sz="1800"/>
-            </a:pPr>
-            <a:r>
-              <a:t>   • 场地列表：场地信息配置</a:t>
-            </a:r>
-          </a:p>
-          <a:p>
-            <a:pPr lvl="1">
-              <a:defRPr sz="1800"/>
-            </a:pPr>
-            <a:r>
-              <a:t>   • 场地订单：预订处理</a:t>
-            </a:r>
-          </a:p>
-        </p:txBody>
-      </p:sp>
-    </p:spTree>
-  </p:cSld>
-  <p:clrMapOvr>
-    <a:masterClrMapping/>
-  </p:clrMapOvr>
-</p:sld>
-</file>
-
-<file path=ppt/slides/slide7.xml><?xml version="1.0" encoding="utf-8"?>
+<file path=ppt/slides/slide5.xml><?xml version="1.0" encoding="utf-8"?>
 <p:sld xmlns:a="http://schemas.openxmlformats.org/drawingml/2006/main" xmlns:p="http://schemas.openxmlformats.org/presentationml/2006/main" xmlns:r="http://schemas.openxmlformats.org/officeDocument/2006/relationships">
   <p:cSld>
     <p:spTree>
@@ -5123,14 +3656,14 @@
               <a:defRPr sz="3200" b="1"/>
             </a:pPr>
             <a:r>
-              <a:t>活动管理</a:t>
+              <a:t>功能示例 - 用户管理</a:t>
             </a:r>
           </a:p>
         </p:txBody>
       </p:sp>
       <p:pic>
         <p:nvPicPr>
-          <p:cNvPr id="4" name="Picture 3" descr="03_activity.png"/>
+          <p:cNvPr id="4" name="Picture 3" descr="07_users.png"/>
           <p:cNvPicPr>
             <a:picLocks noChangeAspect="1"/>
           </p:cNvPicPr>
@@ -5178,7 +3711,360 @@
               <a:defRPr sz="1600"/>
             </a:pPr>
             <a:r>
-              <a:t>管理活动和套票，查询、新增、编辑、删除操作</a:t>
+              <a:t>查看用户列表，进行用户管理操作</a:t>
+            </a:r>
+          </a:p>
+        </p:txBody>
+      </p:sp>
+    </p:spTree>
+  </p:cSld>
+  <p:clrMapOvr>
+    <a:masterClrMapping/>
+  </p:clrMapOvr>
+</p:sld>
+</file>
+
+<file path=ppt/slides/slide6.xml><?xml version="1.0" encoding="utf-8"?>
+<p:sld xmlns:a="http://schemas.openxmlformats.org/drawingml/2006/main" xmlns:p="http://schemas.openxmlformats.org/presentationml/2006/main" xmlns:r="http://schemas.openxmlformats.org/officeDocument/2006/relationships">
+  <p:cSld>
+    <p:spTree>
+      <p:nvGrpSpPr>
+        <p:cNvPr id="1" name=""/>
+        <p:cNvGrpSpPr/>
+        <p:nvPr/>
+      </p:nvGrpSpPr>
+      <p:grpSpPr/>
+      <p:sp>
+        <p:nvSpPr>
+          <p:cNvPr id="2" name="Title 1"/>
+          <p:cNvSpPr>
+            <a:spLocks noGrp="1"/>
+          </p:cNvSpPr>
+          <p:nvPr>
+            <p:ph type="title"/>
+          </p:nvPr>
+        </p:nvSpPr>
+        <p:spPr/>
+        <p:txBody>
+          <a:bodyPr/>
+          <a:lstStyle/>
+          <a:p>
+            <a:r>
+              <a:t>核心功能模块</a:t>
+            </a:r>
+          </a:p>
+        </p:txBody>
+      </p:sp>
+      <p:sp>
+        <p:nvSpPr>
+          <p:cNvPr id="3" name="Content Placeholder 2"/>
+          <p:cNvSpPr>
+            <a:spLocks noGrp="1"/>
+          </p:cNvSpPr>
+          <p:nvPr>
+            <p:ph idx="1"/>
+          </p:nvPr>
+        </p:nvSpPr>
+        <p:spPr/>
+        <p:txBody>
+          <a:bodyPr/>
+          <a:lstStyle/>
+          <a:p/>
+          <a:p>
+            <a:pPr>
+              <a:defRPr sz="2000"/>
+            </a:pPr>
+            <a:r>
+              <a:t>活动管理</a:t>
+            </a:r>
+          </a:p>
+          <a:p>
+            <a:pPr lvl="1">
+              <a:defRPr sz="1800"/>
+            </a:pPr>
+            <a:r>
+              <a:t>  • 发布活动、管理报名</a:t>
+            </a:r>
+          </a:p>
+          <a:p>
+            <a:pPr lvl="1">
+              <a:defRPr sz="1800"/>
+            </a:pPr>
+            <a:r>
+              <a:t>  • 创建和管理套票</a:t>
+            </a:r>
+          </a:p>
+          <a:p>
+            <a:pPr>
+              <a:defRPr sz="2000"/>
+            </a:pPr>
+          </a:p>
+          <a:p>
+            <a:pPr>
+              <a:defRPr sz="2000"/>
+            </a:pPr>
+            <a:r>
+              <a:t>用户管理</a:t>
+            </a:r>
+          </a:p>
+          <a:p>
+            <a:pPr lvl="1">
+              <a:defRPr sz="1800"/>
+            </a:pPr>
+            <a:r>
+              <a:t>  • 普通用户：信息查询、订单管理</a:t>
+            </a:r>
+          </a:p>
+          <a:p>
+            <a:pPr lvl="1">
+              <a:defRPr sz="1800"/>
+            </a:pPr>
+            <a:r>
+              <a:t>  • 员工管理：账号创建、权限分配</a:t>
+            </a:r>
+          </a:p>
+          <a:p>
+            <a:pPr>
+              <a:defRPr sz="2000"/>
+            </a:pPr>
+          </a:p>
+          <a:p>
+            <a:pPr>
+              <a:defRPr sz="2000"/>
+            </a:pPr>
+            <a:r>
+              <a:t>场地管理</a:t>
+            </a:r>
+          </a:p>
+          <a:p>
+            <a:pPr lvl="1">
+              <a:defRPr sz="1800"/>
+            </a:pPr>
+            <a:r>
+              <a:t>  • 场地资源配置</a:t>
+            </a:r>
+          </a:p>
+          <a:p>
+            <a:pPr lvl="1">
+              <a:defRPr sz="1800"/>
+            </a:pPr>
+            <a:r>
+              <a:t>  • 预订订单处理</a:t>
+            </a:r>
+          </a:p>
+          <a:p>
+            <a:pPr>
+              <a:defRPr sz="2000"/>
+            </a:pPr>
+          </a:p>
+          <a:p>
+            <a:pPr>
+              <a:defRPr sz="2000"/>
+            </a:pPr>
+            <a:r>
+              <a:t>其他功能</a:t>
+            </a:r>
+          </a:p>
+          <a:p>
+            <a:pPr lvl="1">
+              <a:defRPr sz="1800"/>
+            </a:pPr>
+            <a:r>
+              <a:t>  • 财务结算审核</a:t>
+            </a:r>
+          </a:p>
+          <a:p>
+            <a:pPr lvl="1">
+              <a:defRPr sz="1800"/>
+            </a:pPr>
+            <a:r>
+              <a:t>  • 营销活动配置</a:t>
+            </a:r>
+          </a:p>
+          <a:p>
+            <a:pPr lvl="1">
+              <a:defRPr sz="1800"/>
+            </a:pPr>
+            <a:r>
+              <a:t>  • 积分规则设置</a:t>
+            </a:r>
+          </a:p>
+          <a:p>
+            <a:pPr lvl="1">
+              <a:defRPr sz="1800"/>
+            </a:pPr>
+            <a:r>
+              <a:t>  • 数据统计分析</a:t>
+            </a:r>
+          </a:p>
+        </p:txBody>
+      </p:sp>
+    </p:spTree>
+  </p:cSld>
+  <p:clrMapOvr>
+    <a:masterClrMapping/>
+  </p:clrMapOvr>
+</p:sld>
+</file>
+
+<file path=ppt/slides/slide7.xml><?xml version="1.0" encoding="utf-8"?>
+<p:sld xmlns:a="http://schemas.openxmlformats.org/drawingml/2006/main" xmlns:p="http://schemas.openxmlformats.org/presentationml/2006/main" xmlns:r="http://schemas.openxmlformats.org/officeDocument/2006/relationships">
+  <p:cSld>
+    <p:spTree>
+      <p:nvGrpSpPr>
+        <p:cNvPr id="1" name=""/>
+        <p:cNvGrpSpPr/>
+        <p:nvPr/>
+      </p:nvGrpSpPr>
+      <p:grpSpPr/>
+      <p:sp>
+        <p:nvSpPr>
+          <p:cNvPr id="2" name="Title 1"/>
+          <p:cNvSpPr>
+            <a:spLocks noGrp="1"/>
+          </p:cNvSpPr>
+          <p:nvPr>
+            <p:ph type="title"/>
+          </p:nvPr>
+        </p:nvSpPr>
+        <p:spPr/>
+        <p:txBody>
+          <a:bodyPr/>
+          <a:lstStyle/>
+          <a:p>
+            <a:r>
+              <a:t>操作技巧</a:t>
+            </a:r>
+          </a:p>
+        </p:txBody>
+      </p:sp>
+      <p:sp>
+        <p:nvSpPr>
+          <p:cNvPr id="3" name="Content Placeholder 2"/>
+          <p:cNvSpPr>
+            <a:spLocks noGrp="1"/>
+          </p:cNvSpPr>
+          <p:nvPr>
+            <p:ph idx="1"/>
+          </p:nvPr>
+        </p:nvSpPr>
+        <p:spPr/>
+        <p:txBody>
+          <a:bodyPr/>
+          <a:lstStyle/>
+          <a:p/>
+          <a:p>
+            <a:pPr>
+              <a:defRPr sz="2000"/>
+            </a:pPr>
+            <a:r>
+              <a:t>查询技巧</a:t>
+            </a:r>
+          </a:p>
+          <a:p>
+            <a:pPr lvl="1">
+              <a:defRPr sz="1800"/>
+            </a:pPr>
+            <a:r>
+              <a:t>  • 支持模糊查询（姓名、手机号）</a:t>
+            </a:r>
+          </a:p>
+          <a:p>
+            <a:pPr lvl="1">
+              <a:defRPr sz="1800"/>
+            </a:pPr>
+            <a:r>
+              <a:t>  • 使用时间范围筛选</a:t>
+            </a:r>
+          </a:p>
+          <a:p>
+            <a:pPr lvl="1">
+              <a:defRPr sz="1800"/>
+            </a:pPr>
+            <a:r>
+              <a:t>  • 组合多个条件精确查询</a:t>
+            </a:r>
+          </a:p>
+          <a:p>
+            <a:pPr>
+              <a:defRPr sz="2000"/>
+            </a:pPr>
+          </a:p>
+          <a:p>
+            <a:pPr>
+              <a:defRPr sz="2000"/>
+            </a:pPr>
+            <a:r>
+              <a:t>快捷操作</a:t>
+            </a:r>
+          </a:p>
+          <a:p>
+            <a:pPr lvl="1">
+              <a:defRPr sz="1800"/>
+            </a:pPr>
+            <a:r>
+              <a:t>  • Ctrl+S 保存</a:t>
+            </a:r>
+          </a:p>
+          <a:p>
+            <a:pPr lvl="1">
+              <a:defRPr sz="1800"/>
+            </a:pPr>
+            <a:r>
+              <a:t>  • Ctrl+F 搜索</a:t>
+            </a:r>
+          </a:p>
+          <a:p>
+            <a:pPr lvl="1">
+              <a:defRPr sz="1800"/>
+            </a:pPr>
+            <a:r>
+              <a:t>  • F5 刷新</a:t>
+            </a:r>
+          </a:p>
+          <a:p>
+            <a:pPr lvl="1">
+              <a:defRPr sz="1800"/>
+            </a:pPr>
+            <a:r>
+              <a:t>  • Esc 关闭弹窗</a:t>
+            </a:r>
+          </a:p>
+          <a:p>
+            <a:pPr>
+              <a:defRPr sz="2000"/>
+            </a:pPr>
+          </a:p>
+          <a:p>
+            <a:pPr>
+              <a:defRPr sz="2000"/>
+            </a:pPr>
+            <a:r>
+              <a:t>数据导出</a:t>
+            </a:r>
+          </a:p>
+          <a:p>
+            <a:pPr lvl="1">
+              <a:defRPr sz="1800"/>
+            </a:pPr>
+            <a:r>
+              <a:t>  • 设置筛选条件</a:t>
+            </a:r>
+          </a:p>
+          <a:p>
+            <a:pPr lvl="1">
+              <a:defRPr sz="1800"/>
+            </a:pPr>
+            <a:r>
+              <a:t>  • 点击导出按钮</a:t>
+            </a:r>
+          </a:p>
+          <a:p>
+            <a:pPr lvl="1">
+              <a:defRPr sz="1800"/>
+            </a:pPr>
+            <a:r>
+              <a:t>  • 选择导出格式（Excel/PDF）</a:t>
             </a:r>
           </a:p>
         </p:txBody>
@@ -5215,91 +4101,105 @@
         <p:txBody>
           <a:bodyPr/>
           <a:lstStyle/>
+          <a:p>
+            <a:r>
+              <a:t>常见问题</a:t>
+            </a:r>
+          </a:p>
+        </p:txBody>
+      </p:sp>
+      <p:sp>
+        <p:nvSpPr>
+          <p:cNvPr id="3" name="Content Placeholder 2"/>
+          <p:cNvSpPr>
+            <a:spLocks noGrp="1"/>
+          </p:cNvSpPr>
+          <p:nvPr>
+            <p:ph idx="1"/>
+          </p:nvPr>
+        </p:nvSpPr>
+        <p:spPr/>
+        <p:txBody>
+          <a:bodyPr/>
+          <a:lstStyle/>
           <a:p/>
-        </p:txBody>
-      </p:sp>
-      <p:sp>
-        <p:nvSpPr>
-          <p:cNvPr id="3" name="TextBox 2"/>
-          <p:cNvSpPr txBox="1"/>
-          <p:nvPr/>
-        </p:nvSpPr>
-        <p:spPr>
-          <a:xfrm>
-            <a:off x="457200" y="457200"/>
-            <a:ext cx="8229600" cy="731520"/>
-          </a:xfrm>
-          <a:prstGeom prst="rect">
-            <a:avLst/>
-          </a:prstGeom>
-          <a:noFill/>
-        </p:spPr>
-        <p:txBody>
-          <a:bodyPr wrap="none">
-            <a:spAutoFit/>
-          </a:bodyPr>
-          <a:lstStyle/>
           <a:p>
             <a:pPr>
-              <a:defRPr sz="3200" b="1"/>
-            </a:pPr>
-            <a:r>
-              <a:t>用户管理</a:t>
-            </a:r>
-          </a:p>
-        </p:txBody>
-      </p:sp>
-      <p:pic>
-        <p:nvPicPr>
-          <p:cNvPr id="4" name="Picture 3" descr="04_users.png"/>
-          <p:cNvPicPr>
-            <a:picLocks noChangeAspect="1"/>
-          </p:cNvPicPr>
-          <p:nvPr/>
-        </p:nvPicPr>
-        <p:blipFill>
-          <a:blip r:embed="rId2"/>
-          <a:stretch>
-            <a:fillRect/>
-          </a:stretch>
-        </p:blipFill>
-        <p:spPr>
-          <a:xfrm>
-            <a:off x="914400" y="1371600"/>
-            <a:ext cx="8128000" cy="4572000"/>
-          </a:xfrm>
-          <a:prstGeom prst="rect">
-            <a:avLst/>
-          </a:prstGeom>
-        </p:spPr>
-      </p:pic>
-      <p:sp>
-        <p:nvSpPr>
-          <p:cNvPr id="5" name="TextBox 4"/>
-          <p:cNvSpPr txBox="1"/>
-          <p:nvPr/>
-        </p:nvSpPr>
-        <p:spPr>
-          <a:xfrm>
-            <a:off x="457200" y="6217920"/>
-            <a:ext cx="8229600" cy="548640"/>
-          </a:xfrm>
-          <a:prstGeom prst="rect">
-            <a:avLst/>
-          </a:prstGeom>
-          <a:noFill/>
-        </p:spPr>
-        <p:txBody>
-          <a:bodyPr wrap="none">
-            <a:spAutoFit/>
-          </a:bodyPr>
-          <a:lstStyle/>
+              <a:defRPr sz="2000"/>
+            </a:pPr>
+            <a:r>
+              <a:t>Q：忘记密码怎么办？</a:t>
+            </a:r>
+          </a:p>
           <a:p>
             <a:pPr>
-              <a:defRPr sz="1600"/>
-            </a:pPr>
-            <a:r>
-              <a:t>查看用户信息，管理用户状态和订单</a:t>
+              <a:defRPr sz="2000"/>
+            </a:pPr>
+            <a:r>
+              <a:t>A：联系系统管理员重置</a:t>
+            </a:r>
+          </a:p>
+          <a:p>
+            <a:pPr>
+              <a:defRPr sz="2000"/>
+            </a:pPr>
+          </a:p>
+          <a:p>
+            <a:pPr>
+              <a:defRPr sz="2000"/>
+            </a:pPr>
+            <a:r>
+              <a:t>Q：为什么看不到某些菜单？</a:t>
+            </a:r>
+          </a:p>
+          <a:p>
+            <a:pPr>
+              <a:defRPr sz="2000"/>
+            </a:pPr>
+            <a:r>
+              <a:t>A：检查账号权限，联系管理员分配</a:t>
+            </a:r>
+          </a:p>
+          <a:p>
+            <a:pPr>
+              <a:defRPr sz="2000"/>
+            </a:pPr>
+          </a:p>
+          <a:p>
+            <a:pPr>
+              <a:defRPr sz="2000"/>
+            </a:pPr>
+            <a:r>
+              <a:t>Q：数据保存失败？</a:t>
+            </a:r>
+          </a:p>
+          <a:p>
+            <a:pPr>
+              <a:defRPr sz="2000"/>
+            </a:pPr>
+            <a:r>
+              <a:t>A：检查必填项、数据格式、网络连接</a:t>
+            </a:r>
+          </a:p>
+          <a:p>
+            <a:pPr>
+              <a:defRPr sz="2000"/>
+            </a:pPr>
+          </a:p>
+          <a:p>
+            <a:pPr>
+              <a:defRPr sz="2000"/>
+            </a:pPr>
+            <a:r>
+              <a:t>Q：页面显示异常？</a:t>
+            </a:r>
+          </a:p>
+          <a:p>
+            <a:pPr>
+              <a:defRPr sz="2000"/>
+            </a:pPr>
+            <a:r>
+              <a:t>A：刷新页面(F5)、清除缓存、使用Chrome浏览器</a:t>
             </a:r>
           </a:p>
         </p:txBody>
@@ -5338,7 +4238,7 @@
           <a:lstStyle/>
           <a:p>
             <a:r>
-              <a:t>三、其他功能模块</a:t>
+              <a:t>注意事项</a:t>
             </a:r>
           </a:p>
         </p:txBody>
@@ -5363,7 +4263,7 @@
               <a:defRPr sz="2000"/>
             </a:pPr>
             <a:r>
-              <a:t>4. 财务管理</a:t>
+              <a:t>安全规范</a:t>
             </a:r>
           </a:p>
           <a:p>
@@ -5371,7 +4271,7 @@
               <a:defRPr sz="1800"/>
             </a:pPr>
             <a:r>
-              <a:t>   • 商户结算审核</a:t>
+              <a:t>  ✓ 定期修改密码</a:t>
             </a:r>
           </a:p>
           <a:p>
@@ -5379,7 +4279,15 @@
               <a:defRPr sz="1800"/>
             </a:pPr>
             <a:r>
-              <a:t>   • 财务报表查看</a:t>
+              <a:t>  ✓ 不要泄露账号信息</a:t>
+            </a:r>
+          </a:p>
+          <a:p>
+            <a:pPr lvl="1">
+              <a:defRPr sz="1800"/>
+            </a:pPr>
+            <a:r>
+              <a:t>  ✓ 使用后及时退出</a:t>
             </a:r>
           </a:p>
           <a:p>
@@ -5392,7 +4300,7 @@
               <a:defRPr sz="2000"/>
             </a:pPr>
             <a:r>
-              <a:t>5. 营销管理</a:t>
+              <a:t>操作规范</a:t>
             </a:r>
           </a:p>
           <a:p>
@@ -5400,7 +4308,7 @@
               <a:defRPr sz="1800"/>
             </a:pPr>
             <a:r>
-              <a:t>   • Banner配置：首页轮播图</a:t>
+              <a:t>  ✓ 重要操作前仔细核对</a:t>
             </a:r>
           </a:p>
           <a:p>
@@ -5408,7 +4316,15 @@
               <a:defRPr sz="1800"/>
             </a:pPr>
             <a:r>
-              <a:t>   • 优惠券发放：优惠活动</a:t>
+              <a:t>  ✓ 定期备份重要数据</a:t>
+            </a:r>
+          </a:p>
+          <a:p>
+            <a:pPr lvl="1">
+              <a:defRPr sz="1800"/>
+            </a:pPr>
+            <a:r>
+              <a:t>  ✓ 发现异常及时报告</a:t>
             </a:r>
           </a:p>
           <a:p>
@@ -5421,7 +4337,7 @@
               <a:defRPr sz="2000"/>
             </a:pPr>
             <a:r>
-              <a:t>6. 积分管理</a:t>
+              <a:t>联系方式</a:t>
             </a:r>
           </a:p>
           <a:p>
@@ -5429,7 +4345,7 @@
               <a:defRPr sz="1800"/>
             </a:pPr>
             <a:r>
-              <a:t>   • 积分规则设置</a:t>
+              <a:t>  技术支持：400-xxx-xxxx</a:t>
             </a:r>
           </a:p>
           <a:p>
@@ -5437,15 +4353,7 @@
               <a:defRPr sz="1800"/>
             </a:pPr>
             <a:r>
-              <a:t>   • 积分商城管理</a:t>
-            </a:r>
-          </a:p>
-          <a:p>
-            <a:pPr lvl="1">
-              <a:defRPr sz="1800"/>
-            </a:pPr>
-            <a:r>
-              <a:t>   • 积分订单处理</a:t>
+              <a:t>  工作时间：周一至周日 9:00-18:00</a:t>
             </a:r>
           </a:p>
         </p:txBody>

</xml_diff>

<commit_message>
Add screenshots/progress.txt with completion status
Co-authored-by: chentianran <chentianran@shengdaxun.com>
</commit_message>
<xml_diff>
--- a/非雪季系统培训PPT.pptx
+++ b/非雪季系统培训PPT.pptx
@@ -15,6 +15,9 @@
     <p:sldId id="263" r:id="rId14"/>
     <p:sldId id="264" r:id="rId15"/>
     <p:sldId id="265" r:id="rId16"/>
+    <p:sldId id="266" r:id="rId17"/>
+    <p:sldId id="267" r:id="rId18"/>
+    <p:sldId id="268" r:id="rId19"/>
   </p:sldIdLst>
   <p:sldSz cx="9144000" cy="6858000" type="screen4x3"/>
   <p:notesSz cx="6858000" cy="9144000"/>
@@ -3112,9 +3115,6 @@
           <a:bodyPr/>
           <a:lstStyle/>
           <a:p>
-            <a:pPr>
-              <a:defRPr sz="4400"/>
-            </a:pPr>
             <a:r>
               <a:t>非雪季系统培训</a:t>
             </a:r>
@@ -3136,17 +3136,8 @@
           <a:bodyPr/>
           <a:lstStyle/>
           <a:p>
-            <a:pPr>
-              <a:defRPr sz="2400"/>
-            </a:pPr>
-            <a:r>
-              <a:t>西山俱乐部管理系统</a:t>
-            </a:r>
-          </a:p>
-          <a:p/>
-          <a:p>
-            <a:r>
-              <a:t>系统版本：V1.0</a:t>
+            <a:r>
+              <a:t>系统操作培训教程</a:t>
             </a:r>
           </a:p>
         </p:txBody>
@@ -3176,43 +3167,449 @@
             <a:spLocks noGrp="1"/>
           </p:cNvSpPr>
           <p:nvPr>
-            <p:ph type="ctrTitle"/>
-          </p:nvPr>
-        </p:nvSpPr>
-        <p:spPr/>
-        <p:txBody>
-          <a:bodyPr/>
-          <a:lstStyle/>
-          <a:p>
-            <a:pPr>
-              <a:defRPr sz="4400"/>
-            </a:pPr>
-            <a:r>
-              <a:t>谢谢！</a:t>
-            </a:r>
-          </a:p>
-        </p:txBody>
-      </p:sp>
-      <p:sp>
-        <p:nvSpPr>
-          <p:cNvPr id="3" name="Subtitle 2"/>
-          <p:cNvSpPr>
-            <a:spLocks noGrp="1"/>
-          </p:cNvSpPr>
-          <p:nvPr>
-            <p:ph type="subTitle" idx="1"/>
-          </p:nvPr>
-        </p:nvSpPr>
-        <p:spPr/>
-        <p:txBody>
-          <a:bodyPr/>
-          <a:lstStyle/>
-          <a:p>
-            <a:pPr>
-              <a:defRPr sz="2400"/>
-            </a:pPr>
-            <a:r>
-              <a:t>祝您工作顺利！</a:t>
+            <p:ph type="title"/>
+          </p:nvPr>
+        </p:nvSpPr>
+        <p:spPr/>
+        <p:txBody>
+          <a:bodyPr/>
+          <a:lstStyle/>
+          <a:p>
+            <a:r>
+              <a:t>数据分析</a:t>
+            </a:r>
+          </a:p>
+        </p:txBody>
+      </p:sp>
+      <p:sp>
+        <p:nvSpPr>
+          <p:cNvPr id="3" name="Content Placeholder 2"/>
+          <p:cNvSpPr>
+            <a:spLocks noGrp="1"/>
+          </p:cNvSpPr>
+          <p:nvPr>
+            <p:ph idx="1"/>
+          </p:nvPr>
+        </p:nvSpPr>
+        <p:spPr/>
+        <p:txBody>
+          <a:bodyPr/>
+          <a:lstStyle/>
+          <a:p/>
+          <a:p>
+            <a:pPr>
+              <a:defRPr sz="1800"/>
+            </a:pPr>
+            <a:r>
+              <a:t>功能概述：提供多维度数据分析和统计</a:t>
+            </a:r>
+          </a:p>
+          <a:p>
+            <a:pPr>
+              <a:defRPr sz="1800"/>
+            </a:pPr>
+            <a:r>
+              <a:t>主要功能：</a:t>
+            </a:r>
+          </a:p>
+          <a:p>
+            <a:pPr>
+              <a:defRPr sz="1800"/>
+            </a:pPr>
+            <a:r>
+              <a:t>  • 销售数据统计：出票数、退票数、营业额、实收等</a:t>
+            </a:r>
+          </a:p>
+          <a:p>
+            <a:pPr>
+              <a:defRPr sz="1800"/>
+            </a:pPr>
+            <a:r>
+              <a:t>  • 时间维度：按日、月、季度、年度统计</a:t>
+            </a:r>
+          </a:p>
+          <a:p>
+            <a:pPr>
+              <a:defRPr sz="1800"/>
+            </a:pPr>
+            <a:r>
+              <a:t>  • 趋势分析：图表展示数据变化趋势</a:t>
+            </a:r>
+          </a:p>
+          <a:p>
+            <a:pPr>
+              <a:defRPr sz="1800"/>
+            </a:pPr>
+            <a:r>
+              <a:t>  • 数据导出：支持导出Excel报表</a:t>
+            </a:r>
+          </a:p>
+          <a:p>
+            <a:pPr>
+              <a:defRPr sz="1800"/>
+            </a:pPr>
+            <a:r>
+              <a:t>  • 实时监控：实时查看当前运营数据</a:t>
+            </a:r>
+          </a:p>
+        </p:txBody>
+      </p:sp>
+    </p:spTree>
+  </p:cSld>
+  <p:clrMapOvr>
+    <a:masterClrMapping/>
+  </p:clrMapOvr>
+</p:sld>
+</file>
+
+<file path=ppt/slides/slide11.xml><?xml version="1.0" encoding="utf-8"?>
+<p:sld xmlns:a="http://schemas.openxmlformats.org/drawingml/2006/main" xmlns:p="http://schemas.openxmlformats.org/presentationml/2006/main" xmlns:r="http://schemas.openxmlformats.org/officeDocument/2006/relationships">
+  <p:cSld>
+    <p:spTree>
+      <p:nvGrpSpPr>
+        <p:cNvPr id="1" name=""/>
+        <p:cNvGrpSpPr/>
+        <p:nvPr/>
+      </p:nvGrpSpPr>
+      <p:grpSpPr/>
+      <p:sp>
+        <p:nvSpPr>
+          <p:cNvPr id="2" name="Title 1"/>
+          <p:cNvSpPr>
+            <a:spLocks noGrp="1"/>
+          </p:cNvSpPr>
+          <p:nvPr>
+            <p:ph type="title"/>
+          </p:nvPr>
+        </p:nvSpPr>
+        <p:spPr/>
+        <p:txBody>
+          <a:bodyPr/>
+          <a:lstStyle/>
+          <a:p>
+            <a:r>
+              <a:t>系统管理</a:t>
+            </a:r>
+          </a:p>
+        </p:txBody>
+      </p:sp>
+      <p:sp>
+        <p:nvSpPr>
+          <p:cNvPr id="3" name="Content Placeholder 2"/>
+          <p:cNvSpPr>
+            <a:spLocks noGrp="1"/>
+          </p:cNvSpPr>
+          <p:nvPr>
+            <p:ph idx="1"/>
+          </p:nvPr>
+        </p:nvSpPr>
+        <p:spPr/>
+        <p:txBody>
+          <a:bodyPr/>
+          <a:lstStyle/>
+          <a:p/>
+          <a:p>
+            <a:pPr>
+              <a:defRPr sz="1800"/>
+            </a:pPr>
+            <a:r>
+              <a:t>功能模块：</a:t>
+            </a:r>
+          </a:p>
+          <a:p>
+            <a:pPr>
+              <a:defRPr sz="1800"/>
+            </a:pPr>
+            <a:r>
+              <a:t>  • Banner管理：管理小程序首页轮播图</a:t>
+            </a:r>
+          </a:p>
+          <a:p>
+            <a:pPr>
+              <a:defRPr sz="1800"/>
+            </a:pPr>
+            <a:r>
+              <a:t>  • 小游戏管理：配置小程序中的互动游戏</a:t>
+            </a:r>
+          </a:p>
+          <a:p>
+            <a:pPr>
+              <a:defRPr sz="1800"/>
+            </a:pPr>
+            <a:r>
+              <a:t>  • 操作日志：查看系统操作记录，安全审计</a:t>
+            </a:r>
+          </a:p>
+          <a:p>
+            <a:pPr>
+              <a:defRPr sz="1800"/>
+            </a:pPr>
+            <a:r>
+              <a:t>主要操作：</a:t>
+            </a:r>
+          </a:p>
+          <a:p>
+            <a:pPr>
+              <a:defRPr sz="1800"/>
+            </a:pPr>
+            <a:r>
+              <a:t>  • 轮播图设置：上传图片，设置链接和显示顺序</a:t>
+            </a:r>
+          </a:p>
+          <a:p>
+            <a:pPr>
+              <a:defRPr sz="1800"/>
+            </a:pPr>
+            <a:r>
+              <a:t>  • 游戏配置：创建和管理小游戏活动</a:t>
+            </a:r>
+          </a:p>
+          <a:p>
+            <a:pPr>
+              <a:defRPr sz="1800"/>
+            </a:pPr>
+            <a:r>
+              <a:t>  • 日志查询：按时间、操作人、操作类型查询日志</a:t>
+            </a:r>
+          </a:p>
+        </p:txBody>
+      </p:sp>
+    </p:spTree>
+  </p:cSld>
+  <p:clrMapOvr>
+    <a:masterClrMapping/>
+  </p:clrMapOvr>
+</p:sld>
+</file>
+
+<file path=ppt/slides/slide12.xml><?xml version="1.0" encoding="utf-8"?>
+<p:sld xmlns:a="http://schemas.openxmlformats.org/drawingml/2006/main" xmlns:p="http://schemas.openxmlformats.org/presentationml/2006/main" xmlns:r="http://schemas.openxmlformats.org/officeDocument/2006/relationships">
+  <p:cSld>
+    <p:spTree>
+      <p:nvGrpSpPr>
+        <p:cNvPr id="1" name=""/>
+        <p:cNvGrpSpPr/>
+        <p:nvPr/>
+      </p:nvGrpSpPr>
+      <p:grpSpPr/>
+      <p:sp>
+        <p:nvSpPr>
+          <p:cNvPr id="2" name="Title 1"/>
+          <p:cNvSpPr>
+            <a:spLocks noGrp="1"/>
+          </p:cNvSpPr>
+          <p:nvPr>
+            <p:ph type="title"/>
+          </p:nvPr>
+        </p:nvSpPr>
+        <p:spPr/>
+        <p:txBody>
+          <a:bodyPr/>
+          <a:lstStyle/>
+          <a:p>
+            <a:r>
+              <a:t>常见问题</a:t>
+            </a:r>
+          </a:p>
+        </p:txBody>
+      </p:sp>
+      <p:sp>
+        <p:nvSpPr>
+          <p:cNvPr id="3" name="Content Placeholder 2"/>
+          <p:cNvSpPr>
+            <a:spLocks noGrp="1"/>
+          </p:cNvSpPr>
+          <p:nvPr>
+            <p:ph idx="1"/>
+          </p:nvPr>
+        </p:nvSpPr>
+        <p:spPr/>
+        <p:txBody>
+          <a:bodyPr/>
+          <a:lstStyle/>
+          <a:p/>
+          <a:p>
+            <a:pPr>
+              <a:defRPr sz="1800"/>
+            </a:pPr>
+            <a:r>
+              <a:t>Q1：如何重置密码？</a:t>
+            </a:r>
+          </a:p>
+          <a:p>
+            <a:pPr>
+              <a:defRPr sz="1800"/>
+            </a:pPr>
+            <a:r>
+              <a:t>  • 联系系统管理员重置密码</a:t>
+            </a:r>
+          </a:p>
+          <a:p>
+            <a:pPr>
+              <a:defRPr sz="1800"/>
+            </a:pPr>
+            <a:r>
+              <a:t>Q2：订单退款如何处理？</a:t>
+            </a:r>
+          </a:p>
+          <a:p>
+            <a:pPr>
+              <a:defRPr sz="1800"/>
+            </a:pPr>
+            <a:r>
+              <a:t>  • 在订单管理中审核退款申请，同意后自动退款</a:t>
+            </a:r>
+          </a:p>
+          <a:p>
+            <a:pPr>
+              <a:defRPr sz="1800"/>
+            </a:pPr>
+            <a:r>
+              <a:t>Q3：如何指定核销员？</a:t>
+            </a:r>
+          </a:p>
+          <a:p>
+            <a:pPr>
+              <a:defRPr sz="1800"/>
+            </a:pPr>
+            <a:r>
+              <a:t>  • 在活动管理中，为活动指定核销员</a:t>
+            </a:r>
+          </a:p>
+          <a:p>
+            <a:pPr>
+              <a:defRPr sz="1800"/>
+            </a:pPr>
+            <a:r>
+              <a:t>Q4：数据统计不准确怎么办？</a:t>
+            </a:r>
+          </a:p>
+          <a:p>
+            <a:pPr>
+              <a:defRPr sz="1800"/>
+            </a:pPr>
+            <a:r>
+              <a:t>  • 检查时间范围设置，刷新页面重新加载数据</a:t>
+            </a:r>
+          </a:p>
+        </p:txBody>
+      </p:sp>
+    </p:spTree>
+  </p:cSld>
+  <p:clrMapOvr>
+    <a:masterClrMapping/>
+  </p:clrMapOvr>
+</p:sld>
+</file>
+
+<file path=ppt/slides/slide13.xml><?xml version="1.0" encoding="utf-8"?>
+<p:sld xmlns:a="http://schemas.openxmlformats.org/drawingml/2006/main" xmlns:p="http://schemas.openxmlformats.org/presentationml/2006/main" xmlns:r="http://schemas.openxmlformats.org/officeDocument/2006/relationships">
+  <p:cSld>
+    <p:spTree>
+      <p:nvGrpSpPr>
+        <p:cNvPr id="1" name=""/>
+        <p:cNvGrpSpPr/>
+        <p:nvPr/>
+      </p:nvGrpSpPr>
+      <p:grpSpPr/>
+      <p:sp>
+        <p:nvSpPr>
+          <p:cNvPr id="2" name="Title 1"/>
+          <p:cNvSpPr>
+            <a:spLocks noGrp="1"/>
+          </p:cNvSpPr>
+          <p:nvPr>
+            <p:ph type="title"/>
+          </p:nvPr>
+        </p:nvSpPr>
+        <p:spPr/>
+        <p:txBody>
+          <a:bodyPr/>
+          <a:lstStyle/>
+          <a:p>
+            <a:r>
+              <a:t>技术支持</a:t>
+            </a:r>
+          </a:p>
+        </p:txBody>
+      </p:sp>
+      <p:sp>
+        <p:nvSpPr>
+          <p:cNvPr id="3" name="Content Placeholder 2"/>
+          <p:cNvSpPr>
+            <a:spLocks noGrp="1"/>
+          </p:cNvSpPr>
+          <p:nvPr>
+            <p:ph idx="1"/>
+          </p:nvPr>
+        </p:nvSpPr>
+        <p:spPr/>
+        <p:txBody>
+          <a:bodyPr/>
+          <a:lstStyle/>
+          <a:p/>
+          <a:p>
+            <a:pPr>
+              <a:defRPr sz="1800"/>
+            </a:pPr>
+            <a:r>
+              <a:t>培训支持：</a:t>
+            </a:r>
+          </a:p>
+          <a:p>
+            <a:pPr>
+              <a:defRPr sz="1800"/>
+            </a:pPr>
+            <a:r>
+              <a:t>  • 提供现场培训和远程培训</a:t>
+            </a:r>
+          </a:p>
+          <a:p>
+            <a:pPr>
+              <a:defRPr sz="1800"/>
+            </a:pPr>
+            <a:r>
+              <a:t>  • 培训手册和视频教程</a:t>
+            </a:r>
+          </a:p>
+          <a:p>
+            <a:pPr>
+              <a:defRPr sz="1800"/>
+            </a:pPr>
+            <a:r>
+              <a:t>技术支持：</a:t>
+            </a:r>
+          </a:p>
+          <a:p>
+            <a:pPr>
+              <a:defRPr sz="1800"/>
+            </a:pPr>
+            <a:r>
+              <a:t>  • 工作日9:00-18:00技术支持热线</a:t>
+            </a:r>
+          </a:p>
+          <a:p>
+            <a:pPr>
+              <a:defRPr sz="1800"/>
+            </a:pPr>
+            <a:r>
+              <a:t>  • 在线客服支持</a:t>
+            </a:r>
+          </a:p>
+          <a:p>
+            <a:pPr>
+              <a:defRPr sz="1800"/>
+            </a:pPr>
+            <a:r>
+              <a:t>  • 邮件支持：support@company.com</a:t>
+            </a:r>
+          </a:p>
+          <a:p>
+            <a:pPr>
+              <a:defRPr sz="1800"/>
+            </a:pPr>
+            <a:r>
+              <a:t>祝您使用愉快！</a:t>
             </a:r>
           </a:p>
         </p:txBody>
@@ -3276,7 +3673,7 @@
               <a:defRPr sz="2000"/>
             </a:pPr>
             <a:r>
-              <a:t>一、系统登录与主界面</a:t>
+              <a:t>1. 系统介绍</a:t>
             </a:r>
           </a:p>
           <a:p>
@@ -3284,63 +3681,7 @@
               <a:defRPr sz="2000"/>
             </a:pPr>
             <a:r>
-              <a:t>二、核心功能模块</a:t>
-            </a:r>
-          </a:p>
-          <a:p>
-            <a:pPr lvl="1">
-              <a:defRPr sz="1800"/>
-            </a:pPr>
-            <a:r>
-              <a:t>  • 活动管理 - 活动发布、套票管理</a:t>
-            </a:r>
-          </a:p>
-          <a:p>
-            <a:pPr lvl="1">
-              <a:defRPr sz="1800"/>
-            </a:pPr>
-            <a:r>
-              <a:t>  • 用户管理 - 用户信息、员工管理</a:t>
-            </a:r>
-          </a:p>
-          <a:p>
-            <a:pPr lvl="1">
-              <a:defRPr sz="1800"/>
-            </a:pPr>
-            <a:r>
-              <a:t>  • 场地管理 - 场地预订、订单处理</a:t>
-            </a:r>
-          </a:p>
-          <a:p>
-            <a:pPr lvl="1">
-              <a:defRPr sz="1800"/>
-            </a:pPr>
-            <a:r>
-              <a:t>  • 财务管理 - 商户结算、财务报表</a:t>
-            </a:r>
-          </a:p>
-          <a:p>
-            <a:pPr lvl="1">
-              <a:defRPr sz="1800"/>
-            </a:pPr>
-            <a:r>
-              <a:t>  • 营销管理 - Banner、优惠券</a:t>
-            </a:r>
-          </a:p>
-          <a:p>
-            <a:pPr lvl="1">
-              <a:defRPr sz="1800"/>
-            </a:pPr>
-            <a:r>
-              <a:t>  • 积分管理 - 规则设置、积分商城</a:t>
-            </a:r>
-          </a:p>
-          <a:p>
-            <a:pPr lvl="1">
-              <a:defRPr sz="1800"/>
-            </a:pPr>
-            <a:r>
-              <a:t>  • 数据分析 - 销售统计</a:t>
+              <a:t>2. 活动管理</a:t>
             </a:r>
           </a:p>
           <a:p>
@@ -3348,7 +3689,63 @@
               <a:defRPr sz="2000"/>
             </a:pPr>
             <a:r>
-              <a:t>三、操作技巧与常见问题</a:t>
+              <a:t>3. 场地管理</a:t>
+            </a:r>
+          </a:p>
+          <a:p>
+            <a:pPr>
+              <a:defRPr sz="2000"/>
+            </a:pPr>
+            <a:r>
+              <a:t>4. 订单管理</a:t>
+            </a:r>
+          </a:p>
+          <a:p>
+            <a:pPr>
+              <a:defRPr sz="2000"/>
+            </a:pPr>
+            <a:r>
+              <a:t>5. 用户管理</a:t>
+            </a:r>
+          </a:p>
+          <a:p>
+            <a:pPr>
+              <a:defRPr sz="2000"/>
+            </a:pPr>
+            <a:r>
+              <a:t>6. 优惠券与积分管理</a:t>
+            </a:r>
+          </a:p>
+          <a:p>
+            <a:pPr>
+              <a:defRPr sz="2000"/>
+            </a:pPr>
+            <a:r>
+              <a:t>7. 员工与财务管理</a:t>
+            </a:r>
+          </a:p>
+          <a:p>
+            <a:pPr>
+              <a:defRPr sz="2000"/>
+            </a:pPr>
+            <a:r>
+              <a:t>8. 数据分析</a:t>
+            </a:r>
+          </a:p>
+          <a:p>
+            <a:pPr>
+              <a:defRPr sz="2000"/>
+            </a:pPr>
+            <a:r>
+              <a:t>9. 系统管理</a:t>
+            </a:r>
+          </a:p>
+          <a:p>
+            <a:pPr>
+              <a:defRPr sz="2000"/>
+            </a:pPr>
+            <a:r>
+              <a:t>10. 常见问题</a:t>
             </a:r>
           </a:p>
         </p:txBody>
@@ -3385,91 +3782,66 @@
         <p:txBody>
           <a:bodyPr/>
           <a:lstStyle/>
+          <a:p>
+            <a:r>
+              <a:t>系统介绍</a:t>
+            </a:r>
+          </a:p>
+        </p:txBody>
+      </p:sp>
+      <p:sp>
+        <p:nvSpPr>
+          <p:cNvPr id="3" name="Content Placeholder 2"/>
+          <p:cNvSpPr>
+            <a:spLocks noGrp="1"/>
+          </p:cNvSpPr>
+          <p:nvPr>
+            <p:ph idx="1"/>
+          </p:nvPr>
+        </p:nvSpPr>
+        <p:spPr/>
+        <p:txBody>
+          <a:bodyPr/>
+          <a:lstStyle/>
           <a:p/>
-        </p:txBody>
-      </p:sp>
-      <p:sp>
-        <p:nvSpPr>
-          <p:cNvPr id="3" name="TextBox 2"/>
-          <p:cNvSpPr txBox="1"/>
-          <p:nvPr/>
-        </p:nvSpPr>
-        <p:spPr>
-          <a:xfrm>
-            <a:off x="457200" y="457200"/>
-            <a:ext cx="8229600" cy="731520"/>
-          </a:xfrm>
-          <a:prstGeom prst="rect">
-            <a:avLst/>
-          </a:prstGeom>
-          <a:noFill/>
-        </p:spPr>
-        <p:txBody>
-          <a:bodyPr wrap="none">
-            <a:spAutoFit/>
-          </a:bodyPr>
-          <a:lstStyle/>
-          <a:p>
-            <a:pPr>
-              <a:defRPr sz="3200" b="1"/>
-            </a:pPr>
-            <a:r>
-              <a:t>系统登录</a:t>
-            </a:r>
-          </a:p>
-        </p:txBody>
-      </p:sp>
-      <p:pic>
-        <p:nvPicPr>
-          <p:cNvPr id="4" name="Picture 3" descr="01_login.png"/>
-          <p:cNvPicPr>
-            <a:picLocks noChangeAspect="1"/>
-          </p:cNvPicPr>
-          <p:nvPr/>
-        </p:nvPicPr>
-        <p:blipFill>
-          <a:blip r:embed="rId2"/>
-          <a:stretch>
-            <a:fillRect/>
-          </a:stretch>
-        </p:blipFill>
-        <p:spPr>
-          <a:xfrm>
-            <a:off x="914400" y="1371600"/>
-            <a:ext cx="8128000" cy="4572000"/>
-          </a:xfrm>
-          <a:prstGeom prst="rect">
-            <a:avLst/>
-          </a:prstGeom>
-        </p:spPr>
-      </p:pic>
-      <p:sp>
-        <p:nvSpPr>
-          <p:cNvPr id="5" name="TextBox 4"/>
-          <p:cNvSpPr txBox="1"/>
-          <p:nvPr/>
-        </p:nvSpPr>
-        <p:spPr>
-          <a:xfrm>
-            <a:off x="457200" y="6217920"/>
-            <a:ext cx="8229600" cy="548640"/>
-          </a:xfrm>
-          <a:prstGeom prst="rect">
-            <a:avLst/>
-          </a:prstGeom>
-          <a:noFill/>
-        </p:spPr>
-        <p:txBody>
-          <a:bodyPr wrap="none">
-            <a:spAutoFit/>
-          </a:bodyPr>
-          <a:lstStyle/>
-          <a:p>
-            <a:pPr>
-              <a:defRPr sz="1600"/>
-            </a:pPr>
-            <a:r>
-              <a:t>输入用户名和密码登录系统</a:t>
+          <a:p>
+            <a:pPr>
+              <a:defRPr sz="1800"/>
+            </a:pPr>
+            <a:r>
+              <a:t>系统名称：非雪季运营管理系统</a:t>
+            </a:r>
+          </a:p>
+          <a:p>
+            <a:pPr>
+              <a:defRPr sz="1800"/>
+            </a:pPr>
+            <a:r>
+              <a:t>访问地址：https://jhtest.axioxio.com</a:t>
+            </a:r>
+          </a:p>
+          <a:p>
+            <a:pPr>
+              <a:defRPr sz="1800"/>
+            </a:pPr>
+            <a:r>
+              <a:t>主要功能：活动管理、场地预订、用户管理、财务结算等</a:t>
+            </a:r>
+          </a:p>
+          <a:p>
+            <a:pPr>
+              <a:defRPr sz="1800"/>
+            </a:pPr>
+            <a:r>
+              <a:t>支持终端：PC端管理后台、微信小程序、核销客户端</a:t>
+            </a:r>
+          </a:p>
+          <a:p>
+            <a:pPr>
+              <a:defRPr sz="1800"/>
+            </a:pPr>
+            <a:r>
+              <a:t>系统特点：操作简单、功能完善、数据实时</a:t>
             </a:r>
           </a:p>
         </p:txBody>
@@ -3506,91 +3878,82 @@
         <p:txBody>
           <a:bodyPr/>
           <a:lstStyle/>
+          <a:p>
+            <a:r>
+              <a:t>活动管理</a:t>
+            </a:r>
+          </a:p>
+        </p:txBody>
+      </p:sp>
+      <p:sp>
+        <p:nvSpPr>
+          <p:cNvPr id="3" name="Content Placeholder 2"/>
+          <p:cNvSpPr>
+            <a:spLocks noGrp="1"/>
+          </p:cNvSpPr>
+          <p:nvPr>
+            <p:ph idx="1"/>
+          </p:nvPr>
+        </p:nvSpPr>
+        <p:spPr/>
+        <p:txBody>
+          <a:bodyPr/>
+          <a:lstStyle/>
           <a:p/>
-        </p:txBody>
-      </p:sp>
-      <p:sp>
-        <p:nvSpPr>
-          <p:cNvPr id="3" name="TextBox 2"/>
-          <p:cNvSpPr txBox="1"/>
-          <p:nvPr/>
-        </p:nvSpPr>
-        <p:spPr>
-          <a:xfrm>
-            <a:off x="457200" y="457200"/>
-            <a:ext cx="8229600" cy="731520"/>
-          </a:xfrm>
-          <a:prstGeom prst="rect">
-            <a:avLst/>
-          </a:prstGeom>
-          <a:noFill/>
-        </p:spPr>
-        <p:txBody>
-          <a:bodyPr wrap="none">
-            <a:spAutoFit/>
-          </a:bodyPr>
-          <a:lstStyle/>
-          <a:p>
-            <a:pPr>
-              <a:defRPr sz="3200" b="1"/>
-            </a:pPr>
-            <a:r>
-              <a:t>系统主界面</a:t>
-            </a:r>
-          </a:p>
-        </p:txBody>
-      </p:sp>
-      <p:pic>
-        <p:nvPicPr>
-          <p:cNvPr id="4" name="Picture 3" descr="02_home.png"/>
-          <p:cNvPicPr>
-            <a:picLocks noChangeAspect="1"/>
-          </p:cNvPicPr>
-          <p:nvPr/>
-        </p:nvPicPr>
-        <p:blipFill>
-          <a:blip r:embed="rId2"/>
-          <a:stretch>
-            <a:fillRect/>
-          </a:stretch>
-        </p:blipFill>
-        <p:spPr>
-          <a:xfrm>
-            <a:off x="914400" y="1371600"/>
-            <a:ext cx="8128000" cy="4572000"/>
-          </a:xfrm>
-          <a:prstGeom prst="rect">
-            <a:avLst/>
-          </a:prstGeom>
-        </p:spPr>
-      </p:pic>
-      <p:sp>
-        <p:nvSpPr>
-          <p:cNvPr id="5" name="TextBox 4"/>
-          <p:cNvSpPr txBox="1"/>
-          <p:nvPr/>
-        </p:nvSpPr>
-        <p:spPr>
-          <a:xfrm>
-            <a:off x="457200" y="6217920"/>
-            <a:ext cx="8229600" cy="548640"/>
-          </a:xfrm>
-          <a:prstGeom prst="rect">
-            <a:avLst/>
-          </a:prstGeom>
-          <a:noFill/>
-        </p:spPr>
-        <p:txBody>
-          <a:bodyPr wrap="none">
-            <a:spAutoFit/>
-          </a:bodyPr>
-          <a:lstStyle/>
-          <a:p>
-            <a:pPr>
-              <a:defRPr sz="1600"/>
-            </a:pPr>
-            <a:r>
-              <a:t>左侧菜单导航，右侧工作区</a:t>
+          <a:p>
+            <a:pPr>
+              <a:defRPr sz="1800"/>
+            </a:pPr>
+            <a:r>
+              <a:t>功能概述：管理各类非雪季活动的创建、发布和订单管理</a:t>
+            </a:r>
+          </a:p>
+          <a:p>
+            <a:pPr>
+              <a:defRPr sz="1800"/>
+            </a:pPr>
+            <a:r>
+              <a:t>主要操作：</a:t>
+            </a:r>
+          </a:p>
+          <a:p>
+            <a:pPr>
+              <a:defRPr sz="1800"/>
+            </a:pPr>
+            <a:r>
+              <a:t>  • 创建活动：填写活动名称、时间、地点、价格等信息</a:t>
+            </a:r>
+          </a:p>
+          <a:p>
+            <a:pPr>
+              <a:defRPr sz="1800"/>
+            </a:pPr>
+            <a:r>
+              <a:t>  • 发布活动：设置活动上架/下架状态</a:t>
+            </a:r>
+          </a:p>
+          <a:p>
+            <a:pPr>
+              <a:defRPr sz="1800"/>
+            </a:pPr>
+            <a:r>
+              <a:t>  • 活动订单：查看活动报名订单，处理退款申请</a:t>
+            </a:r>
+          </a:p>
+          <a:p>
+            <a:pPr>
+              <a:defRPr sz="1800"/>
+            </a:pPr>
+            <a:r>
+              <a:t>  • 核销管理：为活动指定核销员，管理门票核销</a:t>
+            </a:r>
+          </a:p>
+          <a:p>
+            <a:pPr>
+              <a:defRPr sz="1800"/>
+            </a:pPr>
+            <a:r>
+              <a:t>  • 评价管理：审核用户对活动的评价</a:t>
             </a:r>
           </a:p>
         </p:txBody>
@@ -3627,91 +3990,90 @@
         <p:txBody>
           <a:bodyPr/>
           <a:lstStyle/>
+          <a:p>
+            <a:r>
+              <a:t>场地管理</a:t>
+            </a:r>
+          </a:p>
+        </p:txBody>
+      </p:sp>
+      <p:sp>
+        <p:nvSpPr>
+          <p:cNvPr id="3" name="Content Placeholder 2"/>
+          <p:cNvSpPr>
+            <a:spLocks noGrp="1"/>
+          </p:cNvSpPr>
+          <p:nvPr>
+            <p:ph idx="1"/>
+          </p:nvPr>
+        </p:nvSpPr>
+        <p:spPr/>
+        <p:txBody>
+          <a:bodyPr/>
+          <a:lstStyle/>
           <a:p/>
-        </p:txBody>
-      </p:sp>
-      <p:sp>
-        <p:nvSpPr>
-          <p:cNvPr id="3" name="TextBox 2"/>
-          <p:cNvSpPr txBox="1"/>
-          <p:nvPr/>
-        </p:nvSpPr>
-        <p:spPr>
-          <a:xfrm>
-            <a:off x="457200" y="457200"/>
-            <a:ext cx="8229600" cy="731520"/>
-          </a:xfrm>
-          <a:prstGeom prst="rect">
-            <a:avLst/>
-          </a:prstGeom>
-          <a:noFill/>
-        </p:spPr>
-        <p:txBody>
-          <a:bodyPr wrap="none">
-            <a:spAutoFit/>
-          </a:bodyPr>
-          <a:lstStyle/>
-          <a:p>
-            <a:pPr>
-              <a:defRPr sz="3200" b="1"/>
-            </a:pPr>
-            <a:r>
-              <a:t>功能示例 - 用户管理</a:t>
-            </a:r>
-          </a:p>
-        </p:txBody>
-      </p:sp>
-      <p:pic>
-        <p:nvPicPr>
-          <p:cNvPr id="4" name="Picture 3" descr="07_users.png"/>
-          <p:cNvPicPr>
-            <a:picLocks noChangeAspect="1"/>
-          </p:cNvPicPr>
-          <p:nvPr/>
-        </p:nvPicPr>
-        <p:blipFill>
-          <a:blip r:embed="rId2"/>
-          <a:stretch>
-            <a:fillRect/>
-          </a:stretch>
-        </p:blipFill>
-        <p:spPr>
-          <a:xfrm>
-            <a:off x="914400" y="1371600"/>
-            <a:ext cx="8128000" cy="4572000"/>
-          </a:xfrm>
-          <a:prstGeom prst="rect">
-            <a:avLst/>
-          </a:prstGeom>
-        </p:spPr>
-      </p:pic>
-      <p:sp>
-        <p:nvSpPr>
-          <p:cNvPr id="5" name="TextBox 4"/>
-          <p:cNvSpPr txBox="1"/>
-          <p:nvPr/>
-        </p:nvSpPr>
-        <p:spPr>
-          <a:xfrm>
-            <a:off x="457200" y="6217920"/>
-            <a:ext cx="8229600" cy="548640"/>
-          </a:xfrm>
-          <a:prstGeom prst="rect">
-            <a:avLst/>
-          </a:prstGeom>
-          <a:noFill/>
-        </p:spPr>
-        <p:txBody>
-          <a:bodyPr wrap="none">
-            <a:spAutoFit/>
-          </a:bodyPr>
-          <a:lstStyle/>
-          <a:p>
-            <a:pPr>
-              <a:defRPr sz="1600"/>
-            </a:pPr>
-            <a:r>
-              <a:t>查看用户列表，进行用户管理操作</a:t>
+          <a:p>
+            <a:pPr>
+              <a:defRPr sz="1800"/>
+            </a:pPr>
+            <a:r>
+              <a:t>功能模块：</a:t>
+            </a:r>
+          </a:p>
+          <a:p>
+            <a:pPr>
+              <a:defRPr sz="1800"/>
+            </a:pPr>
+            <a:r>
+              <a:t>  • 场地列表：创建和管理各类场地信息</a:t>
+            </a:r>
+          </a:p>
+          <a:p>
+            <a:pPr>
+              <a:defRPr sz="1800"/>
+            </a:pPr>
+            <a:r>
+              <a:t>  • 场地预定看板：查看场地预定情况，可视化展示</a:t>
+            </a:r>
+          </a:p>
+          <a:p>
+            <a:pPr>
+              <a:defRPr sz="1800"/>
+            </a:pPr>
+            <a:r>
+              <a:t>  • 场地订单：管理场地预订订单，处理退款</a:t>
+            </a:r>
+          </a:p>
+          <a:p>
+            <a:pPr>
+              <a:defRPr sz="1800"/>
+            </a:pPr>
+            <a:r>
+              <a:t>主要操作：</a:t>
+            </a:r>
+          </a:p>
+          <a:p>
+            <a:pPr>
+              <a:defRPr sz="1800"/>
+            </a:pPr>
+            <a:r>
+              <a:t>  • 添加场地：录入场地名称、类型、营业时间、价格</a:t>
+            </a:r>
+          </a:p>
+          <a:p>
+            <a:pPr>
+              <a:defRPr sz="1800"/>
+            </a:pPr>
+            <a:r>
+              <a:t>  • 子场地管理：为场地添加具体的子场地</a:t>
+            </a:r>
+          </a:p>
+          <a:p>
+            <a:pPr>
+              <a:defRPr sz="1800"/>
+            </a:pPr>
+            <a:r>
+              <a:t>  • 预定管理：管理员可代客户预定场地</a:t>
             </a:r>
           </a:p>
         </p:txBody>
@@ -3750,7 +4112,7 @@
           <a:lstStyle/>
           <a:p>
             <a:r>
-              <a:t>核心功能模块</a:t>
+              <a:t>订单管理</a:t>
             </a:r>
           </a:p>
         </p:txBody>
@@ -3772,129 +4134,74 @@
           <a:p/>
           <a:p>
             <a:pPr>
-              <a:defRPr sz="2000"/>
-            </a:pPr>
-            <a:r>
-              <a:t>活动管理</a:t>
-            </a:r>
-          </a:p>
-          <a:p>
-            <a:pPr lvl="1">
-              <a:defRPr sz="1800"/>
-            </a:pPr>
-            <a:r>
-              <a:t>  • 发布活动、管理报名</a:t>
-            </a:r>
-          </a:p>
-          <a:p>
-            <a:pPr lvl="1">
-              <a:defRPr sz="1800"/>
-            </a:pPr>
-            <a:r>
-              <a:t>  • 创建和管理套票</a:t>
-            </a:r>
-          </a:p>
-          <a:p>
-            <a:pPr>
-              <a:defRPr sz="2000"/>
-            </a:pPr>
-          </a:p>
-          <a:p>
-            <a:pPr>
-              <a:defRPr sz="2000"/>
-            </a:pPr>
-            <a:r>
-              <a:t>用户管理</a:t>
-            </a:r>
-          </a:p>
-          <a:p>
-            <a:pPr lvl="1">
-              <a:defRPr sz="1800"/>
-            </a:pPr>
-            <a:r>
-              <a:t>  • 普通用户：信息查询、订单管理</a:t>
-            </a:r>
-          </a:p>
-          <a:p>
-            <a:pPr lvl="1">
-              <a:defRPr sz="1800"/>
-            </a:pPr>
-            <a:r>
-              <a:t>  • 员工管理：账号创建、权限分配</a:t>
-            </a:r>
-          </a:p>
-          <a:p>
-            <a:pPr>
-              <a:defRPr sz="2000"/>
-            </a:pPr>
-          </a:p>
-          <a:p>
-            <a:pPr>
-              <a:defRPr sz="2000"/>
-            </a:pPr>
-            <a:r>
-              <a:t>场地管理</a:t>
-            </a:r>
-          </a:p>
-          <a:p>
-            <a:pPr lvl="1">
-              <a:defRPr sz="1800"/>
-            </a:pPr>
-            <a:r>
-              <a:t>  • 场地资源配置</a:t>
-            </a:r>
-          </a:p>
-          <a:p>
-            <a:pPr lvl="1">
-              <a:defRPr sz="1800"/>
-            </a:pPr>
-            <a:r>
-              <a:t>  • 预订订单处理</a:t>
-            </a:r>
-          </a:p>
-          <a:p>
-            <a:pPr>
-              <a:defRPr sz="2000"/>
-            </a:pPr>
-          </a:p>
-          <a:p>
-            <a:pPr>
-              <a:defRPr sz="2000"/>
-            </a:pPr>
-            <a:r>
-              <a:t>其他功能</a:t>
-            </a:r>
-          </a:p>
-          <a:p>
-            <a:pPr lvl="1">
-              <a:defRPr sz="1800"/>
-            </a:pPr>
-            <a:r>
-              <a:t>  • 财务结算审核</a:t>
-            </a:r>
-          </a:p>
-          <a:p>
-            <a:pPr lvl="1">
-              <a:defRPr sz="1800"/>
-            </a:pPr>
-            <a:r>
-              <a:t>  • 营销活动配置</a:t>
-            </a:r>
-          </a:p>
-          <a:p>
-            <a:pPr lvl="1">
-              <a:defRPr sz="1800"/>
-            </a:pPr>
-            <a:r>
-              <a:t>  • 积分规则设置</a:t>
-            </a:r>
-          </a:p>
-          <a:p>
-            <a:pPr lvl="1">
-              <a:defRPr sz="1800"/>
-            </a:pPr>
-            <a:r>
-              <a:t>  • 数据统计分析</a:t>
+              <a:defRPr sz="1800"/>
+            </a:pPr>
+            <a:r>
+              <a:t>功能概述：统一查看和管理所有订单</a:t>
+            </a:r>
+          </a:p>
+          <a:p>
+            <a:pPr>
+              <a:defRPr sz="1800"/>
+            </a:pPr>
+            <a:r>
+              <a:t>订单类型：</a:t>
+            </a:r>
+          </a:p>
+          <a:p>
+            <a:pPr>
+              <a:defRPr sz="1800"/>
+            </a:pPr>
+            <a:r>
+              <a:t>  • 活动订单：用户报名活动产生的订单</a:t>
+            </a:r>
+          </a:p>
+          <a:p>
+            <a:pPr>
+              <a:defRPr sz="1800"/>
+            </a:pPr>
+            <a:r>
+              <a:t>  • 场地订单：场地预订产生的订单</a:t>
+            </a:r>
+          </a:p>
+          <a:p>
+            <a:pPr>
+              <a:defRPr sz="1800"/>
+            </a:pPr>
+            <a:r>
+              <a:t>  • 积分订单：积分兑换产生的订单</a:t>
+            </a:r>
+          </a:p>
+          <a:p>
+            <a:pPr>
+              <a:defRPr sz="1800"/>
+            </a:pPr>
+            <a:r>
+              <a:t>主要操作：</a:t>
+            </a:r>
+          </a:p>
+          <a:p>
+            <a:pPr>
+              <a:defRPr sz="1800"/>
+            </a:pPr>
+            <a:r>
+              <a:t>  • 订单查询：按订单编号、用户信息等条件查询</a:t>
+            </a:r>
+          </a:p>
+          <a:p>
+            <a:pPr>
+              <a:defRPr sz="1800"/>
+            </a:pPr>
+            <a:r>
+              <a:t>  • 订单详情：查看订单完整信息</a:t>
+            </a:r>
+          </a:p>
+          <a:p>
+            <a:pPr>
+              <a:defRPr sz="1800"/>
+            </a:pPr>
+            <a:r>
+              <a:t>  • 退款审核：审核用户提交的退款申请</a:t>
             </a:r>
           </a:p>
         </p:txBody>
@@ -3933,7 +4240,7 @@
           <a:lstStyle/>
           <a:p>
             <a:r>
-              <a:t>操作技巧</a:t>
+              <a:t>用户管理</a:t>
             </a:r>
           </a:p>
         </p:txBody>
@@ -3955,116 +4262,58 @@
           <a:p/>
           <a:p>
             <a:pPr>
-              <a:defRPr sz="2000"/>
-            </a:pPr>
-            <a:r>
-              <a:t>查询技巧</a:t>
-            </a:r>
-          </a:p>
-          <a:p>
-            <a:pPr lvl="1">
-              <a:defRPr sz="1800"/>
-            </a:pPr>
-            <a:r>
-              <a:t>  • 支持模糊查询（姓名、手机号）</a:t>
-            </a:r>
-          </a:p>
-          <a:p>
-            <a:pPr lvl="1">
-              <a:defRPr sz="1800"/>
-            </a:pPr>
-            <a:r>
-              <a:t>  • 使用时间范围筛选</a:t>
-            </a:r>
-          </a:p>
-          <a:p>
-            <a:pPr lvl="1">
-              <a:defRPr sz="1800"/>
-            </a:pPr>
-            <a:r>
-              <a:t>  • 组合多个条件精确查询</a:t>
-            </a:r>
-          </a:p>
-          <a:p>
-            <a:pPr>
-              <a:defRPr sz="2000"/>
-            </a:pPr>
-          </a:p>
-          <a:p>
-            <a:pPr>
-              <a:defRPr sz="2000"/>
-            </a:pPr>
-            <a:r>
-              <a:t>快捷操作</a:t>
-            </a:r>
-          </a:p>
-          <a:p>
-            <a:pPr lvl="1">
-              <a:defRPr sz="1800"/>
-            </a:pPr>
-            <a:r>
-              <a:t>  • Ctrl+S 保存</a:t>
-            </a:r>
-          </a:p>
-          <a:p>
-            <a:pPr lvl="1">
-              <a:defRPr sz="1800"/>
-            </a:pPr>
-            <a:r>
-              <a:t>  • Ctrl+F 搜索</a:t>
-            </a:r>
-          </a:p>
-          <a:p>
-            <a:pPr lvl="1">
-              <a:defRPr sz="1800"/>
-            </a:pPr>
-            <a:r>
-              <a:t>  • F5 刷新</a:t>
-            </a:r>
-          </a:p>
-          <a:p>
-            <a:pPr lvl="1">
-              <a:defRPr sz="1800"/>
-            </a:pPr>
-            <a:r>
-              <a:t>  • Esc 关闭弹窗</a:t>
-            </a:r>
-          </a:p>
-          <a:p>
-            <a:pPr>
-              <a:defRPr sz="2000"/>
-            </a:pPr>
-          </a:p>
-          <a:p>
-            <a:pPr>
-              <a:defRPr sz="2000"/>
-            </a:pPr>
-            <a:r>
-              <a:t>数据导出</a:t>
-            </a:r>
-          </a:p>
-          <a:p>
-            <a:pPr lvl="1">
-              <a:defRPr sz="1800"/>
-            </a:pPr>
-            <a:r>
-              <a:t>  • 设置筛选条件</a:t>
-            </a:r>
-          </a:p>
-          <a:p>
-            <a:pPr lvl="1">
-              <a:defRPr sz="1800"/>
-            </a:pPr>
-            <a:r>
-              <a:t>  • 点击导出按钮</a:t>
-            </a:r>
-          </a:p>
-          <a:p>
-            <a:pPr lvl="1">
-              <a:defRPr sz="1800"/>
-            </a:pPr>
-            <a:r>
-              <a:t>  • 选择导出格式（Excel/PDF）</a:t>
+              <a:defRPr sz="1800"/>
+            </a:pPr>
+            <a:r>
+              <a:t>功能模块：</a:t>
+            </a:r>
+          </a:p>
+          <a:p>
+            <a:pPr>
+              <a:defRPr sz="1800"/>
+            </a:pPr>
+            <a:r>
+              <a:t>  • 普通用户：管理C端用户信息</a:t>
+            </a:r>
+          </a:p>
+          <a:p>
+            <a:pPr>
+              <a:defRPr sz="1800"/>
+            </a:pPr>
+            <a:r>
+              <a:t>  • 用户订单：查看用户的所有订单记录</a:t>
+            </a:r>
+          </a:p>
+          <a:p>
+            <a:pPr>
+              <a:defRPr sz="1800"/>
+            </a:pPr>
+            <a:r>
+              <a:t>主要操作：</a:t>
+            </a:r>
+          </a:p>
+          <a:p>
+            <a:pPr>
+              <a:defRPr sz="1800"/>
+            </a:pPr>
+            <a:r>
+              <a:t>  • 用户查询：通过姓名、手机号查询用户</a:t>
+            </a:r>
+          </a:p>
+          <a:p>
+            <a:pPr>
+              <a:defRPr sz="1800"/>
+            </a:pPr>
+            <a:r>
+              <a:t>  • 用户详情：查看用户基本信息和消费记录</a:t>
+            </a:r>
+          </a:p>
+          <a:p>
+            <a:pPr>
+              <a:defRPr sz="1800"/>
+            </a:pPr>
+            <a:r>
+              <a:t>  • 订单查看：查看用户的活动订单和场地订单</a:t>
             </a:r>
           </a:p>
         </p:txBody>
@@ -4103,7 +4352,7 @@
           <a:lstStyle/>
           <a:p>
             <a:r>
-              <a:t>常见问题</a:t>
+              <a:t>优惠券与积分管理</a:t>
             </a:r>
           </a:p>
         </p:txBody>
@@ -4125,81 +4374,66 @@
           <a:p/>
           <a:p>
             <a:pPr>
-              <a:defRPr sz="2000"/>
-            </a:pPr>
-            <a:r>
-              <a:t>Q：忘记密码怎么办？</a:t>
-            </a:r>
-          </a:p>
-          <a:p>
-            <a:pPr>
-              <a:defRPr sz="2000"/>
-            </a:pPr>
-            <a:r>
-              <a:t>A：联系系统管理员重置</a:t>
-            </a:r>
-          </a:p>
-          <a:p>
-            <a:pPr>
-              <a:defRPr sz="2000"/>
-            </a:pPr>
-          </a:p>
-          <a:p>
-            <a:pPr>
-              <a:defRPr sz="2000"/>
-            </a:pPr>
-            <a:r>
-              <a:t>Q：为什么看不到某些菜单？</a:t>
-            </a:r>
-          </a:p>
-          <a:p>
-            <a:pPr>
-              <a:defRPr sz="2000"/>
-            </a:pPr>
-            <a:r>
-              <a:t>A：检查账号权限，联系管理员分配</a:t>
-            </a:r>
-          </a:p>
-          <a:p>
-            <a:pPr>
-              <a:defRPr sz="2000"/>
-            </a:pPr>
-          </a:p>
-          <a:p>
-            <a:pPr>
-              <a:defRPr sz="2000"/>
-            </a:pPr>
-            <a:r>
-              <a:t>Q：数据保存失败？</a:t>
-            </a:r>
-          </a:p>
-          <a:p>
-            <a:pPr>
-              <a:defRPr sz="2000"/>
-            </a:pPr>
-            <a:r>
-              <a:t>A：检查必填项、数据格式、网络连接</a:t>
-            </a:r>
-          </a:p>
-          <a:p>
-            <a:pPr>
-              <a:defRPr sz="2000"/>
-            </a:pPr>
-          </a:p>
-          <a:p>
-            <a:pPr>
-              <a:defRPr sz="2000"/>
-            </a:pPr>
-            <a:r>
-              <a:t>Q：页面显示异常？</a:t>
-            </a:r>
-          </a:p>
-          <a:p>
-            <a:pPr>
-              <a:defRPr sz="2000"/>
-            </a:pPr>
-            <a:r>
-              <a:t>A：刷新页面(F5)、清除缓存、使用Chrome浏览器</a:t>
+              <a:defRPr sz="1800"/>
+            </a:pPr>
+            <a:r>
+              <a:t>优惠券管理：</a:t>
+            </a:r>
+          </a:p>
+          <a:p>
+            <a:pPr>
+              <a:defRPr sz="1800"/>
+            </a:pPr>
+            <a:r>
+              <a:t>  • 创建优惠券：设置优惠券面额、使用条件、有效期</a:t>
+            </a:r>
+          </a:p>
+          <a:p>
+            <a:pPr>
+              <a:defRPr sz="1800"/>
+            </a:pPr>
+            <a:r>
+              <a:t>  • 发放管理：向特定用户或全体用户发放优惠券</a:t>
+            </a:r>
+          </a:p>
+          <a:p>
+            <a:pPr>
+              <a:defRPr sz="1800"/>
+            </a:pPr>
+            <a:r>
+              <a:t>积分管理：</a:t>
+            </a:r>
+          </a:p>
+          <a:p>
+            <a:pPr>
+              <a:defRPr sz="1800"/>
+            </a:pPr>
+            <a:r>
+              <a:t>  • 规则设置：配置积分获取和消耗规则</a:t>
+            </a:r>
+          </a:p>
+          <a:p>
+            <a:pPr>
+              <a:defRPr sz="1800"/>
+            </a:pPr>
+            <a:r>
+              <a:t>  • 积分商城：添加积分兑换商品，设置兑换规则</a:t>
+            </a:r>
+          </a:p>
+          <a:p>
+            <a:pPr>
+              <a:defRPr sz="1800"/>
+            </a:pPr>
+            <a:r>
+              <a:t>  • 积分用户：查看用户积分余额和变动记录</a:t>
+            </a:r>
+          </a:p>
+          <a:p>
+            <a:pPr>
+              <a:defRPr sz="1800"/>
+            </a:pPr>
+            <a:r>
+              <a:t>  • 积分订单：管理积分兑换订单</a:t>
             </a:r>
           </a:p>
         </p:txBody>
@@ -4238,7 +4472,7 @@
           <a:lstStyle/>
           <a:p>
             <a:r>
-              <a:t>注意事项</a:t>
+              <a:t>员工与财务管理</a:t>
             </a:r>
           </a:p>
         </p:txBody>
@@ -4260,100 +4494,66 @@
           <a:p/>
           <a:p>
             <a:pPr>
-              <a:defRPr sz="2000"/>
-            </a:pPr>
-            <a:r>
-              <a:t>安全规范</a:t>
-            </a:r>
-          </a:p>
-          <a:p>
-            <a:pPr lvl="1">
-              <a:defRPr sz="1800"/>
-            </a:pPr>
-            <a:r>
-              <a:t>  ✓ 定期修改密码</a:t>
-            </a:r>
-          </a:p>
-          <a:p>
-            <a:pPr lvl="1">
-              <a:defRPr sz="1800"/>
-            </a:pPr>
-            <a:r>
-              <a:t>  ✓ 不要泄露账号信息</a:t>
-            </a:r>
-          </a:p>
-          <a:p>
-            <a:pPr lvl="1">
-              <a:defRPr sz="1800"/>
-            </a:pPr>
-            <a:r>
-              <a:t>  ✓ 使用后及时退出</a:t>
-            </a:r>
-          </a:p>
-          <a:p>
-            <a:pPr>
-              <a:defRPr sz="2000"/>
-            </a:pPr>
-          </a:p>
-          <a:p>
-            <a:pPr>
-              <a:defRPr sz="2000"/>
-            </a:pPr>
-            <a:r>
-              <a:t>操作规范</a:t>
-            </a:r>
-          </a:p>
-          <a:p>
-            <a:pPr lvl="1">
-              <a:defRPr sz="1800"/>
-            </a:pPr>
-            <a:r>
-              <a:t>  ✓ 重要操作前仔细核对</a:t>
-            </a:r>
-          </a:p>
-          <a:p>
-            <a:pPr lvl="1">
-              <a:defRPr sz="1800"/>
-            </a:pPr>
-            <a:r>
-              <a:t>  ✓ 定期备份重要数据</a:t>
-            </a:r>
-          </a:p>
-          <a:p>
-            <a:pPr lvl="1">
-              <a:defRPr sz="1800"/>
-            </a:pPr>
-            <a:r>
-              <a:t>  ✓ 发现异常及时报告</a:t>
-            </a:r>
-          </a:p>
-          <a:p>
-            <a:pPr>
-              <a:defRPr sz="2000"/>
-            </a:pPr>
-          </a:p>
-          <a:p>
-            <a:pPr>
-              <a:defRPr sz="2000"/>
-            </a:pPr>
-            <a:r>
-              <a:t>联系方式</a:t>
-            </a:r>
-          </a:p>
-          <a:p>
-            <a:pPr lvl="1">
-              <a:defRPr sz="1800"/>
-            </a:pPr>
-            <a:r>
-              <a:t>  技术支持：400-xxx-xxxx</a:t>
-            </a:r>
-          </a:p>
-          <a:p>
-            <a:pPr lvl="1">
-              <a:defRPr sz="1800"/>
-            </a:pPr>
-            <a:r>
-              <a:t>  工作时间：周一至周日 9:00-18:00</a:t>
+              <a:defRPr sz="1800"/>
+            </a:pPr>
+            <a:r>
+              <a:t>员工管理：</a:t>
+            </a:r>
+          </a:p>
+          <a:p>
+            <a:pPr>
+              <a:defRPr sz="1800"/>
+            </a:pPr>
+            <a:r>
+              <a:t>  • 添加员工：录入员工基本信息</a:t>
+            </a:r>
+          </a:p>
+          <a:p>
+            <a:pPr>
+              <a:defRPr sz="1800"/>
+            </a:pPr>
+            <a:r>
+              <a:t>  • 权限设置：为员工分配系统权限</a:t>
+            </a:r>
+          </a:p>
+          <a:p>
+            <a:pPr>
+              <a:defRPr sz="1800"/>
+            </a:pPr>
+            <a:r>
+              <a:t>  • 核销权限：指定员工为核销员</a:t>
+            </a:r>
+          </a:p>
+          <a:p>
+            <a:pPr>
+              <a:defRPr sz="1800"/>
+            </a:pPr>
+            <a:r>
+              <a:t>财务管理：</a:t>
+            </a:r>
+          </a:p>
+          <a:p>
+            <a:pPr>
+              <a:defRPr sz="1800"/>
+            </a:pPr>
+            <a:r>
+              <a:t>  • 商户结算审核：审核商户结算申请</a:t>
+            </a:r>
+          </a:p>
+          <a:p>
+            <a:pPr>
+              <a:defRPr sz="1800"/>
+            </a:pPr>
+            <a:r>
+              <a:t>  • 收入统计：查看各类收入数据</a:t>
+            </a:r>
+          </a:p>
+          <a:p>
+            <a:pPr>
+              <a:defRPr sz="1800"/>
+            </a:pPr>
+            <a:r>
+              <a:t>  • 财务报表：生成和导出财务报表</a:t>
             </a:r>
           </a:p>
         </p:txBody>

</xml_diff>